<commit_message>
Add Microwat and Conclusions
</commit_message>
<xml_diff>
--- a/images/originals/models.pptx
+++ b/images/originals/models.pptx
@@ -10,6 +10,9 @@
     <p:sldId id="258" r:id="rId4"/>
     <p:sldId id="259" r:id="rId5"/>
     <p:sldId id="260" r:id="rId6"/>
+    <p:sldId id="261" r:id="rId7"/>
+    <p:sldId id="263" r:id="rId8"/>
+    <p:sldId id="262" r:id="rId9"/>
   </p:sldIdLst>
   <p:sldSz cx="9144000" cy="6858000" type="screen4x3"/>
   <p:notesSz cx="6858000" cy="9144000"/>
@@ -111,6 +114,592 @@
 </p:presentation>
 </file>
 
+<file path=ppt/charts/chart1.xml><?xml version="1.0" encoding="utf-8"?>
+<c:chartSpace xmlns:c="http://schemas.openxmlformats.org/drawingml/2006/chart" xmlns:a="http://schemas.openxmlformats.org/drawingml/2006/main" xmlns:r="http://schemas.openxmlformats.org/officeDocument/2006/relationships">
+  <c:date1904 val="0"/>
+  <c:lang val="fr-FR"/>
+  <c:roundedCorners val="0"/>
+  <mc:AlternateContent xmlns:mc="http://schemas.openxmlformats.org/markup-compatibility/2006">
+    <mc:Choice xmlns:c14="http://schemas.microsoft.com/office/drawing/2007/8/2/chart" Requires="c14">
+      <c14:style val="118"/>
+    </mc:Choice>
+    <mc:Fallback>
+      <c:style val="18"/>
+    </mc:Fallback>
+  </mc:AlternateContent>
+  <c:chart>
+    <c:autoTitleDeleted val="0"/>
+    <c:plotArea>
+      <c:layout/>
+      <c:barChart>
+        <c:barDir val="col"/>
+        <c:grouping val="clustered"/>
+        <c:varyColors val="0"/>
+        <c:ser>
+          <c:idx val="0"/>
+          <c:order val="0"/>
+          <c:invertIfNegative val="0"/>
+          <c:cat>
+            <c:strRef>
+              <c:f>Feuil1!$B$1</c:f>
+              <c:strCache>
+                <c:ptCount val="1"/>
+                <c:pt idx="0">
+                  <c:v>Colonne1</c:v>
+                </c:pt>
+              </c:strCache>
+            </c:strRef>
+          </c:cat>
+          <c:val>
+            <c:numRef>
+              <c:f>Feuil1!$B$2</c:f>
+              <c:numCache>
+                <c:formatCode>General</c:formatCode>
+                <c:ptCount val="1"/>
+                <c:pt idx="0">
+                  <c:v>0.73</c:v>
+                </c:pt>
+              </c:numCache>
+            </c:numRef>
+          </c:val>
+        </c:ser>
+        <c:ser>
+          <c:idx val="1"/>
+          <c:order val="1"/>
+          <c:invertIfNegative val="0"/>
+          <c:cat>
+            <c:strRef>
+              <c:f>Feuil1!$B$1</c:f>
+              <c:strCache>
+                <c:ptCount val="1"/>
+                <c:pt idx="0">
+                  <c:v>Colonne1</c:v>
+                </c:pt>
+              </c:strCache>
+            </c:strRef>
+          </c:cat>
+          <c:val>
+            <c:numRef>
+              <c:f>Feuil1!$B$3</c:f>
+              <c:numCache>
+                <c:formatCode>General</c:formatCode>
+                <c:ptCount val="1"/>
+                <c:pt idx="0">
+                  <c:v>0.44</c:v>
+                </c:pt>
+              </c:numCache>
+            </c:numRef>
+          </c:val>
+        </c:ser>
+        <c:ser>
+          <c:idx val="2"/>
+          <c:order val="2"/>
+          <c:invertIfNegative val="0"/>
+          <c:cat>
+            <c:strRef>
+              <c:f>Feuil1!$B$1</c:f>
+              <c:strCache>
+                <c:ptCount val="1"/>
+                <c:pt idx="0">
+                  <c:v>Colonne1</c:v>
+                </c:pt>
+              </c:strCache>
+            </c:strRef>
+          </c:cat>
+          <c:val>
+            <c:numRef>
+              <c:f>Feuil1!$B$4</c:f>
+              <c:numCache>
+                <c:formatCode>General</c:formatCode>
+                <c:ptCount val="1"/>
+                <c:pt idx="0">
+                  <c:v>0.42</c:v>
+                </c:pt>
+              </c:numCache>
+            </c:numRef>
+          </c:val>
+        </c:ser>
+        <c:ser>
+          <c:idx val="3"/>
+          <c:order val="3"/>
+          <c:invertIfNegative val="0"/>
+          <c:cat>
+            <c:strRef>
+              <c:f>Feuil1!$B$1</c:f>
+              <c:strCache>
+                <c:ptCount val="1"/>
+                <c:pt idx="0">
+                  <c:v>Colonne1</c:v>
+                </c:pt>
+              </c:strCache>
+            </c:strRef>
+          </c:cat>
+          <c:val>
+            <c:numRef>
+              <c:f>Feuil1!$B$5</c:f>
+              <c:numCache>
+                <c:formatCode>General</c:formatCode>
+                <c:ptCount val="1"/>
+                <c:pt idx="0">
+                  <c:v>0.37</c:v>
+                </c:pt>
+              </c:numCache>
+            </c:numRef>
+          </c:val>
+        </c:ser>
+        <c:ser>
+          <c:idx val="4"/>
+          <c:order val="4"/>
+          <c:invertIfNegative val="0"/>
+          <c:cat>
+            <c:strRef>
+              <c:f>Feuil1!$B$1</c:f>
+              <c:strCache>
+                <c:ptCount val="1"/>
+                <c:pt idx="0">
+                  <c:v>Colonne1</c:v>
+                </c:pt>
+              </c:strCache>
+            </c:strRef>
+          </c:cat>
+          <c:val>
+            <c:numRef>
+              <c:f>Feuil1!$B$6</c:f>
+              <c:numCache>
+                <c:formatCode>General</c:formatCode>
+                <c:ptCount val="1"/>
+                <c:pt idx="0">
+                  <c:v>0.36</c:v>
+                </c:pt>
+              </c:numCache>
+            </c:numRef>
+          </c:val>
+        </c:ser>
+        <c:dLbls>
+          <c:showLegendKey val="0"/>
+          <c:showVal val="0"/>
+          <c:showCatName val="0"/>
+          <c:showSerName val="0"/>
+          <c:showPercent val="0"/>
+          <c:showBubbleSize val="0"/>
+        </c:dLbls>
+        <c:gapWidth val="150"/>
+        <c:axId val="796403848"/>
+        <c:axId val="796397048"/>
+      </c:barChart>
+      <c:catAx>
+        <c:axId val="796403848"/>
+        <c:scaling>
+          <c:orientation val="minMax"/>
+        </c:scaling>
+        <c:delete val="1"/>
+        <c:axPos val="b"/>
+        <c:majorTickMark val="out"/>
+        <c:minorTickMark val="none"/>
+        <c:tickLblPos val="nextTo"/>
+        <c:crossAx val="796397048"/>
+        <c:crosses val="autoZero"/>
+        <c:auto val="1"/>
+        <c:lblAlgn val="ctr"/>
+        <c:lblOffset val="100"/>
+        <c:noMultiLvlLbl val="0"/>
+      </c:catAx>
+      <c:valAx>
+        <c:axId val="796397048"/>
+        <c:scaling>
+          <c:orientation val="minMax"/>
+        </c:scaling>
+        <c:delete val="0"/>
+        <c:axPos val="l"/>
+        <c:majorGridlines/>
+        <c:numFmt formatCode="General" sourceLinked="1"/>
+        <c:majorTickMark val="out"/>
+        <c:minorTickMark val="none"/>
+        <c:tickLblPos val="nextTo"/>
+        <c:crossAx val="796403848"/>
+        <c:crosses val="autoZero"/>
+        <c:crossBetween val="between"/>
+      </c:valAx>
+    </c:plotArea>
+    <c:plotVisOnly val="1"/>
+    <c:dispBlanksAs val="gap"/>
+    <c:showDLblsOverMax val="0"/>
+  </c:chart>
+  <c:txPr>
+    <a:bodyPr/>
+    <a:lstStyle/>
+    <a:p>
+      <a:pPr>
+        <a:defRPr sz="1800"/>
+      </a:pPr>
+      <a:endParaRPr lang="fr-FR"/>
+    </a:p>
+  </c:txPr>
+  <c:externalData r:id="rId1">
+    <c:autoUpdate val="0"/>
+  </c:externalData>
+</c:chartSpace>
+</file>
+
+<file path=ppt/charts/chart2.xml><?xml version="1.0" encoding="utf-8"?>
+<c:chartSpace xmlns:c="http://schemas.openxmlformats.org/drawingml/2006/chart" xmlns:a="http://schemas.openxmlformats.org/drawingml/2006/main" xmlns:r="http://schemas.openxmlformats.org/officeDocument/2006/relationships">
+  <c:date1904 val="0"/>
+  <c:lang val="fr-FR"/>
+  <c:roundedCorners val="0"/>
+  <mc:AlternateContent xmlns:mc="http://schemas.openxmlformats.org/markup-compatibility/2006">
+    <mc:Choice xmlns:c14="http://schemas.microsoft.com/office/drawing/2007/8/2/chart" Requires="c14">
+      <c14:style val="118"/>
+    </mc:Choice>
+    <mc:Fallback>
+      <c:style val="18"/>
+    </mc:Fallback>
+  </mc:AlternateContent>
+  <c:chart>
+    <c:title>
+      <c:layout/>
+      <c:overlay val="0"/>
+    </c:title>
+    <c:autoTitleDeleted val="0"/>
+    <c:plotArea>
+      <c:layout/>
+      <c:barChart>
+        <c:barDir val="col"/>
+        <c:grouping val="clustered"/>
+        <c:varyColors val="0"/>
+        <c:ser>
+          <c:idx val="0"/>
+          <c:order val="0"/>
+          <c:tx>
+            <c:strRef>
+              <c:f>Feuil1!$A$11</c:f>
+              <c:strCache>
+                <c:ptCount val="1"/>
+                <c:pt idx="0">
+                  <c:v>Antenne réelle</c:v>
+                </c:pt>
+              </c:strCache>
+            </c:strRef>
+          </c:tx>
+          <c:invertIfNegative val="0"/>
+          <c:val>
+            <c:numRef>
+              <c:f>Feuil1!$B$11</c:f>
+              <c:numCache>
+                <c:formatCode>General</c:formatCode>
+                <c:ptCount val="1"/>
+                <c:pt idx="0">
+                  <c:v>0.32</c:v>
+                </c:pt>
+              </c:numCache>
+            </c:numRef>
+          </c:val>
+        </c:ser>
+        <c:ser>
+          <c:idx val="1"/>
+          <c:order val="1"/>
+          <c:tx>
+            <c:strRef>
+              <c:f>Feuil1!$A$12</c:f>
+              <c:strCache>
+                <c:ptCount val="1"/>
+                <c:pt idx="0">
+                  <c:v>Interféro. 2D</c:v>
+                </c:pt>
+              </c:strCache>
+            </c:strRef>
+          </c:tx>
+          <c:invertIfNegative val="0"/>
+          <c:val>
+            <c:numRef>
+              <c:f>Feuil1!$B$12</c:f>
+              <c:numCache>
+                <c:formatCode>General</c:formatCode>
+                <c:ptCount val="1"/>
+                <c:pt idx="0">
+                  <c:v>1.27</c:v>
+                </c:pt>
+              </c:numCache>
+            </c:numRef>
+          </c:val>
+        </c:ser>
+        <c:ser>
+          <c:idx val="2"/>
+          <c:order val="2"/>
+          <c:tx>
+            <c:strRef>
+              <c:f>Feuil1!$A$13</c:f>
+              <c:strCache>
+                <c:ptCount val="1"/>
+                <c:pt idx="0">
+                  <c:v>Interféro. 1D</c:v>
+                </c:pt>
+              </c:strCache>
+            </c:strRef>
+          </c:tx>
+          <c:invertIfNegative val="0"/>
+          <c:val>
+            <c:numRef>
+              <c:f>Feuil1!$B$13</c:f>
+              <c:numCache>
+                <c:formatCode>General</c:formatCode>
+                <c:ptCount val="1"/>
+                <c:pt idx="0">
+                  <c:v>0.38</c:v>
+                </c:pt>
+              </c:numCache>
+            </c:numRef>
+          </c:val>
+        </c:ser>
+        <c:dLbls>
+          <c:showLegendKey val="0"/>
+          <c:showVal val="0"/>
+          <c:showCatName val="0"/>
+          <c:showSerName val="0"/>
+          <c:showPercent val="0"/>
+          <c:showBubbleSize val="0"/>
+        </c:dLbls>
+        <c:gapWidth val="150"/>
+        <c:axId val="795420152"/>
+        <c:axId val="678295192"/>
+      </c:barChart>
+      <c:catAx>
+        <c:axId val="795420152"/>
+        <c:scaling>
+          <c:orientation val="minMax"/>
+        </c:scaling>
+        <c:delete val="0"/>
+        <c:axPos val="b"/>
+        <c:numFmt formatCode="General" sourceLinked="1"/>
+        <c:majorTickMark val="none"/>
+        <c:minorTickMark val="none"/>
+        <c:tickLblPos val="nextTo"/>
+        <c:crossAx val="678295192"/>
+        <c:crosses val="autoZero"/>
+        <c:auto val="1"/>
+        <c:lblAlgn val="ctr"/>
+        <c:lblOffset val="100"/>
+        <c:noMultiLvlLbl val="0"/>
+      </c:catAx>
+      <c:valAx>
+        <c:axId val="678295192"/>
+        <c:scaling>
+          <c:orientation val="minMax"/>
+        </c:scaling>
+        <c:delete val="0"/>
+        <c:axPos val="l"/>
+        <c:majorGridlines/>
+        <c:title>
+          <c:layout/>
+          <c:overlay val="0"/>
+        </c:title>
+        <c:numFmt formatCode="General" sourceLinked="1"/>
+        <c:majorTickMark val="none"/>
+        <c:minorTickMark val="none"/>
+        <c:tickLblPos val="nextTo"/>
+        <c:crossAx val="795420152"/>
+        <c:crosses val="autoZero"/>
+        <c:crossBetween val="between"/>
+      </c:valAx>
+      <c:dTable>
+        <c:showHorzBorder val="1"/>
+        <c:showVertBorder val="1"/>
+        <c:showOutline val="1"/>
+        <c:showKeys val="1"/>
+      </c:dTable>
+    </c:plotArea>
+    <c:plotVisOnly val="1"/>
+    <c:dispBlanksAs val="gap"/>
+    <c:showDLblsOverMax val="0"/>
+  </c:chart>
+  <c:txPr>
+    <a:bodyPr/>
+    <a:lstStyle/>
+    <a:p>
+      <a:pPr>
+        <a:defRPr sz="1800"/>
+      </a:pPr>
+      <a:endParaRPr lang="fr-FR"/>
+    </a:p>
+  </c:txPr>
+  <c:externalData r:id="rId1">
+    <c:autoUpdate val="0"/>
+  </c:externalData>
+</c:chartSpace>
+</file>
+
+<file path=ppt/charts/chart3.xml><?xml version="1.0" encoding="utf-8"?>
+<c:chartSpace xmlns:c="http://schemas.openxmlformats.org/drawingml/2006/chart" xmlns:a="http://schemas.openxmlformats.org/drawingml/2006/main" xmlns:r="http://schemas.openxmlformats.org/officeDocument/2006/relationships">
+  <c:date1904 val="0"/>
+  <c:lang val="fr-FR"/>
+  <c:roundedCorners val="0"/>
+  <mc:AlternateContent xmlns:mc="http://schemas.openxmlformats.org/markup-compatibility/2006">
+    <mc:Choice xmlns:c14="http://schemas.microsoft.com/office/drawing/2007/8/2/chart" Requires="c14">
+      <c14:style val="118"/>
+    </mc:Choice>
+    <mc:Fallback>
+      <c:style val="18"/>
+    </mc:Fallback>
+  </mc:AlternateContent>
+  <c:chart>
+    <c:autoTitleDeleted val="0"/>
+    <c:plotArea>
+      <c:layout/>
+      <c:barChart>
+        <c:barDir val="col"/>
+        <c:grouping val="clustered"/>
+        <c:varyColors val="0"/>
+        <c:ser>
+          <c:idx val="0"/>
+          <c:order val="0"/>
+          <c:invertIfNegative val="0"/>
+          <c:val>
+            <c:numRef>
+              <c:f>Feuil1!$E$2</c:f>
+              <c:numCache>
+                <c:formatCode>General</c:formatCode>
+                <c:ptCount val="1"/>
+                <c:pt idx="0">
+                  <c:v>2.27</c:v>
+                </c:pt>
+              </c:numCache>
+            </c:numRef>
+          </c:val>
+        </c:ser>
+        <c:ser>
+          <c:idx val="1"/>
+          <c:order val="1"/>
+          <c:invertIfNegative val="0"/>
+          <c:val>
+            <c:numRef>
+              <c:f>Feuil1!$E$3</c:f>
+              <c:numCache>
+                <c:formatCode>General</c:formatCode>
+                <c:ptCount val="1"/>
+                <c:pt idx="0">
+                  <c:v>0.81</c:v>
+                </c:pt>
+              </c:numCache>
+            </c:numRef>
+          </c:val>
+        </c:ser>
+        <c:ser>
+          <c:idx val="2"/>
+          <c:order val="2"/>
+          <c:invertIfNegative val="0"/>
+          <c:val>
+            <c:numRef>
+              <c:f>Feuil1!$E$4</c:f>
+              <c:numCache>
+                <c:formatCode>General</c:formatCode>
+                <c:ptCount val="1"/>
+                <c:pt idx="0">
+                  <c:v>0.43</c:v>
+                </c:pt>
+              </c:numCache>
+            </c:numRef>
+          </c:val>
+        </c:ser>
+        <c:ser>
+          <c:idx val="3"/>
+          <c:order val="3"/>
+          <c:invertIfNegative val="0"/>
+          <c:val>
+            <c:numRef>
+              <c:f>Feuil1!$E$5</c:f>
+              <c:numCache>
+                <c:formatCode>General</c:formatCode>
+                <c:ptCount val="1"/>
+                <c:pt idx="0">
+                  <c:v>0.42</c:v>
+                </c:pt>
+              </c:numCache>
+            </c:numRef>
+          </c:val>
+        </c:ser>
+        <c:ser>
+          <c:idx val="4"/>
+          <c:order val="4"/>
+          <c:invertIfNegative val="0"/>
+          <c:val>
+            <c:numRef>
+              <c:f>Feuil1!$E$6</c:f>
+              <c:numCache>
+                <c:formatCode>General</c:formatCode>
+                <c:ptCount val="1"/>
+                <c:pt idx="0">
+                  <c:v>0.43</c:v>
+                </c:pt>
+              </c:numCache>
+            </c:numRef>
+          </c:val>
+        </c:ser>
+        <c:dLbls>
+          <c:showLegendKey val="0"/>
+          <c:showVal val="0"/>
+          <c:showCatName val="0"/>
+          <c:showSerName val="0"/>
+          <c:showPercent val="0"/>
+          <c:showBubbleSize val="0"/>
+        </c:dLbls>
+        <c:gapWidth val="150"/>
+        <c:axId val="795002472"/>
+        <c:axId val="795998392"/>
+      </c:barChart>
+      <c:catAx>
+        <c:axId val="795002472"/>
+        <c:scaling>
+          <c:orientation val="minMax"/>
+        </c:scaling>
+        <c:delete val="1"/>
+        <c:axPos val="b"/>
+        <c:majorTickMark val="out"/>
+        <c:minorTickMark val="none"/>
+        <c:tickLblPos val="nextTo"/>
+        <c:crossAx val="795998392"/>
+        <c:crosses val="autoZero"/>
+        <c:auto val="1"/>
+        <c:lblAlgn val="ctr"/>
+        <c:lblOffset val="100"/>
+        <c:noMultiLvlLbl val="0"/>
+      </c:catAx>
+      <c:valAx>
+        <c:axId val="795998392"/>
+        <c:scaling>
+          <c:orientation val="minMax"/>
+          <c:max val="1.0"/>
+        </c:scaling>
+        <c:delete val="0"/>
+        <c:axPos val="l"/>
+        <c:majorGridlines/>
+        <c:numFmt formatCode="General" sourceLinked="1"/>
+        <c:majorTickMark val="out"/>
+        <c:minorTickMark val="none"/>
+        <c:tickLblPos val="nextTo"/>
+        <c:crossAx val="795002472"/>
+        <c:crosses val="autoZero"/>
+        <c:crossBetween val="between"/>
+      </c:valAx>
+    </c:plotArea>
+    <c:plotVisOnly val="1"/>
+    <c:dispBlanksAs val="gap"/>
+    <c:showDLblsOverMax val="0"/>
+  </c:chart>
+  <c:txPr>
+    <a:bodyPr/>
+    <a:lstStyle/>
+    <a:p>
+      <a:pPr>
+        <a:defRPr sz="1800"/>
+      </a:pPr>
+      <a:endParaRPr lang="fr-FR"/>
+    </a:p>
+  </c:txPr>
+  <c:externalData r:id="rId1">
+    <c:autoUpdate val="0"/>
+  </c:externalData>
+</c:chartSpace>
+</file>
+
 <file path=ppt/diagrams/colors1.xml><?xml version="1.0" encoding="utf-8"?>
 <dgm:colorsDef xmlns:dgm="http://schemas.openxmlformats.org/drawingml/2006/diagram" xmlns:a="http://schemas.openxmlformats.org/drawingml/2006/main" uniqueId="urn:microsoft.com/office/officeart/2005/8/colors/colorful1">
   <dgm:title val=""/>
@@ -3582,6 +4171,753 @@
     <dgm:fillClrLst meth="repeat">
       <a:schemeClr val="accent2">
         <a:tint val="40000"/>
+      </a:schemeClr>
+    </dgm:fillClrLst>
+    <dgm:linClrLst meth="repeat">
+      <a:schemeClr val="lt1"/>
+    </dgm:linClrLst>
+    <dgm:effectClrLst/>
+    <dgm:txLinClrLst/>
+    <dgm:txFillClrLst meth="repeat">
+      <a:schemeClr val="dk1"/>
+    </dgm:txFillClrLst>
+    <dgm:txEffectClrLst/>
+  </dgm:styleLbl>
+  <dgm:styleLbl name="revTx">
+    <dgm:fillClrLst meth="repeat">
+      <a:schemeClr val="lt1">
+        <a:alpha val="0"/>
+      </a:schemeClr>
+    </dgm:fillClrLst>
+    <dgm:linClrLst meth="repeat">
+      <a:schemeClr val="dk1">
+        <a:alpha val="0"/>
+      </a:schemeClr>
+    </dgm:linClrLst>
+    <dgm:effectClrLst/>
+    <dgm:txLinClrLst/>
+    <dgm:txFillClrLst meth="repeat">
+      <a:schemeClr val="tx1"/>
+    </dgm:txFillClrLst>
+    <dgm:txEffectClrLst/>
+  </dgm:styleLbl>
+</dgm:colorsDef>
+</file>
+
+<file path=ppt/diagrams/colors5.xml><?xml version="1.0" encoding="utf-8"?>
+<dgm:colorsDef xmlns:dgm="http://schemas.openxmlformats.org/drawingml/2006/diagram" xmlns:a="http://schemas.openxmlformats.org/drawingml/2006/main" uniqueId="urn:microsoft.com/office/officeart/2005/8/colors/accent6_2">
+  <dgm:title val=""/>
+  <dgm:desc val=""/>
+  <dgm:catLst>
+    <dgm:cat type="accent6" pri="11200"/>
+  </dgm:catLst>
+  <dgm:styleLbl name="node0">
+    <dgm:fillClrLst meth="repeat">
+      <a:schemeClr val="accent6"/>
+    </dgm:fillClrLst>
+    <dgm:linClrLst meth="repeat">
+      <a:schemeClr val="lt1"/>
+    </dgm:linClrLst>
+    <dgm:effectClrLst/>
+    <dgm:txLinClrLst/>
+    <dgm:txFillClrLst/>
+    <dgm:txEffectClrLst/>
+  </dgm:styleLbl>
+  <dgm:styleLbl name="node1">
+    <dgm:fillClrLst meth="repeat">
+      <a:schemeClr val="accent6"/>
+    </dgm:fillClrLst>
+    <dgm:linClrLst meth="repeat">
+      <a:schemeClr val="lt1"/>
+    </dgm:linClrLst>
+    <dgm:effectClrLst/>
+    <dgm:txLinClrLst/>
+    <dgm:txFillClrLst/>
+    <dgm:txEffectClrLst/>
+  </dgm:styleLbl>
+  <dgm:styleLbl name="alignNode1">
+    <dgm:fillClrLst meth="repeat">
+      <a:schemeClr val="accent6"/>
+    </dgm:fillClrLst>
+    <dgm:linClrLst meth="repeat">
+      <a:schemeClr val="accent6"/>
+    </dgm:linClrLst>
+    <dgm:effectClrLst/>
+    <dgm:txLinClrLst/>
+    <dgm:txFillClrLst/>
+    <dgm:txEffectClrLst/>
+  </dgm:styleLbl>
+  <dgm:styleLbl name="lnNode1">
+    <dgm:fillClrLst meth="repeat">
+      <a:schemeClr val="accent6"/>
+    </dgm:fillClrLst>
+    <dgm:linClrLst meth="repeat">
+      <a:schemeClr val="lt1"/>
+    </dgm:linClrLst>
+    <dgm:effectClrLst/>
+    <dgm:txLinClrLst/>
+    <dgm:txFillClrLst/>
+    <dgm:txEffectClrLst/>
+  </dgm:styleLbl>
+  <dgm:styleLbl name="vennNode1">
+    <dgm:fillClrLst meth="repeat">
+      <a:schemeClr val="accent6">
+        <a:alpha val="50000"/>
+      </a:schemeClr>
+    </dgm:fillClrLst>
+    <dgm:linClrLst meth="repeat">
+      <a:schemeClr val="lt1"/>
+    </dgm:linClrLst>
+    <dgm:effectClrLst/>
+    <dgm:txLinClrLst/>
+    <dgm:txFillClrLst/>
+    <dgm:txEffectClrLst/>
+  </dgm:styleLbl>
+  <dgm:styleLbl name="node2">
+    <dgm:fillClrLst meth="repeat">
+      <a:schemeClr val="accent6"/>
+    </dgm:fillClrLst>
+    <dgm:linClrLst meth="repeat">
+      <a:schemeClr val="lt1"/>
+    </dgm:linClrLst>
+    <dgm:effectClrLst/>
+    <dgm:txLinClrLst/>
+    <dgm:txFillClrLst/>
+    <dgm:txEffectClrLst/>
+  </dgm:styleLbl>
+  <dgm:styleLbl name="node3">
+    <dgm:fillClrLst meth="repeat">
+      <a:schemeClr val="accent6"/>
+    </dgm:fillClrLst>
+    <dgm:linClrLst meth="repeat">
+      <a:schemeClr val="lt1"/>
+    </dgm:linClrLst>
+    <dgm:effectClrLst/>
+    <dgm:txLinClrLst/>
+    <dgm:txFillClrLst/>
+    <dgm:txEffectClrLst/>
+  </dgm:styleLbl>
+  <dgm:styleLbl name="node4">
+    <dgm:fillClrLst meth="repeat">
+      <a:schemeClr val="accent6"/>
+    </dgm:fillClrLst>
+    <dgm:linClrLst meth="repeat">
+      <a:schemeClr val="lt1"/>
+    </dgm:linClrLst>
+    <dgm:effectClrLst/>
+    <dgm:txLinClrLst/>
+    <dgm:txFillClrLst/>
+    <dgm:txEffectClrLst/>
+  </dgm:styleLbl>
+  <dgm:styleLbl name="fgImgPlace1">
+    <dgm:fillClrLst meth="repeat">
+      <a:schemeClr val="accent6">
+        <a:tint val="50000"/>
+      </a:schemeClr>
+    </dgm:fillClrLst>
+    <dgm:linClrLst meth="repeat">
+      <a:schemeClr val="lt1"/>
+    </dgm:linClrLst>
+    <dgm:effectClrLst/>
+    <dgm:txLinClrLst/>
+    <dgm:txFillClrLst meth="repeat">
+      <a:schemeClr val="lt1"/>
+    </dgm:txFillClrLst>
+    <dgm:txEffectClrLst/>
+  </dgm:styleLbl>
+  <dgm:styleLbl name="alignImgPlace1">
+    <dgm:fillClrLst meth="repeat">
+      <a:schemeClr val="accent6">
+        <a:tint val="50000"/>
+      </a:schemeClr>
+    </dgm:fillClrLst>
+    <dgm:linClrLst meth="repeat">
+      <a:schemeClr val="lt1"/>
+    </dgm:linClrLst>
+    <dgm:effectClrLst/>
+    <dgm:txLinClrLst/>
+    <dgm:txFillClrLst meth="repeat">
+      <a:schemeClr val="lt1"/>
+    </dgm:txFillClrLst>
+    <dgm:txEffectClrLst/>
+  </dgm:styleLbl>
+  <dgm:styleLbl name="bgImgPlace1">
+    <dgm:fillClrLst meth="repeat">
+      <a:schemeClr val="accent6">
+        <a:tint val="50000"/>
+      </a:schemeClr>
+    </dgm:fillClrLst>
+    <dgm:linClrLst meth="repeat">
+      <a:schemeClr val="lt1"/>
+    </dgm:linClrLst>
+    <dgm:effectClrLst/>
+    <dgm:txLinClrLst/>
+    <dgm:txFillClrLst meth="repeat">
+      <a:schemeClr val="lt1"/>
+    </dgm:txFillClrLst>
+    <dgm:txEffectClrLst/>
+  </dgm:styleLbl>
+  <dgm:styleLbl name="sibTrans2D1">
+    <dgm:fillClrLst meth="repeat">
+      <a:schemeClr val="accent6">
+        <a:tint val="60000"/>
+      </a:schemeClr>
+    </dgm:fillClrLst>
+    <dgm:linClrLst meth="repeat">
+      <a:schemeClr val="accent6">
+        <a:tint val="60000"/>
+      </a:schemeClr>
+    </dgm:linClrLst>
+    <dgm:effectClrLst/>
+    <dgm:txLinClrLst/>
+    <dgm:txFillClrLst/>
+    <dgm:txEffectClrLst/>
+  </dgm:styleLbl>
+  <dgm:styleLbl name="fgSibTrans2D1">
+    <dgm:fillClrLst meth="repeat">
+      <a:schemeClr val="accent6">
+        <a:tint val="60000"/>
+      </a:schemeClr>
+    </dgm:fillClrLst>
+    <dgm:linClrLst meth="repeat">
+      <a:schemeClr val="accent6">
+        <a:tint val="60000"/>
+      </a:schemeClr>
+    </dgm:linClrLst>
+    <dgm:effectClrLst/>
+    <dgm:txLinClrLst/>
+    <dgm:txFillClrLst/>
+    <dgm:txEffectClrLst/>
+  </dgm:styleLbl>
+  <dgm:styleLbl name="bgSibTrans2D1">
+    <dgm:fillClrLst meth="repeat">
+      <a:schemeClr val="accent6">
+        <a:tint val="60000"/>
+      </a:schemeClr>
+    </dgm:fillClrLst>
+    <dgm:linClrLst meth="repeat">
+      <a:schemeClr val="accent6">
+        <a:tint val="60000"/>
+      </a:schemeClr>
+    </dgm:linClrLst>
+    <dgm:effectClrLst/>
+    <dgm:txLinClrLst/>
+    <dgm:txFillClrLst/>
+    <dgm:txEffectClrLst/>
+  </dgm:styleLbl>
+  <dgm:styleLbl name="sibTrans1D1">
+    <dgm:fillClrLst meth="repeat">
+      <a:schemeClr val="accent6"/>
+    </dgm:fillClrLst>
+    <dgm:linClrLst meth="repeat">
+      <a:schemeClr val="accent6"/>
+    </dgm:linClrLst>
+    <dgm:effectClrLst/>
+    <dgm:txLinClrLst/>
+    <dgm:txFillClrLst meth="repeat">
+      <a:schemeClr val="tx1"/>
+    </dgm:txFillClrLst>
+    <dgm:txEffectClrLst/>
+  </dgm:styleLbl>
+  <dgm:styleLbl name="callout">
+    <dgm:fillClrLst meth="repeat">
+      <a:schemeClr val="accent6"/>
+    </dgm:fillClrLst>
+    <dgm:linClrLst meth="repeat">
+      <a:schemeClr val="accent6">
+        <a:tint val="50000"/>
+      </a:schemeClr>
+    </dgm:linClrLst>
+    <dgm:effectClrLst/>
+    <dgm:txLinClrLst/>
+    <dgm:txFillClrLst meth="repeat">
+      <a:schemeClr val="tx1"/>
+    </dgm:txFillClrLst>
+    <dgm:txEffectClrLst/>
+  </dgm:styleLbl>
+  <dgm:styleLbl name="asst0">
+    <dgm:fillClrLst meth="repeat">
+      <a:schemeClr val="accent6"/>
+    </dgm:fillClrLst>
+    <dgm:linClrLst meth="repeat">
+      <a:schemeClr val="lt1"/>
+    </dgm:linClrLst>
+    <dgm:effectClrLst/>
+    <dgm:txLinClrLst/>
+    <dgm:txFillClrLst/>
+    <dgm:txEffectClrLst/>
+  </dgm:styleLbl>
+  <dgm:styleLbl name="asst1">
+    <dgm:fillClrLst meth="repeat">
+      <a:schemeClr val="accent6"/>
+    </dgm:fillClrLst>
+    <dgm:linClrLst meth="repeat">
+      <a:schemeClr val="lt1"/>
+    </dgm:linClrLst>
+    <dgm:effectClrLst/>
+    <dgm:txLinClrLst/>
+    <dgm:txFillClrLst/>
+    <dgm:txEffectClrLst/>
+  </dgm:styleLbl>
+  <dgm:styleLbl name="asst2">
+    <dgm:fillClrLst meth="repeat">
+      <a:schemeClr val="accent6"/>
+    </dgm:fillClrLst>
+    <dgm:linClrLst meth="repeat">
+      <a:schemeClr val="lt1"/>
+    </dgm:linClrLst>
+    <dgm:effectClrLst/>
+    <dgm:txLinClrLst/>
+    <dgm:txFillClrLst/>
+    <dgm:txEffectClrLst/>
+  </dgm:styleLbl>
+  <dgm:styleLbl name="asst3">
+    <dgm:fillClrLst meth="repeat">
+      <a:schemeClr val="accent6"/>
+    </dgm:fillClrLst>
+    <dgm:linClrLst meth="repeat">
+      <a:schemeClr val="lt1"/>
+    </dgm:linClrLst>
+    <dgm:effectClrLst/>
+    <dgm:txLinClrLst/>
+    <dgm:txFillClrLst/>
+    <dgm:txEffectClrLst/>
+  </dgm:styleLbl>
+  <dgm:styleLbl name="asst4">
+    <dgm:fillClrLst meth="repeat">
+      <a:schemeClr val="accent6"/>
+    </dgm:fillClrLst>
+    <dgm:linClrLst meth="repeat">
+      <a:schemeClr val="lt1"/>
+    </dgm:linClrLst>
+    <dgm:effectClrLst/>
+    <dgm:txLinClrLst/>
+    <dgm:txFillClrLst/>
+    <dgm:txEffectClrLst/>
+  </dgm:styleLbl>
+  <dgm:styleLbl name="parChTrans2D1">
+    <dgm:fillClrLst meth="repeat">
+      <a:schemeClr val="accent6">
+        <a:tint val="60000"/>
+      </a:schemeClr>
+    </dgm:fillClrLst>
+    <dgm:linClrLst meth="repeat">
+      <a:schemeClr val="accent6">
+        <a:tint val="60000"/>
+      </a:schemeClr>
+    </dgm:linClrLst>
+    <dgm:effectClrLst/>
+    <dgm:txLinClrLst/>
+    <dgm:txFillClrLst meth="repeat">
+      <a:schemeClr val="lt1"/>
+    </dgm:txFillClrLst>
+    <dgm:txEffectClrLst/>
+  </dgm:styleLbl>
+  <dgm:styleLbl name="parChTrans2D2">
+    <dgm:fillClrLst meth="repeat">
+      <a:schemeClr val="accent6"/>
+    </dgm:fillClrLst>
+    <dgm:linClrLst meth="repeat">
+      <a:schemeClr val="accent6"/>
+    </dgm:linClrLst>
+    <dgm:effectClrLst/>
+    <dgm:txLinClrLst/>
+    <dgm:txFillClrLst meth="repeat">
+      <a:schemeClr val="lt1"/>
+    </dgm:txFillClrLst>
+    <dgm:txEffectClrLst/>
+  </dgm:styleLbl>
+  <dgm:styleLbl name="parChTrans2D3">
+    <dgm:fillClrLst meth="repeat">
+      <a:schemeClr val="accent6"/>
+    </dgm:fillClrLst>
+    <dgm:linClrLst meth="repeat">
+      <a:schemeClr val="accent6"/>
+    </dgm:linClrLst>
+    <dgm:effectClrLst/>
+    <dgm:txLinClrLst/>
+    <dgm:txFillClrLst meth="repeat">
+      <a:schemeClr val="lt1"/>
+    </dgm:txFillClrLst>
+    <dgm:txEffectClrLst/>
+  </dgm:styleLbl>
+  <dgm:styleLbl name="parChTrans2D4">
+    <dgm:fillClrLst meth="repeat">
+      <a:schemeClr val="accent6"/>
+    </dgm:fillClrLst>
+    <dgm:linClrLst meth="repeat">
+      <a:schemeClr val="accent6"/>
+    </dgm:linClrLst>
+    <dgm:effectClrLst/>
+    <dgm:txLinClrLst/>
+    <dgm:txFillClrLst meth="repeat">
+      <a:schemeClr val="lt1"/>
+    </dgm:txFillClrLst>
+    <dgm:txEffectClrLst/>
+  </dgm:styleLbl>
+  <dgm:styleLbl name="parChTrans1D1">
+    <dgm:fillClrLst meth="repeat">
+      <a:schemeClr val="accent6"/>
+    </dgm:fillClrLst>
+    <dgm:linClrLst meth="repeat">
+      <a:schemeClr val="accent6">
+        <a:shade val="60000"/>
+      </a:schemeClr>
+    </dgm:linClrLst>
+    <dgm:effectClrLst/>
+    <dgm:txLinClrLst/>
+    <dgm:txFillClrLst meth="repeat">
+      <a:schemeClr val="tx1"/>
+    </dgm:txFillClrLst>
+    <dgm:txEffectClrLst/>
+  </dgm:styleLbl>
+  <dgm:styleLbl name="parChTrans1D2">
+    <dgm:fillClrLst meth="repeat">
+      <a:schemeClr val="accent6"/>
+    </dgm:fillClrLst>
+    <dgm:linClrLst meth="repeat">
+      <a:schemeClr val="accent6">
+        <a:shade val="60000"/>
+      </a:schemeClr>
+    </dgm:linClrLst>
+    <dgm:effectClrLst/>
+    <dgm:txLinClrLst/>
+    <dgm:txFillClrLst meth="repeat">
+      <a:schemeClr val="tx1"/>
+    </dgm:txFillClrLst>
+    <dgm:txEffectClrLst/>
+  </dgm:styleLbl>
+  <dgm:styleLbl name="parChTrans1D3">
+    <dgm:fillClrLst meth="repeat">
+      <a:schemeClr val="accent6"/>
+    </dgm:fillClrLst>
+    <dgm:linClrLst meth="repeat">
+      <a:schemeClr val="accent6">
+        <a:shade val="80000"/>
+      </a:schemeClr>
+    </dgm:linClrLst>
+    <dgm:effectClrLst/>
+    <dgm:txLinClrLst/>
+    <dgm:txFillClrLst meth="repeat">
+      <a:schemeClr val="tx1"/>
+    </dgm:txFillClrLst>
+    <dgm:txEffectClrLst/>
+  </dgm:styleLbl>
+  <dgm:styleLbl name="parChTrans1D4">
+    <dgm:fillClrLst meth="repeat">
+      <a:schemeClr val="accent6"/>
+    </dgm:fillClrLst>
+    <dgm:linClrLst meth="repeat">
+      <a:schemeClr val="accent6">
+        <a:shade val="80000"/>
+      </a:schemeClr>
+    </dgm:linClrLst>
+    <dgm:effectClrLst/>
+    <dgm:txLinClrLst/>
+    <dgm:txFillClrLst meth="repeat">
+      <a:schemeClr val="tx1"/>
+    </dgm:txFillClrLst>
+    <dgm:txEffectClrLst/>
+  </dgm:styleLbl>
+  <dgm:styleLbl name="fgAcc1">
+    <dgm:fillClrLst meth="repeat">
+      <a:schemeClr val="lt1">
+        <a:alpha val="90000"/>
+      </a:schemeClr>
+    </dgm:fillClrLst>
+    <dgm:linClrLst meth="repeat">
+      <a:schemeClr val="accent6"/>
+    </dgm:linClrLst>
+    <dgm:effectClrLst/>
+    <dgm:txLinClrLst/>
+    <dgm:txFillClrLst meth="repeat">
+      <a:schemeClr val="dk1"/>
+    </dgm:txFillClrLst>
+    <dgm:txEffectClrLst/>
+  </dgm:styleLbl>
+  <dgm:styleLbl name="conFgAcc1">
+    <dgm:fillClrLst meth="repeat">
+      <a:schemeClr val="lt1">
+        <a:alpha val="90000"/>
+      </a:schemeClr>
+    </dgm:fillClrLst>
+    <dgm:linClrLst meth="repeat">
+      <a:schemeClr val="accent6"/>
+    </dgm:linClrLst>
+    <dgm:effectClrLst/>
+    <dgm:txLinClrLst/>
+    <dgm:txFillClrLst meth="repeat">
+      <a:schemeClr val="dk1"/>
+    </dgm:txFillClrLst>
+    <dgm:txEffectClrLst/>
+  </dgm:styleLbl>
+  <dgm:styleLbl name="alignAcc1">
+    <dgm:fillClrLst meth="repeat">
+      <a:schemeClr val="lt1">
+        <a:alpha val="90000"/>
+      </a:schemeClr>
+    </dgm:fillClrLst>
+    <dgm:linClrLst meth="repeat">
+      <a:schemeClr val="accent6"/>
+    </dgm:linClrLst>
+    <dgm:effectClrLst/>
+    <dgm:txLinClrLst/>
+    <dgm:txFillClrLst meth="repeat">
+      <a:schemeClr val="dk1"/>
+    </dgm:txFillClrLst>
+    <dgm:txEffectClrLst/>
+  </dgm:styleLbl>
+  <dgm:styleLbl name="trAlignAcc1">
+    <dgm:fillClrLst meth="repeat">
+      <a:schemeClr val="lt1">
+        <a:alpha val="40000"/>
+      </a:schemeClr>
+    </dgm:fillClrLst>
+    <dgm:linClrLst meth="repeat">
+      <a:schemeClr val="accent6"/>
+    </dgm:linClrLst>
+    <dgm:effectClrLst/>
+    <dgm:txLinClrLst/>
+    <dgm:txFillClrLst meth="repeat">
+      <a:schemeClr val="dk1"/>
+    </dgm:txFillClrLst>
+    <dgm:txEffectClrLst/>
+  </dgm:styleLbl>
+  <dgm:styleLbl name="bgAcc1">
+    <dgm:fillClrLst meth="repeat">
+      <a:schemeClr val="lt1">
+        <a:alpha val="90000"/>
+      </a:schemeClr>
+    </dgm:fillClrLst>
+    <dgm:linClrLst meth="repeat">
+      <a:schemeClr val="accent6"/>
+    </dgm:linClrLst>
+    <dgm:effectClrLst/>
+    <dgm:txLinClrLst/>
+    <dgm:txFillClrLst meth="repeat">
+      <a:schemeClr val="dk1"/>
+    </dgm:txFillClrLst>
+    <dgm:txEffectClrLst/>
+  </dgm:styleLbl>
+  <dgm:styleLbl name="solidFgAcc1">
+    <dgm:fillClrLst meth="repeat">
+      <a:schemeClr val="lt1"/>
+    </dgm:fillClrLst>
+    <dgm:linClrLst meth="repeat">
+      <a:schemeClr val="accent6"/>
+    </dgm:linClrLst>
+    <dgm:effectClrLst/>
+    <dgm:txLinClrLst/>
+    <dgm:txFillClrLst meth="repeat">
+      <a:schemeClr val="dk1"/>
+    </dgm:txFillClrLst>
+    <dgm:txEffectClrLst/>
+  </dgm:styleLbl>
+  <dgm:styleLbl name="solidAlignAcc1">
+    <dgm:fillClrLst meth="repeat">
+      <a:schemeClr val="lt1"/>
+    </dgm:fillClrLst>
+    <dgm:linClrLst meth="repeat">
+      <a:schemeClr val="accent6"/>
+    </dgm:linClrLst>
+    <dgm:effectClrLst/>
+    <dgm:txLinClrLst/>
+    <dgm:txFillClrLst meth="repeat">
+      <a:schemeClr val="dk1"/>
+    </dgm:txFillClrLst>
+    <dgm:txEffectClrLst/>
+  </dgm:styleLbl>
+  <dgm:styleLbl name="solidBgAcc1">
+    <dgm:fillClrLst meth="repeat">
+      <a:schemeClr val="lt1"/>
+    </dgm:fillClrLst>
+    <dgm:linClrLst meth="repeat">
+      <a:schemeClr val="accent6"/>
+    </dgm:linClrLst>
+    <dgm:effectClrLst/>
+    <dgm:txLinClrLst/>
+    <dgm:txFillClrLst meth="repeat">
+      <a:schemeClr val="dk1"/>
+    </dgm:txFillClrLst>
+    <dgm:txEffectClrLst/>
+  </dgm:styleLbl>
+  <dgm:styleLbl name="fgAccFollowNode1">
+    <dgm:fillClrLst meth="repeat">
+      <a:schemeClr val="accent6">
+        <a:alpha val="90000"/>
+        <a:tint val="40000"/>
+      </a:schemeClr>
+    </dgm:fillClrLst>
+    <dgm:linClrLst meth="repeat">
+      <a:schemeClr val="accent6">
+        <a:alpha val="90000"/>
+        <a:tint val="40000"/>
+      </a:schemeClr>
+    </dgm:linClrLst>
+    <dgm:effectClrLst/>
+    <dgm:txLinClrLst/>
+    <dgm:txFillClrLst meth="repeat">
+      <a:schemeClr val="dk1"/>
+    </dgm:txFillClrLst>
+    <dgm:txEffectClrLst/>
+  </dgm:styleLbl>
+  <dgm:styleLbl name="alignAccFollowNode1">
+    <dgm:fillClrLst meth="repeat">
+      <a:schemeClr val="accent6">
+        <a:alpha val="90000"/>
+        <a:tint val="40000"/>
+      </a:schemeClr>
+    </dgm:fillClrLst>
+    <dgm:linClrLst meth="repeat">
+      <a:schemeClr val="accent6">
+        <a:alpha val="90000"/>
+        <a:tint val="40000"/>
+      </a:schemeClr>
+    </dgm:linClrLst>
+    <dgm:effectClrLst/>
+    <dgm:txLinClrLst/>
+    <dgm:txFillClrLst meth="repeat">
+      <a:schemeClr val="dk1"/>
+    </dgm:txFillClrLst>
+    <dgm:txEffectClrLst/>
+  </dgm:styleLbl>
+  <dgm:styleLbl name="bgAccFollowNode1">
+    <dgm:fillClrLst meth="repeat">
+      <a:schemeClr val="accent6">
+        <a:alpha val="90000"/>
+        <a:tint val="40000"/>
+      </a:schemeClr>
+    </dgm:fillClrLst>
+    <dgm:linClrLst meth="repeat">
+      <a:schemeClr val="accent6">
+        <a:alpha val="90000"/>
+        <a:tint val="40000"/>
+      </a:schemeClr>
+    </dgm:linClrLst>
+    <dgm:effectClrLst/>
+    <dgm:txLinClrLst/>
+    <dgm:txFillClrLst meth="repeat">
+      <a:schemeClr val="dk1"/>
+    </dgm:txFillClrLst>
+    <dgm:txEffectClrLst/>
+  </dgm:styleLbl>
+  <dgm:styleLbl name="fgAcc0">
+    <dgm:fillClrLst meth="repeat">
+      <a:schemeClr val="lt1">
+        <a:alpha val="90000"/>
+      </a:schemeClr>
+    </dgm:fillClrLst>
+    <dgm:linClrLst meth="repeat">
+      <a:schemeClr val="accent6"/>
+    </dgm:linClrLst>
+    <dgm:effectClrLst/>
+    <dgm:txLinClrLst/>
+    <dgm:txFillClrLst meth="repeat">
+      <a:schemeClr val="dk1"/>
+    </dgm:txFillClrLst>
+    <dgm:txEffectClrLst/>
+  </dgm:styleLbl>
+  <dgm:styleLbl name="fgAcc2">
+    <dgm:fillClrLst meth="repeat">
+      <a:schemeClr val="lt1">
+        <a:alpha val="90000"/>
+      </a:schemeClr>
+    </dgm:fillClrLst>
+    <dgm:linClrLst meth="repeat">
+      <a:schemeClr val="accent6"/>
+    </dgm:linClrLst>
+    <dgm:effectClrLst/>
+    <dgm:txLinClrLst/>
+    <dgm:txFillClrLst meth="repeat">
+      <a:schemeClr val="dk1"/>
+    </dgm:txFillClrLst>
+    <dgm:txEffectClrLst/>
+  </dgm:styleLbl>
+  <dgm:styleLbl name="fgAcc3">
+    <dgm:fillClrLst meth="repeat">
+      <a:schemeClr val="lt1">
+        <a:alpha val="90000"/>
+      </a:schemeClr>
+    </dgm:fillClrLst>
+    <dgm:linClrLst meth="repeat">
+      <a:schemeClr val="accent6"/>
+    </dgm:linClrLst>
+    <dgm:effectClrLst/>
+    <dgm:txLinClrLst/>
+    <dgm:txFillClrLst meth="repeat">
+      <a:schemeClr val="dk1"/>
+    </dgm:txFillClrLst>
+    <dgm:txEffectClrLst/>
+  </dgm:styleLbl>
+  <dgm:styleLbl name="fgAcc4">
+    <dgm:fillClrLst meth="repeat">
+      <a:schemeClr val="lt1">
+        <a:alpha val="90000"/>
+      </a:schemeClr>
+    </dgm:fillClrLst>
+    <dgm:linClrLst meth="repeat">
+      <a:schemeClr val="accent6"/>
+    </dgm:linClrLst>
+    <dgm:effectClrLst/>
+    <dgm:txLinClrLst/>
+    <dgm:txFillClrLst meth="repeat">
+      <a:schemeClr val="dk1"/>
+    </dgm:txFillClrLst>
+    <dgm:txEffectClrLst/>
+  </dgm:styleLbl>
+  <dgm:styleLbl name="bgShp">
+    <dgm:fillClrLst meth="repeat">
+      <a:schemeClr val="accent6">
+        <a:tint val="40000"/>
+      </a:schemeClr>
+    </dgm:fillClrLst>
+    <dgm:linClrLst meth="repeat">
+      <a:schemeClr val="accent6"/>
+    </dgm:linClrLst>
+    <dgm:effectClrLst/>
+    <dgm:txLinClrLst/>
+    <dgm:txFillClrLst meth="repeat">
+      <a:schemeClr val="dk1"/>
+    </dgm:txFillClrLst>
+    <dgm:txEffectClrLst/>
+  </dgm:styleLbl>
+  <dgm:styleLbl name="dkBgShp">
+    <dgm:fillClrLst meth="repeat">
+      <a:schemeClr val="accent6">
+        <a:shade val="80000"/>
+      </a:schemeClr>
+    </dgm:fillClrLst>
+    <dgm:linClrLst meth="repeat">
+      <a:schemeClr val="accent6"/>
+    </dgm:linClrLst>
+    <dgm:effectClrLst/>
+    <dgm:txLinClrLst/>
+    <dgm:txFillClrLst meth="repeat">
+      <a:schemeClr val="lt1"/>
+    </dgm:txFillClrLst>
+    <dgm:txEffectClrLst/>
+  </dgm:styleLbl>
+  <dgm:styleLbl name="trBgShp">
+    <dgm:fillClrLst meth="repeat">
+      <a:schemeClr val="accent6">
+        <a:tint val="50000"/>
+        <a:alpha val="40000"/>
+      </a:schemeClr>
+    </dgm:fillClrLst>
+    <dgm:linClrLst meth="repeat">
+      <a:schemeClr val="accent6"/>
+    </dgm:linClrLst>
+    <dgm:effectClrLst/>
+    <dgm:txLinClrLst/>
+    <dgm:txFillClrLst meth="repeat">
+      <a:schemeClr val="lt1"/>
+    </dgm:txFillClrLst>
+    <dgm:txEffectClrLst/>
+  </dgm:styleLbl>
+  <dgm:styleLbl name="fgShp">
+    <dgm:fillClrLst meth="repeat">
+      <a:schemeClr val="accent6">
+        <a:tint val="60000"/>
       </a:schemeClr>
     </dgm:fillClrLst>
     <dgm:linClrLst meth="repeat">
@@ -3892,8 +5228,8 @@
     <dgm:cxn modelId="{FB24229D-F128-C94E-A53F-E4D9947AA7A9}" srcId="{6E1EF25A-EA91-324F-BA31-5FB61AC305DA}" destId="{B6720EF4-713A-484F-94DF-908CB53E425B}" srcOrd="1" destOrd="0" parTransId="{BC437838-509D-D246-82EE-239AA00B11E8}" sibTransId="{A1C450C7-927C-1D47-8B13-9DF95C748CE0}"/>
     <dgm:cxn modelId="{B8634F88-F4A9-7944-AFCF-1B6B728C0739}" srcId="{6E1EF25A-EA91-324F-BA31-5FB61AC305DA}" destId="{8ED093CB-CEBF-7C49-841E-081037ABFDE3}" srcOrd="2" destOrd="0" parTransId="{82ED0E7C-CCB5-7A43-89CF-A6B14DD4D399}" sibTransId="{08F9E10A-A0AF-0D45-8759-7B8705B837EC}"/>
     <dgm:cxn modelId="{86F674C2-8193-3B41-9DA4-78F03068165F}" type="presOf" srcId="{B6720EF4-713A-484F-94DF-908CB53E425B}" destId="{A7949E75-05CE-7A4D-9DAC-3BCB6F9EB6B7}" srcOrd="0" destOrd="0" presId="urn:microsoft.com/office/officeart/2005/8/layout/vList2"/>
+    <dgm:cxn modelId="{CFCBBB15-9DE3-D545-A3EC-68AEE38ADAF2}" type="presOf" srcId="{6E1EF25A-EA91-324F-BA31-5FB61AC305DA}" destId="{FFEC9BA8-619E-6A41-8B64-86D24FA694A3}" srcOrd="0" destOrd="0" presId="urn:microsoft.com/office/officeart/2005/8/layout/vList2"/>
     <dgm:cxn modelId="{782070D3-D676-CD40-8AAC-0FCF0028A6D0}" type="presOf" srcId="{8ED093CB-CEBF-7C49-841E-081037ABFDE3}" destId="{0A3270C1-0948-6949-B6F0-925C86DE534A}" srcOrd="0" destOrd="0" presId="urn:microsoft.com/office/officeart/2005/8/layout/vList2"/>
-    <dgm:cxn modelId="{CFCBBB15-9DE3-D545-A3EC-68AEE38ADAF2}" type="presOf" srcId="{6E1EF25A-EA91-324F-BA31-5FB61AC305DA}" destId="{FFEC9BA8-619E-6A41-8B64-86D24FA694A3}" srcOrd="0" destOrd="0" presId="urn:microsoft.com/office/officeart/2005/8/layout/vList2"/>
     <dgm:cxn modelId="{74F5B130-8924-9940-818A-530291503AB3}" srcId="{6E1EF25A-EA91-324F-BA31-5FB61AC305DA}" destId="{A286A66A-2BD3-C548-8539-837FAFD4DAB5}" srcOrd="0" destOrd="0" parTransId="{43CB14DB-CE83-934C-8FAA-48FE9172D3CD}" sibTransId="{E031B658-9CD7-E04C-A08F-C56D2699E7F7}"/>
     <dgm:cxn modelId="{B152F784-BE5E-E747-BBF7-42558005AFA2}" type="presOf" srcId="{A286A66A-2BD3-C548-8539-837FAFD4DAB5}" destId="{8C998940-6021-B949-BB5D-51AD0B68B5E5}" srcOrd="0" destOrd="0" presId="urn:microsoft.com/office/officeart/2005/8/layout/vList2"/>
     <dgm:cxn modelId="{FD8975B7-9DB5-8844-813C-56A855EA631E}" type="presParOf" srcId="{FFEC9BA8-619E-6A41-8B64-86D24FA694A3}" destId="{8C998940-6021-B949-BB5D-51AD0B68B5E5}" srcOrd="0" destOrd="0" presId="urn:microsoft.com/office/officeart/2005/8/layout/vList2"/>
@@ -4729,15 +6065,752 @@
     <dgm:cxn modelId="{66557D24-CD3B-2948-B214-04F1EC5AB9C2}" srcId="{27CF8AF4-81BF-F140-9334-5D096806725F}" destId="{BFF31090-F768-C24A-8A7E-C1419549EF9B}" srcOrd="1" destOrd="0" parTransId="{22208C70-EE89-F947-BD24-5A99BC22D914}" sibTransId="{B8D6644B-B886-8F4B-AEF9-31B470CC10A4}"/>
     <dgm:cxn modelId="{7C06D7AD-EE71-BD49-A015-5D7093F55891}" srcId="{126903CF-C144-EA44-B50D-F84752A4D077}" destId="{27CF8AF4-81BF-F140-9334-5D096806725F}" srcOrd="0" destOrd="0" parTransId="{DE182C5B-0B89-F04D-9868-E0A55CFA1724}" sibTransId="{ED4144B4-999B-6047-83B4-D20B3121E802}"/>
     <dgm:cxn modelId="{8E6492A7-8EFE-5942-8685-94107A6E3775}" type="presOf" srcId="{6A6A662D-5529-2244-B664-7B782709F6A9}" destId="{2586F37A-A6D2-9E46-9371-A2B0E321609E}" srcOrd="0" destOrd="0" presId="urn:microsoft.com/office/officeart/2005/8/layout/radial4"/>
+    <dgm:cxn modelId="{EBD770E1-1525-3148-A828-8043C3974A55}" type="presOf" srcId="{A0306818-5637-5F47-84BA-4A476CA4B8A8}" destId="{86EF111C-13C9-F74E-AF5A-93965323A67C}" srcOrd="0" destOrd="0" presId="urn:microsoft.com/office/officeart/2005/8/layout/radial4"/>
+    <dgm:cxn modelId="{DE30B137-7EA8-FB40-BA4A-66873CAFB538}" type="presOf" srcId="{22208C70-EE89-F947-BD24-5A99BC22D914}" destId="{5C0B962A-2132-8649-B6E3-B3780C409FCA}" srcOrd="0" destOrd="0" presId="urn:microsoft.com/office/officeart/2005/8/layout/radial4"/>
     <dgm:cxn modelId="{2646AF9F-D790-4942-B53E-B8348DDCAD32}" type="presOf" srcId="{27CF8AF4-81BF-F140-9334-5D096806725F}" destId="{FCD4CC7E-E394-F443-ACCE-3B188E842BFC}" srcOrd="0" destOrd="0" presId="urn:microsoft.com/office/officeart/2005/8/layout/radial4"/>
-    <dgm:cxn modelId="{DE30B137-7EA8-FB40-BA4A-66873CAFB538}" type="presOf" srcId="{22208C70-EE89-F947-BD24-5A99BC22D914}" destId="{5C0B962A-2132-8649-B6E3-B3780C409FCA}" srcOrd="0" destOrd="0" presId="urn:microsoft.com/office/officeart/2005/8/layout/radial4"/>
-    <dgm:cxn modelId="{EBD770E1-1525-3148-A828-8043C3974A55}" type="presOf" srcId="{A0306818-5637-5F47-84BA-4A476CA4B8A8}" destId="{86EF111C-13C9-F74E-AF5A-93965323A67C}" srcOrd="0" destOrd="0" presId="urn:microsoft.com/office/officeart/2005/8/layout/radial4"/>
     <dgm:cxn modelId="{22EA686C-80F2-EF4D-9318-75C52091D86A}" type="presOf" srcId="{126903CF-C144-EA44-B50D-F84752A4D077}" destId="{85D2A334-1144-794D-85AF-6844ADE641A7}" srcOrd="0" destOrd="0" presId="urn:microsoft.com/office/officeart/2005/8/layout/radial4"/>
     <dgm:cxn modelId="{AA556243-A9A5-1D4F-94DB-2CA5E1B8E935}" type="presParOf" srcId="{85D2A334-1144-794D-85AF-6844ADE641A7}" destId="{FCD4CC7E-E394-F443-ACCE-3B188E842BFC}" srcOrd="0" destOrd="0" presId="urn:microsoft.com/office/officeart/2005/8/layout/radial4"/>
     <dgm:cxn modelId="{AD1E8FC0-6638-AE46-ACD4-9443CF92F815}" type="presParOf" srcId="{85D2A334-1144-794D-85AF-6844ADE641A7}" destId="{86EF111C-13C9-F74E-AF5A-93965323A67C}" srcOrd="1" destOrd="0" presId="urn:microsoft.com/office/officeart/2005/8/layout/radial4"/>
     <dgm:cxn modelId="{665E8790-EE73-A74B-97DA-6EF6FBEDE11E}" type="presParOf" srcId="{85D2A334-1144-794D-85AF-6844ADE641A7}" destId="{2586F37A-A6D2-9E46-9371-A2B0E321609E}" srcOrd="2" destOrd="0" presId="urn:microsoft.com/office/officeart/2005/8/layout/radial4"/>
     <dgm:cxn modelId="{6FA91395-664A-564F-9AEA-D4DCB2EC940D}" type="presParOf" srcId="{85D2A334-1144-794D-85AF-6844ADE641A7}" destId="{5C0B962A-2132-8649-B6E3-B3780C409FCA}" srcOrd="3" destOrd="0" presId="urn:microsoft.com/office/officeart/2005/8/layout/radial4"/>
     <dgm:cxn modelId="{69257EAC-A3EE-4F41-A02C-989E9C367549}" type="presParOf" srcId="{85D2A334-1144-794D-85AF-6844ADE641A7}" destId="{3C4990A5-C564-4348-977A-A0911EC46AAC}" srcOrd="4" destOrd="0" presId="urn:microsoft.com/office/officeart/2005/8/layout/radial4"/>
+  </dgm:cxnLst>
+  <dgm:bg/>
+  <dgm:whole/>
+  <dgm:extLst>
+    <a:ext uri="http://schemas.microsoft.com/office/drawing/2008/diagram">
+      <dsp:dataModelExt xmlns:dsp="http://schemas.microsoft.com/office/drawing/2008/diagram" relId="rId6" minVer="http://schemas.openxmlformats.org/drawingml/2006/diagram"/>
+    </a:ext>
+  </dgm:extLst>
+</dgm:dataModel>
+</file>
+
+<file path=ppt/diagrams/data5.xml><?xml version="1.0" encoding="utf-8"?>
+<dgm:dataModel xmlns:dgm="http://schemas.openxmlformats.org/drawingml/2006/diagram" xmlns:a="http://schemas.openxmlformats.org/drawingml/2006/main">
+  <dgm:ptLst>
+    <dgm:pt modelId="{D07E8C82-D9B1-604B-8D01-F2403A6101C6}" type="doc">
+      <dgm:prSet loTypeId="urn:microsoft.com/office/officeart/2005/8/layout/lProcess2" loCatId="" qsTypeId="urn:microsoft.com/office/officeart/2005/8/quickstyle/simple4" qsCatId="simple" csTypeId="urn:microsoft.com/office/officeart/2005/8/colors/accent6_2" csCatId="accent6" phldr="1"/>
+      <dgm:spPr/>
+      <dgm:t>
+        <a:bodyPr/>
+        <a:lstStyle/>
+        <a:p>
+          <a:endParaRPr lang="fr-FR"/>
+        </a:p>
+      </dgm:t>
+    </dgm:pt>
+    <dgm:pt modelId="{C1A49D56-1F22-ED4E-895B-6D15CADE4BB0}">
+      <dgm:prSet phldrT="[Texte]"/>
+      <dgm:spPr/>
+      <dgm:t>
+        <a:bodyPr/>
+        <a:lstStyle/>
+        <a:p>
+          <a:endParaRPr lang="fr-FR" baseline="-25000" dirty="0" smtClean="0"/>
+        </a:p>
+      </dgm:t>
+    </dgm:pt>
+    <dgm:pt modelId="{B9FF25F3-9D24-9D43-8A4D-374932598AB5}" type="parTrans" cxnId="{C5EDC29F-82F2-D944-803A-1F2997748557}">
+      <dgm:prSet/>
+      <dgm:spPr/>
+      <dgm:t>
+        <a:bodyPr/>
+        <a:lstStyle/>
+        <a:p>
+          <a:endParaRPr lang="fr-FR"/>
+        </a:p>
+      </dgm:t>
+    </dgm:pt>
+    <dgm:pt modelId="{08D7612B-933A-FC4F-A211-25363A714A1D}" type="sibTrans" cxnId="{C5EDC29F-82F2-D944-803A-1F2997748557}">
+      <dgm:prSet/>
+      <dgm:spPr/>
+      <dgm:t>
+        <a:bodyPr/>
+        <a:lstStyle/>
+        <a:p>
+          <a:endParaRPr lang="fr-FR"/>
+        </a:p>
+      </dgm:t>
+    </dgm:pt>
+    <dgm:pt modelId="{BCA48D97-F993-A848-888C-92EA52AA13DA}">
+      <dgm:prSet/>
+      <dgm:spPr/>
+      <dgm:t>
+        <a:bodyPr/>
+        <a:lstStyle/>
+        <a:p>
+          <a:r>
+            <a:rPr lang="en-US" dirty="0" smtClean="0">
+              <a:latin typeface="Calibri" charset="0"/>
+              <a:cs typeface="Calibri" charset="0"/>
+            </a:rPr>
+            <a:t>Observations</a:t>
+          </a:r>
+        </a:p>
+      </dgm:t>
+    </dgm:pt>
+    <dgm:pt modelId="{3AE91CC7-3DA3-4042-B742-90CD9340EEC6}" type="parTrans" cxnId="{D9CBE86C-BDF0-144A-98F9-B8B4FFAA1EE1}">
+      <dgm:prSet/>
+      <dgm:spPr/>
+      <dgm:t>
+        <a:bodyPr/>
+        <a:lstStyle/>
+        <a:p>
+          <a:endParaRPr lang="fr-FR"/>
+        </a:p>
+      </dgm:t>
+    </dgm:pt>
+    <dgm:pt modelId="{FB59BE92-8FDB-7145-B4E6-B6B830868E21}" type="sibTrans" cxnId="{D9CBE86C-BDF0-144A-98F9-B8B4FFAA1EE1}">
+      <dgm:prSet/>
+      <dgm:spPr/>
+      <dgm:t>
+        <a:bodyPr/>
+        <a:lstStyle/>
+        <a:p>
+          <a:endParaRPr lang="fr-FR"/>
+        </a:p>
+      </dgm:t>
+    </dgm:pt>
+    <dgm:pt modelId="{186A5415-67F6-5D47-BE77-4386BFF742BD}">
+      <dgm:prSet/>
+      <dgm:spPr/>
+      <dgm:t>
+        <a:bodyPr/>
+        <a:lstStyle/>
+        <a:p>
+          <a:endParaRPr lang="en-US" dirty="0">
+            <a:latin typeface="Calibri" charset="0"/>
+            <a:cs typeface="Calibri" charset="0"/>
+          </a:endParaRPr>
+        </a:p>
+      </dgm:t>
+    </dgm:pt>
+    <dgm:pt modelId="{9D0AE7EE-062F-E446-9F7E-B09D7BB1D1A9}" type="parTrans" cxnId="{CAABA5D1-29CF-9B42-AB85-3A794CF4B817}">
+      <dgm:prSet/>
+      <dgm:spPr/>
+      <dgm:t>
+        <a:bodyPr/>
+        <a:lstStyle/>
+        <a:p>
+          <a:endParaRPr lang="fr-FR"/>
+        </a:p>
+      </dgm:t>
+    </dgm:pt>
+    <dgm:pt modelId="{0D61667C-1059-9F4A-ACA8-B96078897443}" type="sibTrans" cxnId="{CAABA5D1-29CF-9B42-AB85-3A794CF4B817}">
+      <dgm:prSet/>
+      <dgm:spPr/>
+      <dgm:t>
+        <a:bodyPr/>
+        <a:lstStyle/>
+        <a:p>
+          <a:endParaRPr lang="fr-FR"/>
+        </a:p>
+      </dgm:t>
+    </dgm:pt>
+    <dgm:pt modelId="{28D82C95-F7CB-424C-B43E-49082CC740A6}">
+      <dgm:prSet/>
+      <dgm:spPr/>
+      <dgm:t>
+        <a:bodyPr/>
+        <a:lstStyle/>
+        <a:p>
+          <a:r>
+            <a:rPr lang="en-US" dirty="0" smtClean="0">
+              <a:latin typeface="Calibri" charset="0"/>
+              <a:cs typeface="Calibri" charset="0"/>
+            </a:rPr>
+            <a:t>Observations</a:t>
+          </a:r>
+        </a:p>
+      </dgm:t>
+    </dgm:pt>
+    <dgm:pt modelId="{7670C22C-41AA-EE4A-9E43-A3FB97BCB431}" type="parTrans" cxnId="{52FA4953-D66E-514C-B0BA-213CA42598C1}">
+      <dgm:prSet/>
+      <dgm:spPr/>
+      <dgm:t>
+        <a:bodyPr/>
+        <a:lstStyle/>
+        <a:p>
+          <a:endParaRPr lang="fr-FR"/>
+        </a:p>
+      </dgm:t>
+    </dgm:pt>
+    <dgm:pt modelId="{9D2A7982-1AFF-FF4D-9AED-CDB99FE7EB12}" type="sibTrans" cxnId="{52FA4953-D66E-514C-B0BA-213CA42598C1}">
+      <dgm:prSet/>
+      <dgm:spPr/>
+      <dgm:t>
+        <a:bodyPr/>
+        <a:lstStyle/>
+        <a:p>
+          <a:endParaRPr lang="fr-FR"/>
+        </a:p>
+      </dgm:t>
+    </dgm:pt>
+    <dgm:pt modelId="{7FB4EAB6-6DFD-264D-909C-0696E95799E8}">
+      <dgm:prSet>
+        <dgm:style>
+          <a:lnRef idx="2">
+            <a:schemeClr val="accent2">
+              <a:shade val="50000"/>
+            </a:schemeClr>
+          </a:lnRef>
+          <a:fillRef idx="1">
+            <a:schemeClr val="accent2"/>
+          </a:fillRef>
+          <a:effectRef idx="0">
+            <a:schemeClr val="accent2"/>
+          </a:effectRef>
+          <a:fontRef idx="minor">
+            <a:schemeClr val="lt1"/>
+          </a:fontRef>
+        </dgm:style>
+      </dgm:prSet>
+      <dgm:spPr/>
+      <dgm:t>
+        <a:bodyPr/>
+        <a:lstStyle/>
+        <a:p>
+          <a:r>
+            <a:rPr lang="en-US" dirty="0" smtClean="0">
+              <a:latin typeface="Calibri" charset="0"/>
+              <a:cs typeface="Calibri" charset="0"/>
+            </a:rPr>
+            <a:t>1st guess</a:t>
+          </a:r>
+          <a:br>
+            <a:rPr lang="en-US" dirty="0" smtClean="0">
+              <a:latin typeface="Calibri" charset="0"/>
+              <a:cs typeface="Calibri" charset="0"/>
+            </a:rPr>
+          </a:br>
+          <a:r>
+            <a:rPr lang="en-US" dirty="0" smtClean="0">
+              <a:latin typeface="Calibri" charset="0"/>
+              <a:cs typeface="Calibri" charset="0"/>
+            </a:rPr>
+            <a:t>(SST &amp; OWS)</a:t>
+          </a:r>
+        </a:p>
+      </dgm:t>
+    </dgm:pt>
+    <dgm:pt modelId="{979551CD-62C8-734B-A41C-7642D5AF956B}" type="parTrans" cxnId="{285977F3-D0FF-3742-B60E-5435BBF3657F}">
+      <dgm:prSet/>
+      <dgm:spPr/>
+      <dgm:t>
+        <a:bodyPr/>
+        <a:lstStyle/>
+        <a:p>
+          <a:endParaRPr lang="fr-FR"/>
+        </a:p>
+      </dgm:t>
+    </dgm:pt>
+    <dgm:pt modelId="{0BE76A57-498C-5D4E-8ECF-B3D0CAAB8D08}" type="sibTrans" cxnId="{285977F3-D0FF-3742-B60E-5435BBF3657F}">
+      <dgm:prSet/>
+      <dgm:spPr/>
+      <dgm:t>
+        <a:bodyPr/>
+        <a:lstStyle/>
+        <a:p>
+          <a:endParaRPr lang="fr-FR"/>
+        </a:p>
+      </dgm:t>
+    </dgm:pt>
+    <dgm:pt modelId="{0F04E154-55A5-D140-9FF3-9640EBC84348}">
+      <dgm:prSet/>
+      <dgm:spPr/>
+      <dgm:t>
+        <a:bodyPr/>
+        <a:lstStyle/>
+        <a:p>
+          <a:endParaRPr lang="en-US" dirty="0">
+            <a:latin typeface="Calibri" charset="0"/>
+            <a:cs typeface="Calibri" charset="0"/>
+          </a:endParaRPr>
+        </a:p>
+      </dgm:t>
+    </dgm:pt>
+    <dgm:pt modelId="{F6D1EE9D-6568-F143-9865-2657A25640E8}" type="parTrans" cxnId="{1F849B00-5726-A544-B00C-9CECDD4B43A6}">
+      <dgm:prSet/>
+      <dgm:spPr/>
+      <dgm:t>
+        <a:bodyPr/>
+        <a:lstStyle/>
+        <a:p>
+          <a:endParaRPr lang="fr-FR"/>
+        </a:p>
+      </dgm:t>
+    </dgm:pt>
+    <dgm:pt modelId="{89AEB81C-033F-9F4D-B0E9-39DE91F63279}" type="sibTrans" cxnId="{1F849B00-5726-A544-B00C-9CECDD4B43A6}">
+      <dgm:prSet/>
+      <dgm:spPr/>
+      <dgm:t>
+        <a:bodyPr/>
+        <a:lstStyle/>
+        <a:p>
+          <a:endParaRPr lang="fr-FR"/>
+        </a:p>
+      </dgm:t>
+    </dgm:pt>
+    <dgm:pt modelId="{918108B7-DC53-1645-A72E-C9CBCE69EF85}">
+      <dgm:prSet/>
+      <dgm:spPr/>
+      <dgm:t>
+        <a:bodyPr/>
+        <a:lstStyle/>
+        <a:p>
+          <a:r>
+            <a:rPr lang="en-US" dirty="0" smtClean="0">
+              <a:latin typeface="Calibri" charset="0"/>
+              <a:cs typeface="Calibri" charset="0"/>
+            </a:rPr>
+            <a:t>Observations</a:t>
+          </a:r>
+        </a:p>
+      </dgm:t>
+    </dgm:pt>
+    <dgm:pt modelId="{DAE3EF56-671A-7944-B966-D10FA752D2CE}" type="parTrans" cxnId="{894F8169-D355-F147-ACF2-99CB8F75BE3A}">
+      <dgm:prSet/>
+      <dgm:spPr/>
+      <dgm:t>
+        <a:bodyPr/>
+        <a:lstStyle/>
+        <a:p>
+          <a:endParaRPr lang="fr-FR"/>
+        </a:p>
+      </dgm:t>
+    </dgm:pt>
+    <dgm:pt modelId="{BF9B60FC-50E5-9B4D-B522-43D31A524DB2}" type="sibTrans" cxnId="{894F8169-D355-F147-ACF2-99CB8F75BE3A}">
+      <dgm:prSet/>
+      <dgm:spPr/>
+      <dgm:t>
+        <a:bodyPr/>
+        <a:lstStyle/>
+        <a:p>
+          <a:endParaRPr lang="fr-FR"/>
+        </a:p>
+      </dgm:t>
+    </dgm:pt>
+    <dgm:pt modelId="{434ED303-EE13-0244-B282-94DF45D1A5D5}">
+      <dgm:prSet>
+        <dgm:style>
+          <a:lnRef idx="2">
+            <a:schemeClr val="accent4">
+              <a:shade val="50000"/>
+            </a:schemeClr>
+          </a:lnRef>
+          <a:fillRef idx="1">
+            <a:schemeClr val="accent4"/>
+          </a:fillRef>
+          <a:effectRef idx="0">
+            <a:schemeClr val="accent4"/>
+          </a:effectRef>
+          <a:fontRef idx="minor">
+            <a:schemeClr val="lt1"/>
+          </a:fontRef>
+        </dgm:style>
+      </dgm:prSet>
+      <dgm:spPr/>
+      <dgm:t>
+        <a:bodyPr/>
+        <a:lstStyle/>
+        <a:p>
+          <a:r>
+            <a:rPr lang="en-US" dirty="0" smtClean="0">
+              <a:latin typeface="Calibri" charset="0"/>
+              <a:cs typeface="Calibri" charset="0"/>
+            </a:rPr>
+            <a:t>Inversion </a:t>
+          </a:r>
+          <a:r>
+            <a:rPr lang="en-US" dirty="0" err="1" smtClean="0">
+              <a:latin typeface="Calibri" charset="0"/>
+              <a:cs typeface="Calibri" charset="0"/>
+            </a:rPr>
+            <a:t>lin</a:t>
+          </a:r>
+          <a:r>
+            <a:rPr lang="en-US" dirty="0" err="1" smtClean="0">
+              <a:latin typeface="Calibri" charset="0"/>
+              <a:cs typeface="Calibri" charset="0"/>
+            </a:rPr>
+            <a:t>éaire</a:t>
+          </a:r>
+          <a:endParaRPr lang="en-US" dirty="0" smtClean="0">
+            <a:latin typeface="Calibri" charset="0"/>
+            <a:cs typeface="Calibri" charset="0"/>
+          </a:endParaRPr>
+        </a:p>
+      </dgm:t>
+    </dgm:pt>
+    <dgm:pt modelId="{2204D63A-B4F9-3D40-ABA7-5AF678F08BC7}" type="parTrans" cxnId="{EC3B8D9C-AD56-934A-A187-6D1105B8CEA8}">
+      <dgm:prSet/>
+      <dgm:spPr/>
+      <dgm:t>
+        <a:bodyPr/>
+        <a:lstStyle/>
+        <a:p>
+          <a:endParaRPr lang="fr-FR"/>
+        </a:p>
+      </dgm:t>
+    </dgm:pt>
+    <dgm:pt modelId="{64AFA0E6-05A1-A743-BEE3-D7D823119B10}" type="sibTrans" cxnId="{EC3B8D9C-AD56-934A-A187-6D1105B8CEA8}">
+      <dgm:prSet/>
+      <dgm:spPr/>
+      <dgm:t>
+        <a:bodyPr/>
+        <a:lstStyle/>
+        <a:p>
+          <a:endParaRPr lang="fr-FR"/>
+        </a:p>
+      </dgm:t>
+    </dgm:pt>
+    <dgm:pt modelId="{A2A3EC8A-9A40-E042-8F5E-0D11E371AC88}" type="pres">
+      <dgm:prSet presAssocID="{D07E8C82-D9B1-604B-8D01-F2403A6101C6}" presName="theList" presStyleCnt="0">
+        <dgm:presLayoutVars>
+          <dgm:dir/>
+          <dgm:animLvl val="lvl"/>
+          <dgm:resizeHandles val="exact"/>
+        </dgm:presLayoutVars>
+      </dgm:prSet>
+      <dgm:spPr/>
+      <dgm:t>
+        <a:bodyPr/>
+        <a:lstStyle/>
+        <a:p>
+          <a:endParaRPr lang="fr-FR"/>
+        </a:p>
+      </dgm:t>
+    </dgm:pt>
+    <dgm:pt modelId="{0C1FDFC5-E3C2-3943-A2CF-4FBF124EDE82}" type="pres">
+      <dgm:prSet presAssocID="{C1A49D56-1F22-ED4E-895B-6D15CADE4BB0}" presName="compNode" presStyleCnt="0"/>
+      <dgm:spPr/>
+      <dgm:t>
+        <a:bodyPr/>
+        <a:lstStyle/>
+        <a:p>
+          <a:endParaRPr lang="fr-FR"/>
+        </a:p>
+      </dgm:t>
+    </dgm:pt>
+    <dgm:pt modelId="{1B40B60A-C481-8C45-8400-4C57F14FF9C2}" type="pres">
+      <dgm:prSet presAssocID="{C1A49D56-1F22-ED4E-895B-6D15CADE4BB0}" presName="aNode" presStyleLbl="bgShp" presStyleIdx="0" presStyleCnt="3"/>
+      <dgm:spPr/>
+      <dgm:t>
+        <a:bodyPr/>
+        <a:lstStyle/>
+        <a:p>
+          <a:endParaRPr lang="fr-FR"/>
+        </a:p>
+      </dgm:t>
+    </dgm:pt>
+    <dgm:pt modelId="{0F3DFD7C-99C8-9048-8F9C-5FD5BAA84F84}" type="pres">
+      <dgm:prSet presAssocID="{C1A49D56-1F22-ED4E-895B-6D15CADE4BB0}" presName="textNode" presStyleLbl="bgShp" presStyleIdx="0" presStyleCnt="3"/>
+      <dgm:spPr/>
+      <dgm:t>
+        <a:bodyPr/>
+        <a:lstStyle/>
+        <a:p>
+          <a:endParaRPr lang="fr-FR"/>
+        </a:p>
+      </dgm:t>
+    </dgm:pt>
+    <dgm:pt modelId="{842E86C2-146D-6946-B2FB-8CD686353EE6}" type="pres">
+      <dgm:prSet presAssocID="{C1A49D56-1F22-ED4E-895B-6D15CADE4BB0}" presName="compChildNode" presStyleCnt="0"/>
+      <dgm:spPr/>
+      <dgm:t>
+        <a:bodyPr/>
+        <a:lstStyle/>
+        <a:p>
+          <a:endParaRPr lang="fr-FR"/>
+        </a:p>
+      </dgm:t>
+    </dgm:pt>
+    <dgm:pt modelId="{D8A7ADD8-0253-984B-8A6B-D1CF63F5AC48}" type="pres">
+      <dgm:prSet presAssocID="{C1A49D56-1F22-ED4E-895B-6D15CADE4BB0}" presName="theInnerList" presStyleCnt="0"/>
+      <dgm:spPr/>
+      <dgm:t>
+        <a:bodyPr/>
+        <a:lstStyle/>
+        <a:p>
+          <a:endParaRPr lang="fr-FR"/>
+        </a:p>
+      </dgm:t>
+    </dgm:pt>
+    <dgm:pt modelId="{D8E2F626-07C3-3F40-BD95-D7C9EEC93518}" type="pres">
+      <dgm:prSet presAssocID="{BCA48D97-F993-A848-888C-92EA52AA13DA}" presName="childNode" presStyleLbl="node1" presStyleIdx="0" presStyleCnt="5">
+        <dgm:presLayoutVars>
+          <dgm:bulletEnabled val="1"/>
+        </dgm:presLayoutVars>
+      </dgm:prSet>
+      <dgm:spPr/>
+      <dgm:t>
+        <a:bodyPr/>
+        <a:lstStyle/>
+        <a:p>
+          <a:endParaRPr lang="fr-FR"/>
+        </a:p>
+      </dgm:t>
+    </dgm:pt>
+    <dgm:pt modelId="{C1E2F39F-B91B-E84A-B45F-6E1D177DAAC4}" type="pres">
+      <dgm:prSet presAssocID="{C1A49D56-1F22-ED4E-895B-6D15CADE4BB0}" presName="aSpace" presStyleCnt="0"/>
+      <dgm:spPr/>
+      <dgm:t>
+        <a:bodyPr/>
+        <a:lstStyle/>
+        <a:p>
+          <a:endParaRPr lang="fr-FR"/>
+        </a:p>
+      </dgm:t>
+    </dgm:pt>
+    <dgm:pt modelId="{27D1D443-B8D0-D346-A0FF-F1E2AE36E73B}" type="pres">
+      <dgm:prSet presAssocID="{186A5415-67F6-5D47-BE77-4386BFF742BD}" presName="compNode" presStyleCnt="0"/>
+      <dgm:spPr/>
+      <dgm:t>
+        <a:bodyPr/>
+        <a:lstStyle/>
+        <a:p>
+          <a:endParaRPr lang="fr-FR"/>
+        </a:p>
+      </dgm:t>
+    </dgm:pt>
+    <dgm:pt modelId="{42755303-DA40-A94F-8851-C173A9EE3663}" type="pres">
+      <dgm:prSet presAssocID="{186A5415-67F6-5D47-BE77-4386BFF742BD}" presName="aNode" presStyleLbl="bgShp" presStyleIdx="1" presStyleCnt="3"/>
+      <dgm:spPr/>
+      <dgm:t>
+        <a:bodyPr/>
+        <a:lstStyle/>
+        <a:p>
+          <a:endParaRPr lang="fr-FR"/>
+        </a:p>
+      </dgm:t>
+    </dgm:pt>
+    <dgm:pt modelId="{D044CC92-44E4-9D4B-A86E-D12043DFA3E3}" type="pres">
+      <dgm:prSet presAssocID="{186A5415-67F6-5D47-BE77-4386BFF742BD}" presName="textNode" presStyleLbl="bgShp" presStyleIdx="1" presStyleCnt="3"/>
+      <dgm:spPr/>
+      <dgm:t>
+        <a:bodyPr/>
+        <a:lstStyle/>
+        <a:p>
+          <a:endParaRPr lang="fr-FR"/>
+        </a:p>
+      </dgm:t>
+    </dgm:pt>
+    <dgm:pt modelId="{EF093F5A-CCCC-7B40-9C38-C52A2A0C988C}" type="pres">
+      <dgm:prSet presAssocID="{186A5415-67F6-5D47-BE77-4386BFF742BD}" presName="compChildNode" presStyleCnt="0"/>
+      <dgm:spPr/>
+      <dgm:t>
+        <a:bodyPr/>
+        <a:lstStyle/>
+        <a:p>
+          <a:endParaRPr lang="fr-FR"/>
+        </a:p>
+      </dgm:t>
+    </dgm:pt>
+    <dgm:pt modelId="{CE1A1FDA-7306-4C4F-B0A5-52BF97542A95}" type="pres">
+      <dgm:prSet presAssocID="{186A5415-67F6-5D47-BE77-4386BFF742BD}" presName="theInnerList" presStyleCnt="0"/>
+      <dgm:spPr/>
+      <dgm:t>
+        <a:bodyPr/>
+        <a:lstStyle/>
+        <a:p>
+          <a:endParaRPr lang="fr-FR"/>
+        </a:p>
+      </dgm:t>
+    </dgm:pt>
+    <dgm:pt modelId="{955F2586-C46F-9E42-B73B-7149BD6A7BF8}" type="pres">
+      <dgm:prSet presAssocID="{28D82C95-F7CB-424C-B43E-49082CC740A6}" presName="childNode" presStyleLbl="node1" presStyleIdx="1" presStyleCnt="5">
+        <dgm:presLayoutVars>
+          <dgm:bulletEnabled val="1"/>
+        </dgm:presLayoutVars>
+      </dgm:prSet>
+      <dgm:spPr/>
+      <dgm:t>
+        <a:bodyPr/>
+        <a:lstStyle/>
+        <a:p>
+          <a:endParaRPr lang="fr-FR"/>
+        </a:p>
+      </dgm:t>
+    </dgm:pt>
+    <dgm:pt modelId="{AA9DF839-0AD5-8546-BAB2-DCCA8F5D13B7}" type="pres">
+      <dgm:prSet presAssocID="{28D82C95-F7CB-424C-B43E-49082CC740A6}" presName="aSpace2" presStyleCnt="0"/>
+      <dgm:spPr/>
+      <dgm:t>
+        <a:bodyPr/>
+        <a:lstStyle/>
+        <a:p>
+          <a:endParaRPr lang="fr-FR"/>
+        </a:p>
+      </dgm:t>
+    </dgm:pt>
+    <dgm:pt modelId="{35915673-825B-9A44-BD68-C0991C072291}" type="pres">
+      <dgm:prSet presAssocID="{7FB4EAB6-6DFD-264D-909C-0696E95799E8}" presName="childNode" presStyleLbl="node1" presStyleIdx="2" presStyleCnt="5">
+        <dgm:presLayoutVars>
+          <dgm:bulletEnabled val="1"/>
+        </dgm:presLayoutVars>
+      </dgm:prSet>
+      <dgm:spPr/>
+      <dgm:t>
+        <a:bodyPr/>
+        <a:lstStyle/>
+        <a:p>
+          <a:endParaRPr lang="fr-FR"/>
+        </a:p>
+      </dgm:t>
+    </dgm:pt>
+    <dgm:pt modelId="{8B7B2D8D-3EEC-1343-A83E-FE6CB6F217AF}" type="pres">
+      <dgm:prSet presAssocID="{186A5415-67F6-5D47-BE77-4386BFF742BD}" presName="aSpace" presStyleCnt="0"/>
+      <dgm:spPr/>
+      <dgm:t>
+        <a:bodyPr/>
+        <a:lstStyle/>
+        <a:p>
+          <a:endParaRPr lang="fr-FR"/>
+        </a:p>
+      </dgm:t>
+    </dgm:pt>
+    <dgm:pt modelId="{C1B1E0CC-35D9-B347-9A59-77721EEA9FCE}" type="pres">
+      <dgm:prSet presAssocID="{0F04E154-55A5-D140-9FF3-9640EBC84348}" presName="compNode" presStyleCnt="0"/>
+      <dgm:spPr/>
+      <dgm:t>
+        <a:bodyPr/>
+        <a:lstStyle/>
+        <a:p>
+          <a:endParaRPr lang="fr-FR"/>
+        </a:p>
+      </dgm:t>
+    </dgm:pt>
+    <dgm:pt modelId="{751186F6-2ACB-474B-9310-70AE672DC432}" type="pres">
+      <dgm:prSet presAssocID="{0F04E154-55A5-D140-9FF3-9640EBC84348}" presName="aNode" presStyleLbl="bgShp" presStyleIdx="2" presStyleCnt="3"/>
+      <dgm:spPr/>
+      <dgm:t>
+        <a:bodyPr/>
+        <a:lstStyle/>
+        <a:p>
+          <a:endParaRPr lang="fr-FR"/>
+        </a:p>
+      </dgm:t>
+    </dgm:pt>
+    <dgm:pt modelId="{FF6B81BE-D923-B646-B9D8-5C7ACA92FC5F}" type="pres">
+      <dgm:prSet presAssocID="{0F04E154-55A5-D140-9FF3-9640EBC84348}" presName="textNode" presStyleLbl="bgShp" presStyleIdx="2" presStyleCnt="3"/>
+      <dgm:spPr/>
+      <dgm:t>
+        <a:bodyPr/>
+        <a:lstStyle/>
+        <a:p>
+          <a:endParaRPr lang="fr-FR"/>
+        </a:p>
+      </dgm:t>
+    </dgm:pt>
+    <dgm:pt modelId="{D0F828A7-27AA-F845-8B19-DA31C105DD34}" type="pres">
+      <dgm:prSet presAssocID="{0F04E154-55A5-D140-9FF3-9640EBC84348}" presName="compChildNode" presStyleCnt="0"/>
+      <dgm:spPr/>
+      <dgm:t>
+        <a:bodyPr/>
+        <a:lstStyle/>
+        <a:p>
+          <a:endParaRPr lang="fr-FR"/>
+        </a:p>
+      </dgm:t>
+    </dgm:pt>
+    <dgm:pt modelId="{33E6F2EA-08DA-084E-A06A-A037E901529D}" type="pres">
+      <dgm:prSet presAssocID="{0F04E154-55A5-D140-9FF3-9640EBC84348}" presName="theInnerList" presStyleCnt="0"/>
+      <dgm:spPr/>
+      <dgm:t>
+        <a:bodyPr/>
+        <a:lstStyle/>
+        <a:p>
+          <a:endParaRPr lang="fr-FR"/>
+        </a:p>
+      </dgm:t>
+    </dgm:pt>
+    <dgm:pt modelId="{FE8F009B-6790-F44D-A37F-BF836BFFEE87}" type="pres">
+      <dgm:prSet presAssocID="{918108B7-DC53-1645-A72E-C9CBCE69EF85}" presName="childNode" presStyleLbl="node1" presStyleIdx="3" presStyleCnt="5">
+        <dgm:presLayoutVars>
+          <dgm:bulletEnabled val="1"/>
+        </dgm:presLayoutVars>
+      </dgm:prSet>
+      <dgm:spPr/>
+      <dgm:t>
+        <a:bodyPr/>
+        <a:lstStyle/>
+        <a:p>
+          <a:endParaRPr lang="fr-FR"/>
+        </a:p>
+      </dgm:t>
+    </dgm:pt>
+    <dgm:pt modelId="{C2C7473B-17E4-D142-8F7D-3F60C3884547}" type="pres">
+      <dgm:prSet presAssocID="{918108B7-DC53-1645-A72E-C9CBCE69EF85}" presName="aSpace2" presStyleCnt="0"/>
+      <dgm:spPr/>
+      <dgm:t>
+        <a:bodyPr/>
+        <a:lstStyle/>
+        <a:p>
+          <a:endParaRPr lang="fr-FR"/>
+        </a:p>
+      </dgm:t>
+    </dgm:pt>
+    <dgm:pt modelId="{BBB5C65B-FB96-DA43-933D-76D1E0615ED3}" type="pres">
+      <dgm:prSet presAssocID="{434ED303-EE13-0244-B282-94DF45D1A5D5}" presName="childNode" presStyleLbl="node1" presStyleIdx="4" presStyleCnt="5">
+        <dgm:presLayoutVars>
+          <dgm:bulletEnabled val="1"/>
+        </dgm:presLayoutVars>
+      </dgm:prSet>
+      <dgm:spPr/>
+      <dgm:t>
+        <a:bodyPr/>
+        <a:lstStyle/>
+        <a:p>
+          <a:endParaRPr lang="fr-FR"/>
+        </a:p>
+      </dgm:t>
+    </dgm:pt>
+  </dgm:ptLst>
+  <dgm:cxnLst>
+    <dgm:cxn modelId="{A07FC1DA-1462-744F-A99E-A006F366968D}" type="presOf" srcId="{0F04E154-55A5-D140-9FF3-9640EBC84348}" destId="{751186F6-2ACB-474B-9310-70AE672DC432}" srcOrd="0" destOrd="0" presId="urn:microsoft.com/office/officeart/2005/8/layout/lProcess2"/>
+    <dgm:cxn modelId="{565EA53F-02D1-244C-9F80-011BD630C9B6}" type="presOf" srcId="{C1A49D56-1F22-ED4E-895B-6D15CADE4BB0}" destId="{1B40B60A-C481-8C45-8400-4C57F14FF9C2}" srcOrd="0" destOrd="0" presId="urn:microsoft.com/office/officeart/2005/8/layout/lProcess2"/>
+    <dgm:cxn modelId="{CAABA5D1-29CF-9B42-AB85-3A794CF4B817}" srcId="{D07E8C82-D9B1-604B-8D01-F2403A6101C6}" destId="{186A5415-67F6-5D47-BE77-4386BFF742BD}" srcOrd="1" destOrd="0" parTransId="{9D0AE7EE-062F-E446-9F7E-B09D7BB1D1A9}" sibTransId="{0D61667C-1059-9F4A-ACA8-B96078897443}"/>
+    <dgm:cxn modelId="{ABE51BAE-1A5D-A647-8D7D-9AFC45566B43}" type="presOf" srcId="{186A5415-67F6-5D47-BE77-4386BFF742BD}" destId="{42755303-DA40-A94F-8851-C173A9EE3663}" srcOrd="0" destOrd="0" presId="urn:microsoft.com/office/officeart/2005/8/layout/lProcess2"/>
+    <dgm:cxn modelId="{149E714E-3D2E-F448-8487-7DD39CED1406}" type="presOf" srcId="{0F04E154-55A5-D140-9FF3-9640EBC84348}" destId="{FF6B81BE-D923-B646-B9D8-5C7ACA92FC5F}" srcOrd="1" destOrd="0" presId="urn:microsoft.com/office/officeart/2005/8/layout/lProcess2"/>
+    <dgm:cxn modelId="{585646BD-8356-DC4E-A706-BDCAB9B2C442}" type="presOf" srcId="{7FB4EAB6-6DFD-264D-909C-0696E95799E8}" destId="{35915673-825B-9A44-BD68-C0991C072291}" srcOrd="0" destOrd="0" presId="urn:microsoft.com/office/officeart/2005/8/layout/lProcess2"/>
+    <dgm:cxn modelId="{C5EDC29F-82F2-D944-803A-1F2997748557}" srcId="{D07E8C82-D9B1-604B-8D01-F2403A6101C6}" destId="{C1A49D56-1F22-ED4E-895B-6D15CADE4BB0}" srcOrd="0" destOrd="0" parTransId="{B9FF25F3-9D24-9D43-8A4D-374932598AB5}" sibTransId="{08D7612B-933A-FC4F-A211-25363A714A1D}"/>
+    <dgm:cxn modelId="{8F8E1319-142A-A948-8FED-A10B3A810ACB}" type="presOf" srcId="{186A5415-67F6-5D47-BE77-4386BFF742BD}" destId="{D044CC92-44E4-9D4B-A86E-D12043DFA3E3}" srcOrd="1" destOrd="0" presId="urn:microsoft.com/office/officeart/2005/8/layout/lProcess2"/>
+    <dgm:cxn modelId="{0C8AA78C-F720-7345-AAB9-A005AB8942A8}" type="presOf" srcId="{C1A49D56-1F22-ED4E-895B-6D15CADE4BB0}" destId="{0F3DFD7C-99C8-9048-8F9C-5FD5BAA84F84}" srcOrd="1" destOrd="0" presId="urn:microsoft.com/office/officeart/2005/8/layout/lProcess2"/>
+    <dgm:cxn modelId="{CAD97109-ED35-C945-9797-562F643C7B68}" type="presOf" srcId="{BCA48D97-F993-A848-888C-92EA52AA13DA}" destId="{D8E2F626-07C3-3F40-BD95-D7C9EEC93518}" srcOrd="0" destOrd="0" presId="urn:microsoft.com/office/officeart/2005/8/layout/lProcess2"/>
+    <dgm:cxn modelId="{1F849B00-5726-A544-B00C-9CECDD4B43A6}" srcId="{D07E8C82-D9B1-604B-8D01-F2403A6101C6}" destId="{0F04E154-55A5-D140-9FF3-9640EBC84348}" srcOrd="2" destOrd="0" parTransId="{F6D1EE9D-6568-F143-9865-2657A25640E8}" sibTransId="{89AEB81C-033F-9F4D-B0E9-39DE91F63279}"/>
+    <dgm:cxn modelId="{71878A0F-6417-7743-8E90-AE3A1B8DCE16}" type="presOf" srcId="{28D82C95-F7CB-424C-B43E-49082CC740A6}" destId="{955F2586-C46F-9E42-B73B-7149BD6A7BF8}" srcOrd="0" destOrd="0" presId="urn:microsoft.com/office/officeart/2005/8/layout/lProcess2"/>
+    <dgm:cxn modelId="{C9F6642F-D36D-3E43-9B42-80B15F138ED2}" type="presOf" srcId="{918108B7-DC53-1645-A72E-C9CBCE69EF85}" destId="{FE8F009B-6790-F44D-A37F-BF836BFFEE87}" srcOrd="0" destOrd="0" presId="urn:microsoft.com/office/officeart/2005/8/layout/lProcess2"/>
+    <dgm:cxn modelId="{894F8169-D355-F147-ACF2-99CB8F75BE3A}" srcId="{0F04E154-55A5-D140-9FF3-9640EBC84348}" destId="{918108B7-DC53-1645-A72E-C9CBCE69EF85}" srcOrd="0" destOrd="0" parTransId="{DAE3EF56-671A-7944-B966-D10FA752D2CE}" sibTransId="{BF9B60FC-50E5-9B4D-B522-43D31A524DB2}"/>
+    <dgm:cxn modelId="{D9CBE86C-BDF0-144A-98F9-B8B4FFAA1EE1}" srcId="{C1A49D56-1F22-ED4E-895B-6D15CADE4BB0}" destId="{BCA48D97-F993-A848-888C-92EA52AA13DA}" srcOrd="0" destOrd="0" parTransId="{3AE91CC7-3DA3-4042-B742-90CD9340EEC6}" sibTransId="{FB59BE92-8FDB-7145-B4E6-B6B830868E21}"/>
+    <dgm:cxn modelId="{EC3B8D9C-AD56-934A-A187-6D1105B8CEA8}" srcId="{0F04E154-55A5-D140-9FF3-9640EBC84348}" destId="{434ED303-EE13-0244-B282-94DF45D1A5D5}" srcOrd="1" destOrd="0" parTransId="{2204D63A-B4F9-3D40-ABA7-5AF678F08BC7}" sibTransId="{64AFA0E6-05A1-A743-BEE3-D7D823119B10}"/>
+    <dgm:cxn modelId="{CC78BB43-E982-4044-92B8-671D21C4101D}" type="presOf" srcId="{D07E8C82-D9B1-604B-8D01-F2403A6101C6}" destId="{A2A3EC8A-9A40-E042-8F5E-0D11E371AC88}" srcOrd="0" destOrd="0" presId="urn:microsoft.com/office/officeart/2005/8/layout/lProcess2"/>
+    <dgm:cxn modelId="{52FA4953-D66E-514C-B0BA-213CA42598C1}" srcId="{186A5415-67F6-5D47-BE77-4386BFF742BD}" destId="{28D82C95-F7CB-424C-B43E-49082CC740A6}" srcOrd="0" destOrd="0" parTransId="{7670C22C-41AA-EE4A-9E43-A3FB97BCB431}" sibTransId="{9D2A7982-1AFF-FF4D-9AED-CDB99FE7EB12}"/>
+    <dgm:cxn modelId="{285977F3-D0FF-3742-B60E-5435BBF3657F}" srcId="{186A5415-67F6-5D47-BE77-4386BFF742BD}" destId="{7FB4EAB6-6DFD-264D-909C-0696E95799E8}" srcOrd="1" destOrd="0" parTransId="{979551CD-62C8-734B-A41C-7642D5AF956B}" sibTransId="{0BE76A57-498C-5D4E-8ECF-B3D0CAAB8D08}"/>
+    <dgm:cxn modelId="{A0AABF65-254C-A24F-A54E-4C8BB97C899F}" type="presOf" srcId="{434ED303-EE13-0244-B282-94DF45D1A5D5}" destId="{BBB5C65B-FB96-DA43-933D-76D1E0615ED3}" srcOrd="0" destOrd="0" presId="urn:microsoft.com/office/officeart/2005/8/layout/lProcess2"/>
+    <dgm:cxn modelId="{9747EC79-E6A0-6C4D-B87F-EF2727827948}" type="presParOf" srcId="{A2A3EC8A-9A40-E042-8F5E-0D11E371AC88}" destId="{0C1FDFC5-E3C2-3943-A2CF-4FBF124EDE82}" srcOrd="0" destOrd="0" presId="urn:microsoft.com/office/officeart/2005/8/layout/lProcess2"/>
+    <dgm:cxn modelId="{85BE23FF-4969-B949-AA60-7C4FEC6EAC01}" type="presParOf" srcId="{0C1FDFC5-E3C2-3943-A2CF-4FBF124EDE82}" destId="{1B40B60A-C481-8C45-8400-4C57F14FF9C2}" srcOrd="0" destOrd="0" presId="urn:microsoft.com/office/officeart/2005/8/layout/lProcess2"/>
+    <dgm:cxn modelId="{2BA86587-74B5-2E46-B5B7-FF62763C14E4}" type="presParOf" srcId="{0C1FDFC5-E3C2-3943-A2CF-4FBF124EDE82}" destId="{0F3DFD7C-99C8-9048-8F9C-5FD5BAA84F84}" srcOrd="1" destOrd="0" presId="urn:microsoft.com/office/officeart/2005/8/layout/lProcess2"/>
+    <dgm:cxn modelId="{E1FB3161-7263-3642-83F1-841C2816F05E}" type="presParOf" srcId="{0C1FDFC5-E3C2-3943-A2CF-4FBF124EDE82}" destId="{842E86C2-146D-6946-B2FB-8CD686353EE6}" srcOrd="2" destOrd="0" presId="urn:microsoft.com/office/officeart/2005/8/layout/lProcess2"/>
+    <dgm:cxn modelId="{816328D5-4345-F948-A6C2-8FCC0F1F84D2}" type="presParOf" srcId="{842E86C2-146D-6946-B2FB-8CD686353EE6}" destId="{D8A7ADD8-0253-984B-8A6B-D1CF63F5AC48}" srcOrd="0" destOrd="0" presId="urn:microsoft.com/office/officeart/2005/8/layout/lProcess2"/>
+    <dgm:cxn modelId="{DFE5BF8A-1265-CD4A-B8F2-AE63842177AE}" type="presParOf" srcId="{D8A7ADD8-0253-984B-8A6B-D1CF63F5AC48}" destId="{D8E2F626-07C3-3F40-BD95-D7C9EEC93518}" srcOrd="0" destOrd="0" presId="urn:microsoft.com/office/officeart/2005/8/layout/lProcess2"/>
+    <dgm:cxn modelId="{B6C4A996-AD8A-C940-AD7D-704E9F356EB1}" type="presParOf" srcId="{A2A3EC8A-9A40-E042-8F5E-0D11E371AC88}" destId="{C1E2F39F-B91B-E84A-B45F-6E1D177DAAC4}" srcOrd="1" destOrd="0" presId="urn:microsoft.com/office/officeart/2005/8/layout/lProcess2"/>
+    <dgm:cxn modelId="{2B345DFC-B30C-FF45-9139-6D5078986818}" type="presParOf" srcId="{A2A3EC8A-9A40-E042-8F5E-0D11E371AC88}" destId="{27D1D443-B8D0-D346-A0FF-F1E2AE36E73B}" srcOrd="2" destOrd="0" presId="urn:microsoft.com/office/officeart/2005/8/layout/lProcess2"/>
+    <dgm:cxn modelId="{3A3F481D-230E-AA48-BC51-4CC531F55D55}" type="presParOf" srcId="{27D1D443-B8D0-D346-A0FF-F1E2AE36E73B}" destId="{42755303-DA40-A94F-8851-C173A9EE3663}" srcOrd="0" destOrd="0" presId="urn:microsoft.com/office/officeart/2005/8/layout/lProcess2"/>
+    <dgm:cxn modelId="{B944629A-A62D-B345-84C9-F14EA38BD4DA}" type="presParOf" srcId="{27D1D443-B8D0-D346-A0FF-F1E2AE36E73B}" destId="{D044CC92-44E4-9D4B-A86E-D12043DFA3E3}" srcOrd="1" destOrd="0" presId="urn:microsoft.com/office/officeart/2005/8/layout/lProcess2"/>
+    <dgm:cxn modelId="{417C3797-70A4-8446-8200-F5248298F884}" type="presParOf" srcId="{27D1D443-B8D0-D346-A0FF-F1E2AE36E73B}" destId="{EF093F5A-CCCC-7B40-9C38-C52A2A0C988C}" srcOrd="2" destOrd="0" presId="urn:microsoft.com/office/officeart/2005/8/layout/lProcess2"/>
+    <dgm:cxn modelId="{3372FE42-C789-4443-8078-F2BEAC12D0D2}" type="presParOf" srcId="{EF093F5A-CCCC-7B40-9C38-C52A2A0C988C}" destId="{CE1A1FDA-7306-4C4F-B0A5-52BF97542A95}" srcOrd="0" destOrd="0" presId="urn:microsoft.com/office/officeart/2005/8/layout/lProcess2"/>
+    <dgm:cxn modelId="{EC3017F8-3C6A-EA48-8BF3-9FAD18A40CA4}" type="presParOf" srcId="{CE1A1FDA-7306-4C4F-B0A5-52BF97542A95}" destId="{955F2586-C46F-9E42-B73B-7149BD6A7BF8}" srcOrd="0" destOrd="0" presId="urn:microsoft.com/office/officeart/2005/8/layout/lProcess2"/>
+    <dgm:cxn modelId="{9AECFFA9-39CD-B44C-B8EE-E08551BD129E}" type="presParOf" srcId="{CE1A1FDA-7306-4C4F-B0A5-52BF97542A95}" destId="{AA9DF839-0AD5-8546-BAB2-DCCA8F5D13B7}" srcOrd="1" destOrd="0" presId="urn:microsoft.com/office/officeart/2005/8/layout/lProcess2"/>
+    <dgm:cxn modelId="{8B8A384A-2478-F540-BCC6-CCBAAAAC54F5}" type="presParOf" srcId="{CE1A1FDA-7306-4C4F-B0A5-52BF97542A95}" destId="{35915673-825B-9A44-BD68-C0991C072291}" srcOrd="2" destOrd="0" presId="urn:microsoft.com/office/officeart/2005/8/layout/lProcess2"/>
+    <dgm:cxn modelId="{6DCF2D6D-18E3-144B-B90A-F7DD00795C72}" type="presParOf" srcId="{A2A3EC8A-9A40-E042-8F5E-0D11E371AC88}" destId="{8B7B2D8D-3EEC-1343-A83E-FE6CB6F217AF}" srcOrd="3" destOrd="0" presId="urn:microsoft.com/office/officeart/2005/8/layout/lProcess2"/>
+    <dgm:cxn modelId="{A68E9B18-8A38-C447-A762-CF2212B358B1}" type="presParOf" srcId="{A2A3EC8A-9A40-E042-8F5E-0D11E371AC88}" destId="{C1B1E0CC-35D9-B347-9A59-77721EEA9FCE}" srcOrd="4" destOrd="0" presId="urn:microsoft.com/office/officeart/2005/8/layout/lProcess2"/>
+    <dgm:cxn modelId="{B803562E-5C84-1A4D-831A-E9DAD25D7B3B}" type="presParOf" srcId="{C1B1E0CC-35D9-B347-9A59-77721EEA9FCE}" destId="{751186F6-2ACB-474B-9310-70AE672DC432}" srcOrd="0" destOrd="0" presId="urn:microsoft.com/office/officeart/2005/8/layout/lProcess2"/>
+    <dgm:cxn modelId="{332CC9C9-93F0-8840-84D1-989C64A0E9E9}" type="presParOf" srcId="{C1B1E0CC-35D9-B347-9A59-77721EEA9FCE}" destId="{FF6B81BE-D923-B646-B9D8-5C7ACA92FC5F}" srcOrd="1" destOrd="0" presId="urn:microsoft.com/office/officeart/2005/8/layout/lProcess2"/>
+    <dgm:cxn modelId="{88BF423B-FBFD-BB42-B29E-35F318349326}" type="presParOf" srcId="{C1B1E0CC-35D9-B347-9A59-77721EEA9FCE}" destId="{D0F828A7-27AA-F845-8B19-DA31C105DD34}" srcOrd="2" destOrd="0" presId="urn:microsoft.com/office/officeart/2005/8/layout/lProcess2"/>
+    <dgm:cxn modelId="{66EA13B7-C8C9-5B4E-9131-CD0AB603726F}" type="presParOf" srcId="{D0F828A7-27AA-F845-8B19-DA31C105DD34}" destId="{33E6F2EA-08DA-084E-A06A-A037E901529D}" srcOrd="0" destOrd="0" presId="urn:microsoft.com/office/officeart/2005/8/layout/lProcess2"/>
+    <dgm:cxn modelId="{BC402ADB-A070-9A40-A8DD-3595AB2A606F}" type="presParOf" srcId="{33E6F2EA-08DA-084E-A06A-A037E901529D}" destId="{FE8F009B-6790-F44D-A37F-BF836BFFEE87}" srcOrd="0" destOrd="0" presId="urn:microsoft.com/office/officeart/2005/8/layout/lProcess2"/>
+    <dgm:cxn modelId="{F5AC6A46-49ED-2247-B5F2-AAC3665A363C}" type="presParOf" srcId="{33E6F2EA-08DA-084E-A06A-A037E901529D}" destId="{C2C7473B-17E4-D142-8F7D-3F60C3884547}" srcOrd="1" destOrd="0" presId="urn:microsoft.com/office/officeart/2005/8/layout/lProcess2"/>
+    <dgm:cxn modelId="{8CAD9455-DA0B-544C-B2BB-8A95E8339FC8}" type="presParOf" srcId="{33E6F2EA-08DA-084E-A06A-A037E901529D}" destId="{BBB5C65B-FB96-DA43-933D-76D1E0615ED3}" srcOrd="2" destOrd="0" presId="urn:microsoft.com/office/officeart/2005/8/layout/lProcess2"/>
   </dgm:cxnLst>
   <dgm:bg/>
   <dgm:whole/>
@@ -6298,6 +8371,715 @@
 </dsp:drawing>
 </file>
 
+<file path=ppt/diagrams/drawing5.xml><?xml version="1.0" encoding="utf-8"?>
+<dsp:drawing xmlns:dgm="http://schemas.openxmlformats.org/drawingml/2006/diagram" xmlns:dsp="http://schemas.microsoft.com/office/drawing/2008/diagram" xmlns:a="http://schemas.openxmlformats.org/drawingml/2006/main">
+  <dsp:spTree>
+    <dsp:nvGrpSpPr>
+      <dsp:cNvPr id="0" name=""/>
+      <dsp:cNvGrpSpPr/>
+    </dsp:nvGrpSpPr>
+    <dsp:grpSpPr/>
+    <dsp:sp modelId="{1B40B60A-C481-8C45-8400-4C57F14FF9C2}">
+      <dsp:nvSpPr>
+        <dsp:cNvPr id="0" name=""/>
+        <dsp:cNvSpPr/>
+      </dsp:nvSpPr>
+      <dsp:spPr>
+        <a:xfrm>
+          <a:off x="958" y="0"/>
+          <a:ext cx="2491097" cy="3429000"/>
+        </a:xfrm>
+        <a:prstGeom prst="roundRect">
+          <a:avLst>
+            <a:gd name="adj" fmla="val 10000"/>
+          </a:avLst>
+        </a:prstGeom>
+        <a:solidFill>
+          <a:schemeClr val="accent6">
+            <a:tint val="40000"/>
+            <a:hueOff val="0"/>
+            <a:satOff val="0"/>
+            <a:lumOff val="0"/>
+            <a:alphaOff val="0"/>
+          </a:schemeClr>
+        </a:solidFill>
+        <a:ln>
+          <a:noFill/>
+        </a:ln>
+        <a:effectLst>
+          <a:outerShdw blurRad="40000" dist="23000" dir="5400000" rotWithShape="0">
+            <a:srgbClr val="000000">
+              <a:alpha val="35000"/>
+            </a:srgbClr>
+          </a:outerShdw>
+        </a:effectLst>
+      </dsp:spPr>
+      <dsp:style>
+        <a:lnRef idx="0">
+          <a:scrgbClr r="0" g="0" b="0"/>
+        </a:lnRef>
+        <a:fillRef idx="1">
+          <a:scrgbClr r="0" g="0" b="0"/>
+        </a:fillRef>
+        <a:effectRef idx="2">
+          <a:scrgbClr r="0" g="0" b="0"/>
+        </a:effectRef>
+        <a:fontRef idx="minor"/>
+      </dsp:style>
+      <dsp:txBody>
+        <a:bodyPr spcFirstLastPara="0" vert="horz" wrap="square" lIns="228600" tIns="228600" rIns="228600" bIns="228600" numCol="1" spcCol="1270" anchor="ctr" anchorCtr="0">
+          <a:noAutofit/>
+        </a:bodyPr>
+        <a:lstStyle/>
+        <a:p>
+          <a:pPr lvl="0" algn="ctr" defTabSz="2667000">
+            <a:lnSpc>
+              <a:spcPct val="90000"/>
+            </a:lnSpc>
+            <a:spcBef>
+              <a:spcPct val="0"/>
+            </a:spcBef>
+            <a:spcAft>
+              <a:spcPct val="35000"/>
+            </a:spcAft>
+          </a:pPr>
+          <a:endParaRPr lang="fr-FR" sz="6000" kern="1200" baseline="-25000" dirty="0" smtClean="0"/>
+        </a:p>
+      </dsp:txBody>
+      <dsp:txXfrm>
+        <a:off x="958" y="0"/>
+        <a:ext cx="2491097" cy="1028700"/>
+      </dsp:txXfrm>
+    </dsp:sp>
+    <dsp:sp modelId="{D8E2F626-07C3-3F40-BD95-D7C9EEC93518}">
+      <dsp:nvSpPr>
+        <dsp:cNvPr id="0" name=""/>
+        <dsp:cNvSpPr/>
+      </dsp:nvSpPr>
+      <dsp:spPr>
+        <a:xfrm>
+          <a:off x="250067" y="1028700"/>
+          <a:ext cx="1992877" cy="2228850"/>
+        </a:xfrm>
+        <a:prstGeom prst="roundRect">
+          <a:avLst>
+            <a:gd name="adj" fmla="val 10000"/>
+          </a:avLst>
+        </a:prstGeom>
+        <a:gradFill rotWithShape="0">
+          <a:gsLst>
+            <a:gs pos="0">
+              <a:schemeClr val="accent6">
+                <a:hueOff val="0"/>
+                <a:satOff val="0"/>
+                <a:lumOff val="0"/>
+                <a:alphaOff val="0"/>
+                <a:tint val="100000"/>
+                <a:shade val="100000"/>
+                <a:satMod val="130000"/>
+              </a:schemeClr>
+            </a:gs>
+            <a:gs pos="100000">
+              <a:schemeClr val="accent6">
+                <a:hueOff val="0"/>
+                <a:satOff val="0"/>
+                <a:lumOff val="0"/>
+                <a:alphaOff val="0"/>
+                <a:tint val="50000"/>
+                <a:shade val="100000"/>
+                <a:satMod val="350000"/>
+              </a:schemeClr>
+            </a:gs>
+          </a:gsLst>
+          <a:lin ang="16200000" scaled="0"/>
+        </a:gradFill>
+        <a:ln>
+          <a:noFill/>
+        </a:ln>
+        <a:effectLst>
+          <a:outerShdw blurRad="40000" dist="23000" dir="5400000" rotWithShape="0">
+            <a:srgbClr val="000000">
+              <a:alpha val="35000"/>
+            </a:srgbClr>
+          </a:outerShdw>
+        </a:effectLst>
+      </dsp:spPr>
+      <dsp:style>
+        <a:lnRef idx="0">
+          <a:scrgbClr r="0" g="0" b="0"/>
+        </a:lnRef>
+        <a:fillRef idx="3">
+          <a:scrgbClr r="0" g="0" b="0"/>
+        </a:fillRef>
+        <a:effectRef idx="2">
+          <a:scrgbClr r="0" g="0" b="0"/>
+        </a:effectRef>
+        <a:fontRef idx="minor">
+          <a:schemeClr val="lt1"/>
+        </a:fontRef>
+      </dsp:style>
+      <dsp:txBody>
+        <a:bodyPr spcFirstLastPara="0" vert="horz" wrap="square" lIns="63500" tIns="47625" rIns="63500" bIns="47625" numCol="1" spcCol="1270" anchor="ctr" anchorCtr="0">
+          <a:noAutofit/>
+        </a:bodyPr>
+        <a:lstStyle/>
+        <a:p>
+          <a:pPr lvl="0" algn="ctr" defTabSz="1111250">
+            <a:lnSpc>
+              <a:spcPct val="90000"/>
+            </a:lnSpc>
+            <a:spcBef>
+              <a:spcPct val="0"/>
+            </a:spcBef>
+            <a:spcAft>
+              <a:spcPct val="35000"/>
+            </a:spcAft>
+          </a:pPr>
+          <a:r>
+            <a:rPr lang="en-US" sz="2500" kern="1200" dirty="0" smtClean="0">
+              <a:latin typeface="Calibri" charset="0"/>
+              <a:cs typeface="Calibri" charset="0"/>
+            </a:rPr>
+            <a:t>Observations</a:t>
+          </a:r>
+        </a:p>
+      </dsp:txBody>
+      <dsp:txXfrm>
+        <a:off x="308436" y="1087069"/>
+        <a:ext cx="1876139" cy="2112112"/>
+      </dsp:txXfrm>
+    </dsp:sp>
+    <dsp:sp modelId="{42755303-DA40-A94F-8851-C173A9EE3663}">
+      <dsp:nvSpPr>
+        <dsp:cNvPr id="0" name=""/>
+        <dsp:cNvSpPr/>
+      </dsp:nvSpPr>
+      <dsp:spPr>
+        <a:xfrm>
+          <a:off x="2678887" y="0"/>
+          <a:ext cx="2491097" cy="3429000"/>
+        </a:xfrm>
+        <a:prstGeom prst="roundRect">
+          <a:avLst>
+            <a:gd name="adj" fmla="val 10000"/>
+          </a:avLst>
+        </a:prstGeom>
+        <a:solidFill>
+          <a:schemeClr val="accent6">
+            <a:tint val="40000"/>
+            <a:hueOff val="0"/>
+            <a:satOff val="0"/>
+            <a:lumOff val="0"/>
+            <a:alphaOff val="0"/>
+          </a:schemeClr>
+        </a:solidFill>
+        <a:ln>
+          <a:noFill/>
+        </a:ln>
+        <a:effectLst>
+          <a:outerShdw blurRad="40000" dist="23000" dir="5400000" rotWithShape="0">
+            <a:srgbClr val="000000">
+              <a:alpha val="35000"/>
+            </a:srgbClr>
+          </a:outerShdw>
+        </a:effectLst>
+      </dsp:spPr>
+      <dsp:style>
+        <a:lnRef idx="0">
+          <a:scrgbClr r="0" g="0" b="0"/>
+        </a:lnRef>
+        <a:fillRef idx="1">
+          <a:scrgbClr r="0" g="0" b="0"/>
+        </a:fillRef>
+        <a:effectRef idx="2">
+          <a:scrgbClr r="0" g="0" b="0"/>
+        </a:effectRef>
+        <a:fontRef idx="minor"/>
+      </dsp:style>
+      <dsp:txBody>
+        <a:bodyPr spcFirstLastPara="0" vert="horz" wrap="square" lIns="179070" tIns="179070" rIns="179070" bIns="179070" numCol="1" spcCol="1270" anchor="ctr" anchorCtr="0">
+          <a:noAutofit/>
+        </a:bodyPr>
+        <a:lstStyle/>
+        <a:p>
+          <a:pPr lvl="0" algn="ctr" defTabSz="2089150">
+            <a:lnSpc>
+              <a:spcPct val="90000"/>
+            </a:lnSpc>
+            <a:spcBef>
+              <a:spcPct val="0"/>
+            </a:spcBef>
+            <a:spcAft>
+              <a:spcPct val="35000"/>
+            </a:spcAft>
+          </a:pPr>
+          <a:endParaRPr lang="en-US" sz="4700" kern="1200" dirty="0">
+            <a:latin typeface="Calibri" charset="0"/>
+            <a:cs typeface="Calibri" charset="0"/>
+          </a:endParaRPr>
+        </a:p>
+      </dsp:txBody>
+      <dsp:txXfrm>
+        <a:off x="2678887" y="0"/>
+        <a:ext cx="2491097" cy="1028700"/>
+      </dsp:txXfrm>
+    </dsp:sp>
+    <dsp:sp modelId="{955F2586-C46F-9E42-B73B-7149BD6A7BF8}">
+      <dsp:nvSpPr>
+        <dsp:cNvPr id="0" name=""/>
+        <dsp:cNvSpPr/>
+      </dsp:nvSpPr>
+      <dsp:spPr>
+        <a:xfrm>
+          <a:off x="2927997" y="1029704"/>
+          <a:ext cx="1992877" cy="1033890"/>
+        </a:xfrm>
+        <a:prstGeom prst="roundRect">
+          <a:avLst>
+            <a:gd name="adj" fmla="val 10000"/>
+          </a:avLst>
+        </a:prstGeom>
+        <a:gradFill rotWithShape="0">
+          <a:gsLst>
+            <a:gs pos="0">
+              <a:schemeClr val="accent6">
+                <a:hueOff val="0"/>
+                <a:satOff val="0"/>
+                <a:lumOff val="0"/>
+                <a:alphaOff val="0"/>
+                <a:tint val="100000"/>
+                <a:shade val="100000"/>
+                <a:satMod val="130000"/>
+              </a:schemeClr>
+            </a:gs>
+            <a:gs pos="100000">
+              <a:schemeClr val="accent6">
+                <a:hueOff val="0"/>
+                <a:satOff val="0"/>
+                <a:lumOff val="0"/>
+                <a:alphaOff val="0"/>
+                <a:tint val="50000"/>
+                <a:shade val="100000"/>
+                <a:satMod val="350000"/>
+              </a:schemeClr>
+            </a:gs>
+          </a:gsLst>
+          <a:lin ang="16200000" scaled="0"/>
+        </a:gradFill>
+        <a:ln>
+          <a:noFill/>
+        </a:ln>
+        <a:effectLst>
+          <a:outerShdw blurRad="40000" dist="23000" dir="5400000" rotWithShape="0">
+            <a:srgbClr val="000000">
+              <a:alpha val="35000"/>
+            </a:srgbClr>
+          </a:outerShdw>
+        </a:effectLst>
+      </dsp:spPr>
+      <dsp:style>
+        <a:lnRef idx="0">
+          <a:scrgbClr r="0" g="0" b="0"/>
+        </a:lnRef>
+        <a:fillRef idx="3">
+          <a:scrgbClr r="0" g="0" b="0"/>
+        </a:fillRef>
+        <a:effectRef idx="2">
+          <a:scrgbClr r="0" g="0" b="0"/>
+        </a:effectRef>
+        <a:fontRef idx="minor">
+          <a:schemeClr val="lt1"/>
+        </a:fontRef>
+      </dsp:style>
+      <dsp:txBody>
+        <a:bodyPr spcFirstLastPara="0" vert="horz" wrap="square" lIns="63500" tIns="47625" rIns="63500" bIns="47625" numCol="1" spcCol="1270" anchor="ctr" anchorCtr="0">
+          <a:noAutofit/>
+        </a:bodyPr>
+        <a:lstStyle/>
+        <a:p>
+          <a:pPr lvl="0" algn="ctr" defTabSz="1111250">
+            <a:lnSpc>
+              <a:spcPct val="90000"/>
+            </a:lnSpc>
+            <a:spcBef>
+              <a:spcPct val="0"/>
+            </a:spcBef>
+            <a:spcAft>
+              <a:spcPct val="35000"/>
+            </a:spcAft>
+          </a:pPr>
+          <a:r>
+            <a:rPr lang="en-US" sz="2500" kern="1200" dirty="0" smtClean="0">
+              <a:latin typeface="Calibri" charset="0"/>
+              <a:cs typeface="Calibri" charset="0"/>
+            </a:rPr>
+            <a:t>Observations</a:t>
+          </a:r>
+        </a:p>
+      </dsp:txBody>
+      <dsp:txXfrm>
+        <a:off x="2958279" y="1059986"/>
+        <a:ext cx="1932313" cy="973326"/>
+      </dsp:txXfrm>
+    </dsp:sp>
+    <dsp:sp modelId="{35915673-825B-9A44-BD68-C0991C072291}">
+      <dsp:nvSpPr>
+        <dsp:cNvPr id="0" name=""/>
+        <dsp:cNvSpPr/>
+      </dsp:nvSpPr>
+      <dsp:spPr>
+        <a:xfrm>
+          <a:off x="2927997" y="2222655"/>
+          <a:ext cx="1992877" cy="1033890"/>
+        </a:xfrm>
+        <a:prstGeom prst="roundRect">
+          <a:avLst>
+            <a:gd name="adj" fmla="val 10000"/>
+          </a:avLst>
+        </a:prstGeom>
+        <a:solidFill>
+          <a:schemeClr val="accent2"/>
+        </a:solidFill>
+        <a:ln w="25400" cap="flat" cmpd="sng" algn="ctr">
+          <a:solidFill>
+            <a:schemeClr val="accent2">
+              <a:shade val="50000"/>
+            </a:schemeClr>
+          </a:solidFill>
+          <a:prstDash val="solid"/>
+        </a:ln>
+        <a:effectLst/>
+      </dsp:spPr>
+      <dsp:style>
+        <a:lnRef idx="2">
+          <a:schemeClr val="accent2">
+            <a:shade val="50000"/>
+          </a:schemeClr>
+        </a:lnRef>
+        <a:fillRef idx="1">
+          <a:schemeClr val="accent2"/>
+        </a:fillRef>
+        <a:effectRef idx="0">
+          <a:schemeClr val="accent2"/>
+        </a:effectRef>
+        <a:fontRef idx="minor">
+          <a:schemeClr val="lt1"/>
+        </a:fontRef>
+      </dsp:style>
+      <dsp:txBody>
+        <a:bodyPr spcFirstLastPara="0" vert="horz" wrap="square" lIns="63500" tIns="47625" rIns="63500" bIns="47625" numCol="1" spcCol="1270" anchor="ctr" anchorCtr="0">
+          <a:noAutofit/>
+        </a:bodyPr>
+        <a:lstStyle/>
+        <a:p>
+          <a:pPr lvl="0" algn="ctr" defTabSz="1111250">
+            <a:lnSpc>
+              <a:spcPct val="90000"/>
+            </a:lnSpc>
+            <a:spcBef>
+              <a:spcPct val="0"/>
+            </a:spcBef>
+            <a:spcAft>
+              <a:spcPct val="35000"/>
+            </a:spcAft>
+          </a:pPr>
+          <a:r>
+            <a:rPr lang="en-US" sz="2500" kern="1200" dirty="0" smtClean="0">
+              <a:latin typeface="Calibri" charset="0"/>
+              <a:cs typeface="Calibri" charset="0"/>
+            </a:rPr>
+            <a:t>1st guess</a:t>
+          </a:r>
+          <a:br>
+            <a:rPr lang="en-US" sz="2500" kern="1200" dirty="0" smtClean="0">
+              <a:latin typeface="Calibri" charset="0"/>
+              <a:cs typeface="Calibri" charset="0"/>
+            </a:rPr>
+          </a:br>
+          <a:r>
+            <a:rPr lang="en-US" sz="2500" kern="1200" dirty="0" smtClean="0">
+              <a:latin typeface="Calibri" charset="0"/>
+              <a:cs typeface="Calibri" charset="0"/>
+            </a:rPr>
+            <a:t>(SST &amp; OWS)</a:t>
+          </a:r>
+        </a:p>
+      </dsp:txBody>
+      <dsp:txXfrm>
+        <a:off x="2958279" y="2252937"/>
+        <a:ext cx="1932313" cy="973326"/>
+      </dsp:txXfrm>
+    </dsp:sp>
+    <dsp:sp modelId="{751186F6-2ACB-474B-9310-70AE672DC432}">
+      <dsp:nvSpPr>
+        <dsp:cNvPr id="0" name=""/>
+        <dsp:cNvSpPr/>
+      </dsp:nvSpPr>
+      <dsp:spPr>
+        <a:xfrm>
+          <a:off x="5356816" y="0"/>
+          <a:ext cx="2491097" cy="3429000"/>
+        </a:xfrm>
+        <a:prstGeom prst="roundRect">
+          <a:avLst>
+            <a:gd name="adj" fmla="val 10000"/>
+          </a:avLst>
+        </a:prstGeom>
+        <a:solidFill>
+          <a:schemeClr val="accent6">
+            <a:tint val="40000"/>
+            <a:hueOff val="0"/>
+            <a:satOff val="0"/>
+            <a:lumOff val="0"/>
+            <a:alphaOff val="0"/>
+          </a:schemeClr>
+        </a:solidFill>
+        <a:ln>
+          <a:noFill/>
+        </a:ln>
+        <a:effectLst>
+          <a:outerShdw blurRad="40000" dist="23000" dir="5400000" rotWithShape="0">
+            <a:srgbClr val="000000">
+              <a:alpha val="35000"/>
+            </a:srgbClr>
+          </a:outerShdw>
+        </a:effectLst>
+      </dsp:spPr>
+      <dsp:style>
+        <a:lnRef idx="0">
+          <a:scrgbClr r="0" g="0" b="0"/>
+        </a:lnRef>
+        <a:fillRef idx="1">
+          <a:scrgbClr r="0" g="0" b="0"/>
+        </a:fillRef>
+        <a:effectRef idx="2">
+          <a:scrgbClr r="0" g="0" b="0"/>
+        </a:effectRef>
+        <a:fontRef idx="minor"/>
+      </dsp:style>
+      <dsp:txBody>
+        <a:bodyPr spcFirstLastPara="0" vert="horz" wrap="square" lIns="179070" tIns="179070" rIns="179070" bIns="179070" numCol="1" spcCol="1270" anchor="ctr" anchorCtr="0">
+          <a:noAutofit/>
+        </a:bodyPr>
+        <a:lstStyle/>
+        <a:p>
+          <a:pPr lvl="0" algn="ctr" defTabSz="2089150">
+            <a:lnSpc>
+              <a:spcPct val="90000"/>
+            </a:lnSpc>
+            <a:spcBef>
+              <a:spcPct val="0"/>
+            </a:spcBef>
+            <a:spcAft>
+              <a:spcPct val="35000"/>
+            </a:spcAft>
+          </a:pPr>
+          <a:endParaRPr lang="en-US" sz="4700" kern="1200" dirty="0">
+            <a:latin typeface="Calibri" charset="0"/>
+            <a:cs typeface="Calibri" charset="0"/>
+          </a:endParaRPr>
+        </a:p>
+      </dsp:txBody>
+      <dsp:txXfrm>
+        <a:off x="5356816" y="0"/>
+        <a:ext cx="2491097" cy="1028700"/>
+      </dsp:txXfrm>
+    </dsp:sp>
+    <dsp:sp modelId="{FE8F009B-6790-F44D-A37F-BF836BFFEE87}">
+      <dsp:nvSpPr>
+        <dsp:cNvPr id="0" name=""/>
+        <dsp:cNvSpPr/>
+      </dsp:nvSpPr>
+      <dsp:spPr>
+        <a:xfrm>
+          <a:off x="5605926" y="1029704"/>
+          <a:ext cx="1992877" cy="1033890"/>
+        </a:xfrm>
+        <a:prstGeom prst="roundRect">
+          <a:avLst>
+            <a:gd name="adj" fmla="val 10000"/>
+          </a:avLst>
+        </a:prstGeom>
+        <a:gradFill rotWithShape="0">
+          <a:gsLst>
+            <a:gs pos="0">
+              <a:schemeClr val="accent6">
+                <a:hueOff val="0"/>
+                <a:satOff val="0"/>
+                <a:lumOff val="0"/>
+                <a:alphaOff val="0"/>
+                <a:tint val="100000"/>
+                <a:shade val="100000"/>
+                <a:satMod val="130000"/>
+              </a:schemeClr>
+            </a:gs>
+            <a:gs pos="100000">
+              <a:schemeClr val="accent6">
+                <a:hueOff val="0"/>
+                <a:satOff val="0"/>
+                <a:lumOff val="0"/>
+                <a:alphaOff val="0"/>
+                <a:tint val="50000"/>
+                <a:shade val="100000"/>
+                <a:satMod val="350000"/>
+              </a:schemeClr>
+            </a:gs>
+          </a:gsLst>
+          <a:lin ang="16200000" scaled="0"/>
+        </a:gradFill>
+        <a:ln>
+          <a:noFill/>
+        </a:ln>
+        <a:effectLst>
+          <a:outerShdw blurRad="40000" dist="23000" dir="5400000" rotWithShape="0">
+            <a:srgbClr val="000000">
+              <a:alpha val="35000"/>
+            </a:srgbClr>
+          </a:outerShdw>
+        </a:effectLst>
+      </dsp:spPr>
+      <dsp:style>
+        <a:lnRef idx="0">
+          <a:scrgbClr r="0" g="0" b="0"/>
+        </a:lnRef>
+        <a:fillRef idx="3">
+          <a:scrgbClr r="0" g="0" b="0"/>
+        </a:fillRef>
+        <a:effectRef idx="2">
+          <a:scrgbClr r="0" g="0" b="0"/>
+        </a:effectRef>
+        <a:fontRef idx="minor">
+          <a:schemeClr val="lt1"/>
+        </a:fontRef>
+      </dsp:style>
+      <dsp:txBody>
+        <a:bodyPr spcFirstLastPara="0" vert="horz" wrap="square" lIns="63500" tIns="47625" rIns="63500" bIns="47625" numCol="1" spcCol="1270" anchor="ctr" anchorCtr="0">
+          <a:noAutofit/>
+        </a:bodyPr>
+        <a:lstStyle/>
+        <a:p>
+          <a:pPr lvl="0" algn="ctr" defTabSz="1111250">
+            <a:lnSpc>
+              <a:spcPct val="90000"/>
+            </a:lnSpc>
+            <a:spcBef>
+              <a:spcPct val="0"/>
+            </a:spcBef>
+            <a:spcAft>
+              <a:spcPct val="35000"/>
+            </a:spcAft>
+          </a:pPr>
+          <a:r>
+            <a:rPr lang="en-US" sz="2500" kern="1200" dirty="0" smtClean="0">
+              <a:latin typeface="Calibri" charset="0"/>
+              <a:cs typeface="Calibri" charset="0"/>
+            </a:rPr>
+            <a:t>Observations</a:t>
+          </a:r>
+        </a:p>
+      </dsp:txBody>
+      <dsp:txXfrm>
+        <a:off x="5636208" y="1059986"/>
+        <a:ext cx="1932313" cy="973326"/>
+      </dsp:txXfrm>
+    </dsp:sp>
+    <dsp:sp modelId="{BBB5C65B-FB96-DA43-933D-76D1E0615ED3}">
+      <dsp:nvSpPr>
+        <dsp:cNvPr id="0" name=""/>
+        <dsp:cNvSpPr/>
+      </dsp:nvSpPr>
+      <dsp:spPr>
+        <a:xfrm>
+          <a:off x="5605926" y="2222655"/>
+          <a:ext cx="1992877" cy="1033890"/>
+        </a:xfrm>
+        <a:prstGeom prst="roundRect">
+          <a:avLst>
+            <a:gd name="adj" fmla="val 10000"/>
+          </a:avLst>
+        </a:prstGeom>
+        <a:solidFill>
+          <a:schemeClr val="accent4"/>
+        </a:solidFill>
+        <a:ln w="25400" cap="flat" cmpd="sng" algn="ctr">
+          <a:solidFill>
+            <a:schemeClr val="accent4">
+              <a:shade val="50000"/>
+            </a:schemeClr>
+          </a:solidFill>
+          <a:prstDash val="solid"/>
+        </a:ln>
+        <a:effectLst/>
+      </dsp:spPr>
+      <dsp:style>
+        <a:lnRef idx="2">
+          <a:schemeClr val="accent4">
+            <a:shade val="50000"/>
+          </a:schemeClr>
+        </a:lnRef>
+        <a:fillRef idx="1">
+          <a:schemeClr val="accent4"/>
+        </a:fillRef>
+        <a:effectRef idx="0">
+          <a:schemeClr val="accent4"/>
+        </a:effectRef>
+        <a:fontRef idx="minor">
+          <a:schemeClr val="lt1"/>
+        </a:fontRef>
+      </dsp:style>
+      <dsp:txBody>
+        <a:bodyPr spcFirstLastPara="0" vert="horz" wrap="square" lIns="63500" tIns="47625" rIns="63500" bIns="47625" numCol="1" spcCol="1270" anchor="ctr" anchorCtr="0">
+          <a:noAutofit/>
+        </a:bodyPr>
+        <a:lstStyle/>
+        <a:p>
+          <a:pPr lvl="0" algn="ctr" defTabSz="1111250">
+            <a:lnSpc>
+              <a:spcPct val="90000"/>
+            </a:lnSpc>
+            <a:spcBef>
+              <a:spcPct val="0"/>
+            </a:spcBef>
+            <a:spcAft>
+              <a:spcPct val="35000"/>
+            </a:spcAft>
+          </a:pPr>
+          <a:r>
+            <a:rPr lang="en-US" sz="2500" kern="1200" dirty="0" smtClean="0">
+              <a:latin typeface="Calibri" charset="0"/>
+              <a:cs typeface="Calibri" charset="0"/>
+            </a:rPr>
+            <a:t>Inversion </a:t>
+          </a:r>
+          <a:r>
+            <a:rPr lang="en-US" sz="2500" kern="1200" dirty="0" err="1" smtClean="0">
+              <a:latin typeface="Calibri" charset="0"/>
+              <a:cs typeface="Calibri" charset="0"/>
+            </a:rPr>
+            <a:t>lin</a:t>
+          </a:r>
+          <a:r>
+            <a:rPr lang="en-US" sz="2500" kern="1200" dirty="0" err="1" smtClean="0">
+              <a:latin typeface="Calibri" charset="0"/>
+              <a:cs typeface="Calibri" charset="0"/>
+            </a:rPr>
+            <a:t>éaire</a:t>
+          </a:r>
+          <a:endParaRPr lang="en-US" sz="2500" kern="1200" dirty="0" smtClean="0">
+            <a:latin typeface="Calibri" charset="0"/>
+            <a:cs typeface="Calibri" charset="0"/>
+          </a:endParaRPr>
+        </a:p>
+      </dsp:txBody>
+      <dsp:txXfrm>
+        <a:off x="5636208" y="2252937"/>
+        <a:ext cx="1932313" cy="973326"/>
+      </dsp:txXfrm>
+    </dsp:sp>
+  </dsp:spTree>
+</dsp:drawing>
+</file>
+
 <file path=ppt/diagrams/layout1.xml><?xml version="1.0" encoding="utf-8"?>
 <dgm:layoutDef xmlns:dgm="http://schemas.openxmlformats.org/drawingml/2006/diagram" xmlns:a="http://schemas.openxmlformats.org/drawingml/2006/main" uniqueId="urn:microsoft.com/office/officeart/2005/8/layout/vList2">
   <dgm:title val=""/>
@@ -7210,6 +9992,233 @@
 </dgm:layoutDef>
 </file>
 
+<file path=ppt/diagrams/layout5.xml><?xml version="1.0" encoding="utf-8"?>
+<dgm:layoutDef xmlns:dgm="http://schemas.openxmlformats.org/drawingml/2006/diagram" xmlns:a="http://schemas.openxmlformats.org/drawingml/2006/main" uniqueId="urn:microsoft.com/office/officeart/2005/8/layout/lProcess2">
+  <dgm:title val=""/>
+  <dgm:desc val=""/>
+  <dgm:catLst>
+    <dgm:cat type="list" pri="10000"/>
+    <dgm:cat type="relationship" pri="13000"/>
+  </dgm:catLst>
+  <dgm:sampData>
+    <dgm:dataModel>
+      <dgm:ptLst>
+        <dgm:pt modelId="0" type="doc"/>
+        <dgm:pt modelId="1">
+          <dgm:prSet phldr="1"/>
+        </dgm:pt>
+        <dgm:pt modelId="11">
+          <dgm:prSet phldr="1"/>
+        </dgm:pt>
+        <dgm:pt modelId="12">
+          <dgm:prSet phldr="1"/>
+        </dgm:pt>
+        <dgm:pt modelId="2">
+          <dgm:prSet phldr="1"/>
+        </dgm:pt>
+        <dgm:pt modelId="21">
+          <dgm:prSet phldr="1"/>
+        </dgm:pt>
+        <dgm:pt modelId="22">
+          <dgm:prSet phldr="1"/>
+        </dgm:pt>
+        <dgm:pt modelId="3">
+          <dgm:prSet phldr="1"/>
+        </dgm:pt>
+        <dgm:pt modelId="31">
+          <dgm:prSet phldr="1"/>
+        </dgm:pt>
+        <dgm:pt modelId="32">
+          <dgm:prSet phldr="1"/>
+        </dgm:pt>
+      </dgm:ptLst>
+      <dgm:cxnLst>
+        <dgm:cxn modelId="4" srcId="0" destId="1" srcOrd="0" destOrd="0"/>
+        <dgm:cxn modelId="5" srcId="0" destId="2" srcOrd="1" destOrd="0"/>
+        <dgm:cxn modelId="13" srcId="1" destId="11" srcOrd="0" destOrd="0"/>
+        <dgm:cxn modelId="14" srcId="1" destId="12" srcOrd="0" destOrd="0"/>
+        <dgm:cxn modelId="23" srcId="2" destId="21" srcOrd="0" destOrd="0"/>
+        <dgm:cxn modelId="24" srcId="2" destId="22" srcOrd="0" destOrd="0"/>
+        <dgm:cxn modelId="33" srcId="3" destId="31" srcOrd="0" destOrd="0"/>
+        <dgm:cxn modelId="34" srcId="3" destId="32" srcOrd="0" destOrd="0"/>
+      </dgm:cxnLst>
+      <dgm:bg/>
+      <dgm:whole/>
+    </dgm:dataModel>
+  </dgm:sampData>
+  <dgm:styleData useDef="1">
+    <dgm:dataModel>
+      <dgm:ptLst/>
+      <dgm:bg/>
+      <dgm:whole/>
+    </dgm:dataModel>
+  </dgm:styleData>
+  <dgm:clrData useDef="1">
+    <dgm:dataModel>
+      <dgm:ptLst/>
+      <dgm:bg/>
+      <dgm:whole/>
+    </dgm:dataModel>
+  </dgm:clrData>
+  <dgm:layoutNode name="theList">
+    <dgm:varLst>
+      <dgm:dir/>
+      <dgm:animLvl val="lvl"/>
+      <dgm:resizeHandles val="exact"/>
+    </dgm:varLst>
+    <dgm:choose name="Name0">
+      <dgm:if name="Name1" func="var" arg="dir" op="equ" val="norm">
+        <dgm:alg type="lin"/>
+      </dgm:if>
+      <dgm:else name="Name2">
+        <dgm:alg type="lin">
+          <dgm:param type="linDir" val="fromR"/>
+        </dgm:alg>
+      </dgm:else>
+    </dgm:choose>
+    <dgm:shape xmlns:r="http://schemas.openxmlformats.org/officeDocument/2006/relationships" r:blip="">
+      <dgm:adjLst/>
+    </dgm:shape>
+    <dgm:presOf/>
+    <dgm:constrLst>
+      <dgm:constr type="w" for="ch" forName="compNode" refType="w"/>
+      <dgm:constr type="h" for="ch" forName="compNode" refType="h"/>
+      <dgm:constr type="w" for="ch" forName="aSpace" refType="w" fact="0.075"/>
+      <dgm:constr type="h" for="des" forName="aSpace2" refType="h" fact="0.1"/>
+      <dgm:constr type="primFontSz" for="des" forName="textNode" op="equ"/>
+      <dgm:constr type="primFontSz" for="des" forName="childNode" op="equ"/>
+    </dgm:constrLst>
+    <dgm:ruleLst/>
+    <dgm:forEach name="aNodeForEach" axis="ch" ptType="node">
+      <dgm:layoutNode name="compNode">
+        <dgm:alg type="composite"/>
+        <dgm:shape xmlns:r="http://schemas.openxmlformats.org/officeDocument/2006/relationships" r:blip="">
+          <dgm:adjLst/>
+        </dgm:shape>
+        <dgm:presOf/>
+        <dgm:constrLst>
+          <dgm:constr type="w" for="ch" forName="aNode" refType="w"/>
+          <dgm:constr type="h" for="ch" forName="aNode" refType="h"/>
+          <dgm:constr type="w" for="ch" forName="textNode" refType="w"/>
+          <dgm:constr type="h" for="ch" forName="textNode" refType="h" fact="0.3"/>
+          <dgm:constr type="ctrX" for="ch" forName="textNode" refType="w" fact="0.5"/>
+          <dgm:constr type="w" for="ch" forName="compChildNode" refType="w" fact="0.8"/>
+          <dgm:constr type="h" for="ch" forName="compChildNode" refType="h" fact="0.65"/>
+          <dgm:constr type="t" for="ch" forName="compChildNode" refType="h" fact="0.3"/>
+          <dgm:constr type="ctrX" for="ch" forName="compChildNode" refType="w" fact="0.5"/>
+        </dgm:constrLst>
+        <dgm:ruleLst/>
+        <dgm:layoutNode name="aNode" styleLbl="bgShp">
+          <dgm:alg type="sp"/>
+          <dgm:shape xmlns:r="http://schemas.openxmlformats.org/officeDocument/2006/relationships" type="roundRect" r:blip="">
+            <dgm:adjLst>
+              <dgm:adj idx="1" val="0.1"/>
+            </dgm:adjLst>
+          </dgm:shape>
+          <dgm:presOf axis="self"/>
+          <dgm:constrLst/>
+          <dgm:ruleLst/>
+        </dgm:layoutNode>
+        <dgm:layoutNode name="textNode" styleLbl="bgShp">
+          <dgm:alg type="tx"/>
+          <dgm:shape xmlns:r="http://schemas.openxmlformats.org/officeDocument/2006/relationships" type="rect" r:blip="" hideGeom="1">
+            <dgm:adjLst>
+              <dgm:adj idx="1" val="0.1"/>
+            </dgm:adjLst>
+          </dgm:shape>
+          <dgm:presOf axis="self"/>
+          <dgm:constrLst>
+            <dgm:constr type="primFontSz" val="65"/>
+            <dgm:constr type="lMarg" refType="primFontSz" fact="0.3"/>
+            <dgm:constr type="rMarg" refType="primFontSz" fact="0.3"/>
+            <dgm:constr type="tMarg" refType="primFontSz" fact="0.3"/>
+            <dgm:constr type="bMarg" refType="primFontSz" fact="0.3"/>
+          </dgm:constrLst>
+          <dgm:ruleLst>
+            <dgm:rule type="primFontSz" val="5" fact="NaN" max="NaN"/>
+          </dgm:ruleLst>
+        </dgm:layoutNode>
+        <dgm:layoutNode name="compChildNode">
+          <dgm:alg type="composite"/>
+          <dgm:shape xmlns:r="http://schemas.openxmlformats.org/officeDocument/2006/relationships" r:blip="">
+            <dgm:adjLst/>
+          </dgm:shape>
+          <dgm:presOf/>
+          <dgm:constrLst>
+            <dgm:constr type="w" for="des" forName="childNode" refType="w"/>
+            <dgm:constr type="h" for="des" forName="childNode" refType="h"/>
+          </dgm:constrLst>
+          <dgm:ruleLst/>
+          <dgm:layoutNode name="theInnerList">
+            <dgm:alg type="lin">
+              <dgm:param type="linDir" val="fromT"/>
+            </dgm:alg>
+            <dgm:shape xmlns:r="http://schemas.openxmlformats.org/officeDocument/2006/relationships" r:blip="">
+              <dgm:adjLst/>
+            </dgm:shape>
+            <dgm:presOf/>
+            <dgm:constrLst/>
+            <dgm:ruleLst/>
+            <dgm:forEach name="childNodeForEach" axis="ch" ptType="node">
+              <dgm:layoutNode name="childNode" styleLbl="node1">
+                <dgm:varLst>
+                  <dgm:bulletEnabled val="1"/>
+                </dgm:varLst>
+                <dgm:alg type="tx"/>
+                <dgm:shape xmlns:r="http://schemas.openxmlformats.org/officeDocument/2006/relationships" type="roundRect" r:blip="">
+                  <dgm:adjLst>
+                    <dgm:adj idx="1" val="0.1"/>
+                  </dgm:adjLst>
+                </dgm:shape>
+                <dgm:presOf axis="desOrSelf" ptType="node"/>
+                <dgm:constrLst>
+                  <dgm:constr type="primFontSz" val="65"/>
+                  <dgm:constr type="tMarg" refType="primFontSz" fact="0.15"/>
+                  <dgm:constr type="bMarg" refType="primFontSz" fact="0.15"/>
+                  <dgm:constr type="lMarg" refType="primFontSz" fact="0.2"/>
+                  <dgm:constr type="rMarg" refType="primFontSz" fact="0.2"/>
+                </dgm:constrLst>
+                <dgm:ruleLst>
+                  <dgm:rule type="primFontSz" val="5" fact="NaN" max="NaN"/>
+                </dgm:ruleLst>
+              </dgm:layoutNode>
+              <dgm:choose name="Name3">
+                <dgm:if name="Name4" axis="self" ptType="node" func="revPos" op="equ" val="1"/>
+                <dgm:else name="Name5">
+                  <dgm:layoutNode name="aSpace2">
+                    <dgm:alg type="sp"/>
+                    <dgm:shape xmlns:r="http://schemas.openxmlformats.org/officeDocument/2006/relationships" r:blip="">
+                      <dgm:adjLst/>
+                    </dgm:shape>
+                    <dgm:presOf/>
+                    <dgm:constrLst/>
+                    <dgm:ruleLst/>
+                  </dgm:layoutNode>
+                </dgm:else>
+              </dgm:choose>
+            </dgm:forEach>
+          </dgm:layoutNode>
+        </dgm:layoutNode>
+      </dgm:layoutNode>
+      <dgm:choose name="Name6">
+        <dgm:if name="Name7" axis="self" ptType="node" func="revPos" op="equ" val="1"/>
+        <dgm:else name="Name8">
+          <dgm:layoutNode name="aSpace">
+            <dgm:alg type="sp"/>
+            <dgm:shape xmlns:r="http://schemas.openxmlformats.org/officeDocument/2006/relationships" r:blip="">
+              <dgm:adjLst/>
+            </dgm:shape>
+            <dgm:presOf/>
+            <dgm:constrLst/>
+            <dgm:ruleLst/>
+          </dgm:layoutNode>
+        </dgm:else>
+      </dgm:choose>
+    </dgm:forEach>
+  </dgm:layoutNode>
+</dgm:layoutDef>
+</file>
+
 <file path=ppt/diagrams/quickStyle1.xml><?xml version="1.0" encoding="utf-8"?>
 <dgm:styleDef xmlns:dgm="http://schemas.openxmlformats.org/drawingml/2006/diagram" xmlns:a="http://schemas.openxmlformats.org/drawingml/2006/main" uniqueId="urn:microsoft.com/office/officeart/2005/8/quickstyle/simple4">
   <dgm:title val=""/>
@@ -11318,6 +14327,1040 @@
         <a:scrgbClr r="0" g="0" b="0"/>
       </a:fillRef>
       <a:effectRef idx="1">
+        <a:scrgbClr r="0" g="0" b="0"/>
+      </a:effectRef>
+      <a:fontRef idx="minor"/>
+    </dgm:style>
+  </dgm:styleLbl>
+  <dgm:styleLbl name="revTx">
+    <dgm:scene3d>
+      <a:camera prst="orthographicFront"/>
+      <a:lightRig rig="threePt" dir="t"/>
+    </dgm:scene3d>
+    <dgm:sp3d/>
+    <dgm:txPr/>
+    <dgm:style>
+      <a:lnRef idx="0">
+        <a:scrgbClr r="0" g="0" b="0"/>
+      </a:lnRef>
+      <a:fillRef idx="0">
+        <a:scrgbClr r="0" g="0" b="0"/>
+      </a:fillRef>
+      <a:effectRef idx="0">
+        <a:scrgbClr r="0" g="0" b="0"/>
+      </a:effectRef>
+      <a:fontRef idx="minor"/>
+    </dgm:style>
+  </dgm:styleLbl>
+</dgm:styleDef>
+</file>
+
+<file path=ppt/diagrams/quickStyle5.xml><?xml version="1.0" encoding="utf-8"?>
+<dgm:styleDef xmlns:dgm="http://schemas.openxmlformats.org/drawingml/2006/diagram" xmlns:a="http://schemas.openxmlformats.org/drawingml/2006/main" uniqueId="urn:microsoft.com/office/officeart/2005/8/quickstyle/simple4">
+  <dgm:title val=""/>
+  <dgm:desc val=""/>
+  <dgm:catLst>
+    <dgm:cat type="simple" pri="10400"/>
+  </dgm:catLst>
+  <dgm:scene3d>
+    <a:camera prst="orthographicFront"/>
+    <a:lightRig rig="threePt" dir="t"/>
+  </dgm:scene3d>
+  <dgm:styleLbl name="node0">
+    <dgm:scene3d>
+      <a:camera prst="orthographicFront"/>
+      <a:lightRig rig="threePt" dir="t"/>
+    </dgm:scene3d>
+    <dgm:sp3d/>
+    <dgm:txPr/>
+    <dgm:style>
+      <a:lnRef idx="0">
+        <a:scrgbClr r="0" g="0" b="0"/>
+      </a:lnRef>
+      <a:fillRef idx="3">
+        <a:scrgbClr r="0" g="0" b="0"/>
+      </a:fillRef>
+      <a:effectRef idx="2">
+        <a:scrgbClr r="0" g="0" b="0"/>
+      </a:effectRef>
+      <a:fontRef idx="minor">
+        <a:schemeClr val="lt1"/>
+      </a:fontRef>
+    </dgm:style>
+  </dgm:styleLbl>
+  <dgm:styleLbl name="lnNode1">
+    <dgm:scene3d>
+      <a:camera prst="orthographicFront"/>
+      <a:lightRig rig="threePt" dir="t"/>
+    </dgm:scene3d>
+    <dgm:sp3d/>
+    <dgm:txPr/>
+    <dgm:style>
+      <a:lnRef idx="1">
+        <a:scrgbClr r="0" g="0" b="0"/>
+      </a:lnRef>
+      <a:fillRef idx="3">
+        <a:scrgbClr r="0" g="0" b="0"/>
+      </a:fillRef>
+      <a:effectRef idx="2">
+        <a:scrgbClr r="0" g="0" b="0"/>
+      </a:effectRef>
+      <a:fontRef idx="minor">
+        <a:schemeClr val="lt1"/>
+      </a:fontRef>
+    </dgm:style>
+  </dgm:styleLbl>
+  <dgm:styleLbl name="vennNode1">
+    <dgm:scene3d>
+      <a:camera prst="orthographicFront"/>
+      <a:lightRig rig="threePt" dir="t"/>
+    </dgm:scene3d>
+    <dgm:sp3d/>
+    <dgm:txPr/>
+    <dgm:style>
+      <a:lnRef idx="0">
+        <a:scrgbClr r="0" g="0" b="0"/>
+      </a:lnRef>
+      <a:fillRef idx="3">
+        <a:scrgbClr r="0" g="0" b="0"/>
+      </a:fillRef>
+      <a:effectRef idx="0">
+        <a:scrgbClr r="0" g="0" b="0"/>
+      </a:effectRef>
+      <a:fontRef idx="minor">
+        <a:schemeClr val="tx1"/>
+      </a:fontRef>
+    </dgm:style>
+  </dgm:styleLbl>
+  <dgm:styleLbl name="alignNode1">
+    <dgm:scene3d>
+      <a:camera prst="orthographicFront"/>
+      <a:lightRig rig="threePt" dir="t"/>
+    </dgm:scene3d>
+    <dgm:sp3d/>
+    <dgm:txPr/>
+    <dgm:style>
+      <a:lnRef idx="1">
+        <a:scrgbClr r="0" g="0" b="0"/>
+      </a:lnRef>
+      <a:fillRef idx="3">
+        <a:scrgbClr r="0" g="0" b="0"/>
+      </a:fillRef>
+      <a:effectRef idx="2">
+        <a:scrgbClr r="0" g="0" b="0"/>
+      </a:effectRef>
+      <a:fontRef idx="minor">
+        <a:schemeClr val="lt1"/>
+      </a:fontRef>
+    </dgm:style>
+  </dgm:styleLbl>
+  <dgm:styleLbl name="node1">
+    <dgm:scene3d>
+      <a:camera prst="orthographicFront"/>
+      <a:lightRig rig="threePt" dir="t"/>
+    </dgm:scene3d>
+    <dgm:sp3d/>
+    <dgm:txPr/>
+    <dgm:style>
+      <a:lnRef idx="0">
+        <a:scrgbClr r="0" g="0" b="0"/>
+      </a:lnRef>
+      <a:fillRef idx="3">
+        <a:scrgbClr r="0" g="0" b="0"/>
+      </a:fillRef>
+      <a:effectRef idx="2">
+        <a:scrgbClr r="0" g="0" b="0"/>
+      </a:effectRef>
+      <a:fontRef idx="minor">
+        <a:schemeClr val="lt1"/>
+      </a:fontRef>
+    </dgm:style>
+  </dgm:styleLbl>
+  <dgm:styleLbl name="node2">
+    <dgm:scene3d>
+      <a:camera prst="orthographicFront"/>
+      <a:lightRig rig="threePt" dir="t"/>
+    </dgm:scene3d>
+    <dgm:sp3d/>
+    <dgm:txPr/>
+    <dgm:style>
+      <a:lnRef idx="0">
+        <a:scrgbClr r="0" g="0" b="0"/>
+      </a:lnRef>
+      <a:fillRef idx="3">
+        <a:scrgbClr r="0" g="0" b="0"/>
+      </a:fillRef>
+      <a:effectRef idx="2">
+        <a:scrgbClr r="0" g="0" b="0"/>
+      </a:effectRef>
+      <a:fontRef idx="minor">
+        <a:schemeClr val="lt1"/>
+      </a:fontRef>
+    </dgm:style>
+  </dgm:styleLbl>
+  <dgm:styleLbl name="node3">
+    <dgm:scene3d>
+      <a:camera prst="orthographicFront"/>
+      <a:lightRig rig="threePt" dir="t"/>
+    </dgm:scene3d>
+    <dgm:sp3d/>
+    <dgm:txPr/>
+    <dgm:style>
+      <a:lnRef idx="0">
+        <a:scrgbClr r="0" g="0" b="0"/>
+      </a:lnRef>
+      <a:fillRef idx="3">
+        <a:scrgbClr r="0" g="0" b="0"/>
+      </a:fillRef>
+      <a:effectRef idx="2">
+        <a:scrgbClr r="0" g="0" b="0"/>
+      </a:effectRef>
+      <a:fontRef idx="minor">
+        <a:schemeClr val="lt1"/>
+      </a:fontRef>
+    </dgm:style>
+  </dgm:styleLbl>
+  <dgm:styleLbl name="node4">
+    <dgm:scene3d>
+      <a:camera prst="orthographicFront"/>
+      <a:lightRig rig="threePt" dir="t"/>
+    </dgm:scene3d>
+    <dgm:sp3d/>
+    <dgm:txPr/>
+    <dgm:style>
+      <a:lnRef idx="0">
+        <a:scrgbClr r="0" g="0" b="0"/>
+      </a:lnRef>
+      <a:fillRef idx="3">
+        <a:scrgbClr r="0" g="0" b="0"/>
+      </a:fillRef>
+      <a:effectRef idx="2">
+        <a:scrgbClr r="0" g="0" b="0"/>
+      </a:effectRef>
+      <a:fontRef idx="minor">
+        <a:schemeClr val="lt1"/>
+      </a:fontRef>
+    </dgm:style>
+  </dgm:styleLbl>
+  <dgm:styleLbl name="fgImgPlace1">
+    <dgm:scene3d>
+      <a:camera prst="orthographicFront"/>
+      <a:lightRig rig="threePt" dir="t"/>
+    </dgm:scene3d>
+    <dgm:sp3d/>
+    <dgm:txPr/>
+    <dgm:style>
+      <a:lnRef idx="0">
+        <a:scrgbClr r="0" g="0" b="0"/>
+      </a:lnRef>
+      <a:fillRef idx="1">
+        <a:scrgbClr r="0" g="0" b="0"/>
+      </a:fillRef>
+      <a:effectRef idx="2">
+        <a:scrgbClr r="0" g="0" b="0"/>
+      </a:effectRef>
+      <a:fontRef idx="minor"/>
+    </dgm:style>
+  </dgm:styleLbl>
+  <dgm:styleLbl name="alignImgPlace1">
+    <dgm:scene3d>
+      <a:camera prst="orthographicFront"/>
+      <a:lightRig rig="threePt" dir="t"/>
+    </dgm:scene3d>
+    <dgm:sp3d/>
+    <dgm:txPr/>
+    <dgm:style>
+      <a:lnRef idx="0">
+        <a:scrgbClr r="0" g="0" b="0"/>
+      </a:lnRef>
+      <a:fillRef idx="1">
+        <a:scrgbClr r="0" g="0" b="0"/>
+      </a:fillRef>
+      <a:effectRef idx="2">
+        <a:scrgbClr r="0" g="0" b="0"/>
+      </a:effectRef>
+      <a:fontRef idx="minor"/>
+    </dgm:style>
+  </dgm:styleLbl>
+  <dgm:styleLbl name="bgImgPlace1">
+    <dgm:scene3d>
+      <a:camera prst="orthographicFront"/>
+      <a:lightRig rig="threePt" dir="t"/>
+    </dgm:scene3d>
+    <dgm:sp3d/>
+    <dgm:txPr/>
+    <dgm:style>
+      <a:lnRef idx="0">
+        <a:scrgbClr r="0" g="0" b="0"/>
+      </a:lnRef>
+      <a:fillRef idx="1">
+        <a:scrgbClr r="0" g="0" b="0"/>
+      </a:fillRef>
+      <a:effectRef idx="2">
+        <a:scrgbClr r="0" g="0" b="0"/>
+      </a:effectRef>
+      <a:fontRef idx="minor"/>
+    </dgm:style>
+  </dgm:styleLbl>
+  <dgm:styleLbl name="sibTrans2D1">
+    <dgm:scene3d>
+      <a:camera prst="orthographicFront"/>
+      <a:lightRig rig="threePt" dir="t"/>
+    </dgm:scene3d>
+    <dgm:sp3d/>
+    <dgm:txPr/>
+    <dgm:style>
+      <a:lnRef idx="0">
+        <a:scrgbClr r="0" g="0" b="0"/>
+      </a:lnRef>
+      <a:fillRef idx="3">
+        <a:scrgbClr r="0" g="0" b="0"/>
+      </a:fillRef>
+      <a:effectRef idx="2">
+        <a:scrgbClr r="0" g="0" b="0"/>
+      </a:effectRef>
+      <a:fontRef idx="minor">
+        <a:schemeClr val="lt1"/>
+      </a:fontRef>
+    </dgm:style>
+  </dgm:styleLbl>
+  <dgm:styleLbl name="fgSibTrans2D1">
+    <dgm:scene3d>
+      <a:camera prst="orthographicFront"/>
+      <a:lightRig rig="threePt" dir="t"/>
+    </dgm:scene3d>
+    <dgm:sp3d/>
+    <dgm:txPr/>
+    <dgm:style>
+      <a:lnRef idx="0">
+        <a:scrgbClr r="0" g="0" b="0"/>
+      </a:lnRef>
+      <a:fillRef idx="3">
+        <a:scrgbClr r="0" g="0" b="0"/>
+      </a:fillRef>
+      <a:effectRef idx="2">
+        <a:scrgbClr r="0" g="0" b="0"/>
+      </a:effectRef>
+      <a:fontRef idx="minor">
+        <a:schemeClr val="lt1"/>
+      </a:fontRef>
+    </dgm:style>
+  </dgm:styleLbl>
+  <dgm:styleLbl name="bgSibTrans2D1">
+    <dgm:scene3d>
+      <a:camera prst="orthographicFront"/>
+      <a:lightRig rig="threePt" dir="t"/>
+    </dgm:scene3d>
+    <dgm:sp3d/>
+    <dgm:txPr/>
+    <dgm:style>
+      <a:lnRef idx="0">
+        <a:scrgbClr r="0" g="0" b="0"/>
+      </a:lnRef>
+      <a:fillRef idx="3">
+        <a:scrgbClr r="0" g="0" b="0"/>
+      </a:fillRef>
+      <a:effectRef idx="2">
+        <a:scrgbClr r="0" g="0" b="0"/>
+      </a:effectRef>
+      <a:fontRef idx="minor">
+        <a:schemeClr val="lt1"/>
+      </a:fontRef>
+    </dgm:style>
+  </dgm:styleLbl>
+  <dgm:styleLbl name="sibTrans1D1">
+    <dgm:scene3d>
+      <a:camera prst="orthographicFront"/>
+      <a:lightRig rig="threePt" dir="t"/>
+    </dgm:scene3d>
+    <dgm:sp3d/>
+    <dgm:txPr/>
+    <dgm:style>
+      <a:lnRef idx="1">
+        <a:scrgbClr r="0" g="0" b="0"/>
+      </a:lnRef>
+      <a:fillRef idx="0">
+        <a:scrgbClr r="0" g="0" b="0"/>
+      </a:fillRef>
+      <a:effectRef idx="0">
+        <a:scrgbClr r="0" g="0" b="0"/>
+      </a:effectRef>
+      <a:fontRef idx="minor"/>
+    </dgm:style>
+  </dgm:styleLbl>
+  <dgm:styleLbl name="callout">
+    <dgm:scene3d>
+      <a:camera prst="orthographicFront"/>
+      <a:lightRig rig="threePt" dir="t"/>
+    </dgm:scene3d>
+    <dgm:sp3d/>
+    <dgm:txPr/>
+    <dgm:style>
+      <a:lnRef idx="2">
+        <a:scrgbClr r="0" g="0" b="0"/>
+      </a:lnRef>
+      <a:fillRef idx="1">
+        <a:scrgbClr r="0" g="0" b="0"/>
+      </a:fillRef>
+      <a:effectRef idx="1">
+        <a:scrgbClr r="0" g="0" b="0"/>
+      </a:effectRef>
+      <a:fontRef idx="minor"/>
+    </dgm:style>
+  </dgm:styleLbl>
+  <dgm:styleLbl name="asst0">
+    <dgm:scene3d>
+      <a:camera prst="orthographicFront"/>
+      <a:lightRig rig="threePt" dir="t"/>
+    </dgm:scene3d>
+    <dgm:sp3d/>
+    <dgm:txPr/>
+    <dgm:style>
+      <a:lnRef idx="0">
+        <a:scrgbClr r="0" g="0" b="0"/>
+      </a:lnRef>
+      <a:fillRef idx="3">
+        <a:scrgbClr r="0" g="0" b="0"/>
+      </a:fillRef>
+      <a:effectRef idx="2">
+        <a:scrgbClr r="0" g="0" b="0"/>
+      </a:effectRef>
+      <a:fontRef idx="minor">
+        <a:schemeClr val="lt1"/>
+      </a:fontRef>
+    </dgm:style>
+  </dgm:styleLbl>
+  <dgm:styleLbl name="asst1">
+    <dgm:scene3d>
+      <a:camera prst="orthographicFront"/>
+      <a:lightRig rig="threePt" dir="t"/>
+    </dgm:scene3d>
+    <dgm:sp3d/>
+    <dgm:txPr/>
+    <dgm:style>
+      <a:lnRef idx="0">
+        <a:scrgbClr r="0" g="0" b="0"/>
+      </a:lnRef>
+      <a:fillRef idx="3">
+        <a:scrgbClr r="0" g="0" b="0"/>
+      </a:fillRef>
+      <a:effectRef idx="2">
+        <a:scrgbClr r="0" g="0" b="0"/>
+      </a:effectRef>
+      <a:fontRef idx="minor">
+        <a:schemeClr val="lt1"/>
+      </a:fontRef>
+    </dgm:style>
+  </dgm:styleLbl>
+  <dgm:styleLbl name="asst2">
+    <dgm:scene3d>
+      <a:camera prst="orthographicFront"/>
+      <a:lightRig rig="threePt" dir="t"/>
+    </dgm:scene3d>
+    <dgm:sp3d/>
+    <dgm:txPr/>
+    <dgm:style>
+      <a:lnRef idx="0">
+        <a:scrgbClr r="0" g="0" b="0"/>
+      </a:lnRef>
+      <a:fillRef idx="3">
+        <a:scrgbClr r="0" g="0" b="0"/>
+      </a:fillRef>
+      <a:effectRef idx="2">
+        <a:scrgbClr r="0" g="0" b="0"/>
+      </a:effectRef>
+      <a:fontRef idx="minor">
+        <a:schemeClr val="lt1"/>
+      </a:fontRef>
+    </dgm:style>
+  </dgm:styleLbl>
+  <dgm:styleLbl name="asst3">
+    <dgm:scene3d>
+      <a:camera prst="orthographicFront"/>
+      <a:lightRig rig="threePt" dir="t"/>
+    </dgm:scene3d>
+    <dgm:sp3d/>
+    <dgm:txPr/>
+    <dgm:style>
+      <a:lnRef idx="0">
+        <a:scrgbClr r="0" g="0" b="0"/>
+      </a:lnRef>
+      <a:fillRef idx="3">
+        <a:scrgbClr r="0" g="0" b="0"/>
+      </a:fillRef>
+      <a:effectRef idx="2">
+        <a:scrgbClr r="0" g="0" b="0"/>
+      </a:effectRef>
+      <a:fontRef idx="minor">
+        <a:schemeClr val="lt1"/>
+      </a:fontRef>
+    </dgm:style>
+  </dgm:styleLbl>
+  <dgm:styleLbl name="asst4">
+    <dgm:scene3d>
+      <a:camera prst="orthographicFront"/>
+      <a:lightRig rig="threePt" dir="t"/>
+    </dgm:scene3d>
+    <dgm:sp3d/>
+    <dgm:txPr/>
+    <dgm:style>
+      <a:lnRef idx="0">
+        <a:scrgbClr r="0" g="0" b="0"/>
+      </a:lnRef>
+      <a:fillRef idx="3">
+        <a:scrgbClr r="0" g="0" b="0"/>
+      </a:fillRef>
+      <a:effectRef idx="2">
+        <a:scrgbClr r="0" g="0" b="0"/>
+      </a:effectRef>
+      <a:fontRef idx="minor">
+        <a:schemeClr val="lt1"/>
+      </a:fontRef>
+    </dgm:style>
+  </dgm:styleLbl>
+  <dgm:styleLbl name="parChTrans2D1">
+    <dgm:scene3d>
+      <a:camera prst="orthographicFront"/>
+      <a:lightRig rig="threePt" dir="t"/>
+    </dgm:scene3d>
+    <dgm:sp3d/>
+    <dgm:txPr/>
+    <dgm:style>
+      <a:lnRef idx="0">
+        <a:scrgbClr r="0" g="0" b="0"/>
+      </a:lnRef>
+      <a:fillRef idx="3">
+        <a:scrgbClr r="0" g="0" b="0"/>
+      </a:fillRef>
+      <a:effectRef idx="2">
+        <a:scrgbClr r="0" g="0" b="0"/>
+      </a:effectRef>
+      <a:fontRef idx="minor">
+        <a:schemeClr val="lt1"/>
+      </a:fontRef>
+    </dgm:style>
+  </dgm:styleLbl>
+  <dgm:styleLbl name="parChTrans2D2">
+    <dgm:scene3d>
+      <a:camera prst="orthographicFront"/>
+      <a:lightRig rig="threePt" dir="t"/>
+    </dgm:scene3d>
+    <dgm:sp3d/>
+    <dgm:txPr/>
+    <dgm:style>
+      <a:lnRef idx="0">
+        <a:scrgbClr r="0" g="0" b="0"/>
+      </a:lnRef>
+      <a:fillRef idx="3">
+        <a:scrgbClr r="0" g="0" b="0"/>
+      </a:fillRef>
+      <a:effectRef idx="2">
+        <a:scrgbClr r="0" g="0" b="0"/>
+      </a:effectRef>
+      <a:fontRef idx="minor">
+        <a:schemeClr val="lt1"/>
+      </a:fontRef>
+    </dgm:style>
+  </dgm:styleLbl>
+  <dgm:styleLbl name="parChTrans2D3">
+    <dgm:scene3d>
+      <a:camera prst="orthographicFront"/>
+      <a:lightRig rig="threePt" dir="t"/>
+    </dgm:scene3d>
+    <dgm:sp3d/>
+    <dgm:txPr/>
+    <dgm:style>
+      <a:lnRef idx="1">
+        <a:scrgbClr r="0" g="0" b="0"/>
+      </a:lnRef>
+      <a:fillRef idx="3">
+        <a:scrgbClr r="0" g="0" b="0"/>
+      </a:fillRef>
+      <a:effectRef idx="2">
+        <a:scrgbClr r="0" g="0" b="0"/>
+      </a:effectRef>
+      <a:fontRef idx="minor">
+        <a:schemeClr val="lt1"/>
+      </a:fontRef>
+    </dgm:style>
+  </dgm:styleLbl>
+  <dgm:styleLbl name="parChTrans2D4">
+    <dgm:scene3d>
+      <a:camera prst="orthographicFront"/>
+      <a:lightRig rig="threePt" dir="t"/>
+    </dgm:scene3d>
+    <dgm:sp3d/>
+    <dgm:txPr/>
+    <dgm:style>
+      <a:lnRef idx="1">
+        <a:scrgbClr r="0" g="0" b="0"/>
+      </a:lnRef>
+      <a:fillRef idx="3">
+        <a:scrgbClr r="0" g="0" b="0"/>
+      </a:fillRef>
+      <a:effectRef idx="2">
+        <a:scrgbClr r="0" g="0" b="0"/>
+      </a:effectRef>
+      <a:fontRef idx="minor">
+        <a:schemeClr val="lt1"/>
+      </a:fontRef>
+    </dgm:style>
+  </dgm:styleLbl>
+  <dgm:styleLbl name="parChTrans1D1">
+    <dgm:scene3d>
+      <a:camera prst="orthographicFront"/>
+      <a:lightRig rig="threePt" dir="t"/>
+    </dgm:scene3d>
+    <dgm:sp3d/>
+    <dgm:txPr/>
+    <dgm:style>
+      <a:lnRef idx="1">
+        <a:scrgbClr r="0" g="0" b="0"/>
+      </a:lnRef>
+      <a:fillRef idx="0">
+        <a:scrgbClr r="0" g="0" b="0"/>
+      </a:fillRef>
+      <a:effectRef idx="0">
+        <a:scrgbClr r="0" g="0" b="0"/>
+      </a:effectRef>
+      <a:fontRef idx="minor"/>
+    </dgm:style>
+  </dgm:styleLbl>
+  <dgm:styleLbl name="parChTrans1D2">
+    <dgm:scene3d>
+      <a:camera prst="orthographicFront"/>
+      <a:lightRig rig="threePt" dir="t"/>
+    </dgm:scene3d>
+    <dgm:sp3d/>
+    <dgm:txPr/>
+    <dgm:style>
+      <a:lnRef idx="1">
+        <a:scrgbClr r="0" g="0" b="0"/>
+      </a:lnRef>
+      <a:fillRef idx="0">
+        <a:scrgbClr r="0" g="0" b="0"/>
+      </a:fillRef>
+      <a:effectRef idx="0">
+        <a:scrgbClr r="0" g="0" b="0"/>
+      </a:effectRef>
+      <a:fontRef idx="minor"/>
+    </dgm:style>
+  </dgm:styleLbl>
+  <dgm:styleLbl name="parChTrans1D3">
+    <dgm:scene3d>
+      <a:camera prst="orthographicFront"/>
+      <a:lightRig rig="threePt" dir="t"/>
+    </dgm:scene3d>
+    <dgm:sp3d/>
+    <dgm:txPr/>
+    <dgm:style>
+      <a:lnRef idx="1">
+        <a:scrgbClr r="0" g="0" b="0"/>
+      </a:lnRef>
+      <a:fillRef idx="0">
+        <a:scrgbClr r="0" g="0" b="0"/>
+      </a:fillRef>
+      <a:effectRef idx="0">
+        <a:scrgbClr r="0" g="0" b="0"/>
+      </a:effectRef>
+      <a:fontRef idx="minor"/>
+    </dgm:style>
+  </dgm:styleLbl>
+  <dgm:styleLbl name="parChTrans1D4">
+    <dgm:scene3d>
+      <a:camera prst="orthographicFront"/>
+      <a:lightRig rig="threePt" dir="t"/>
+    </dgm:scene3d>
+    <dgm:sp3d/>
+    <dgm:txPr/>
+    <dgm:style>
+      <a:lnRef idx="1">
+        <a:scrgbClr r="0" g="0" b="0"/>
+      </a:lnRef>
+      <a:fillRef idx="0">
+        <a:scrgbClr r="0" g="0" b="0"/>
+      </a:fillRef>
+      <a:effectRef idx="0">
+        <a:scrgbClr r="0" g="0" b="0"/>
+      </a:effectRef>
+      <a:fontRef idx="minor"/>
+    </dgm:style>
+  </dgm:styleLbl>
+  <dgm:styleLbl name="fgAcc1">
+    <dgm:scene3d>
+      <a:camera prst="orthographicFront"/>
+      <a:lightRig rig="threePt" dir="t"/>
+    </dgm:scene3d>
+    <dgm:sp3d/>
+    <dgm:txPr/>
+    <dgm:style>
+      <a:lnRef idx="1">
+        <a:scrgbClr r="0" g="0" b="0"/>
+      </a:lnRef>
+      <a:fillRef idx="1">
+        <a:scrgbClr r="0" g="0" b="0"/>
+      </a:fillRef>
+      <a:effectRef idx="0">
+        <a:scrgbClr r="0" g="0" b="0"/>
+      </a:effectRef>
+      <a:fontRef idx="minor"/>
+    </dgm:style>
+  </dgm:styleLbl>
+  <dgm:styleLbl name="conFgAcc1">
+    <dgm:scene3d>
+      <a:camera prst="orthographicFront"/>
+      <a:lightRig rig="threePt" dir="t"/>
+    </dgm:scene3d>
+    <dgm:sp3d/>
+    <dgm:txPr/>
+    <dgm:style>
+      <a:lnRef idx="1">
+        <a:scrgbClr r="0" g="0" b="0"/>
+      </a:lnRef>
+      <a:fillRef idx="1">
+        <a:scrgbClr r="0" g="0" b="0"/>
+      </a:fillRef>
+      <a:effectRef idx="0">
+        <a:scrgbClr r="0" g="0" b="0"/>
+      </a:effectRef>
+      <a:fontRef idx="minor"/>
+    </dgm:style>
+  </dgm:styleLbl>
+  <dgm:styleLbl name="alignAcc1">
+    <dgm:scene3d>
+      <a:camera prst="orthographicFront"/>
+      <a:lightRig rig="threePt" dir="t"/>
+    </dgm:scene3d>
+    <dgm:sp3d/>
+    <dgm:txPr/>
+    <dgm:style>
+      <a:lnRef idx="1">
+        <a:scrgbClr r="0" g="0" b="0"/>
+      </a:lnRef>
+      <a:fillRef idx="1">
+        <a:scrgbClr r="0" g="0" b="0"/>
+      </a:fillRef>
+      <a:effectRef idx="0">
+        <a:scrgbClr r="0" g="0" b="0"/>
+      </a:effectRef>
+      <a:fontRef idx="minor"/>
+    </dgm:style>
+  </dgm:styleLbl>
+  <dgm:styleLbl name="trAlignAcc1">
+    <dgm:scene3d>
+      <a:camera prst="orthographicFront"/>
+      <a:lightRig rig="threePt" dir="t"/>
+    </dgm:scene3d>
+    <dgm:sp3d/>
+    <dgm:txPr/>
+    <dgm:style>
+      <a:lnRef idx="1">
+        <a:scrgbClr r="0" g="0" b="0"/>
+      </a:lnRef>
+      <a:fillRef idx="1">
+        <a:scrgbClr r="0" g="0" b="0"/>
+      </a:fillRef>
+      <a:effectRef idx="0">
+        <a:scrgbClr r="0" g="0" b="0"/>
+      </a:effectRef>
+      <a:fontRef idx="minor"/>
+    </dgm:style>
+  </dgm:styleLbl>
+  <dgm:styleLbl name="bgAcc1">
+    <dgm:scene3d>
+      <a:camera prst="orthographicFront"/>
+      <a:lightRig rig="threePt" dir="t"/>
+    </dgm:scene3d>
+    <dgm:sp3d/>
+    <dgm:txPr/>
+    <dgm:style>
+      <a:lnRef idx="1">
+        <a:scrgbClr r="0" g="0" b="0"/>
+      </a:lnRef>
+      <a:fillRef idx="1">
+        <a:scrgbClr r="0" g="0" b="0"/>
+      </a:fillRef>
+      <a:effectRef idx="0">
+        <a:scrgbClr r="0" g="0" b="0"/>
+      </a:effectRef>
+      <a:fontRef idx="minor"/>
+    </dgm:style>
+  </dgm:styleLbl>
+  <dgm:styleLbl name="solidFgAcc1">
+    <dgm:scene3d>
+      <a:camera prst="orthographicFront"/>
+      <a:lightRig rig="threePt" dir="t"/>
+    </dgm:scene3d>
+    <dgm:sp3d/>
+    <dgm:txPr/>
+    <dgm:style>
+      <a:lnRef idx="1">
+        <a:scrgbClr r="0" g="0" b="0"/>
+      </a:lnRef>
+      <a:fillRef idx="1">
+        <a:scrgbClr r="0" g="0" b="0"/>
+      </a:fillRef>
+      <a:effectRef idx="0">
+        <a:scrgbClr r="0" g="0" b="0"/>
+      </a:effectRef>
+      <a:fontRef idx="minor"/>
+    </dgm:style>
+  </dgm:styleLbl>
+  <dgm:styleLbl name="solidAlignAcc1">
+    <dgm:scene3d>
+      <a:camera prst="orthographicFront"/>
+      <a:lightRig rig="threePt" dir="t"/>
+    </dgm:scene3d>
+    <dgm:sp3d/>
+    <dgm:txPr/>
+    <dgm:style>
+      <a:lnRef idx="1">
+        <a:scrgbClr r="0" g="0" b="0"/>
+      </a:lnRef>
+      <a:fillRef idx="1">
+        <a:scrgbClr r="0" g="0" b="0"/>
+      </a:fillRef>
+      <a:effectRef idx="0">
+        <a:scrgbClr r="0" g="0" b="0"/>
+      </a:effectRef>
+      <a:fontRef idx="minor"/>
+    </dgm:style>
+  </dgm:styleLbl>
+  <dgm:styleLbl name="solidBgAcc1">
+    <dgm:scene3d>
+      <a:camera prst="orthographicFront"/>
+      <a:lightRig rig="threePt" dir="t"/>
+    </dgm:scene3d>
+    <dgm:sp3d/>
+    <dgm:txPr/>
+    <dgm:style>
+      <a:lnRef idx="1">
+        <a:scrgbClr r="0" g="0" b="0"/>
+      </a:lnRef>
+      <a:fillRef idx="1">
+        <a:scrgbClr r="0" g="0" b="0"/>
+      </a:fillRef>
+      <a:effectRef idx="0">
+        <a:scrgbClr r="0" g="0" b="0"/>
+      </a:effectRef>
+      <a:fontRef idx="minor"/>
+    </dgm:style>
+  </dgm:styleLbl>
+  <dgm:styleLbl name="fgAccFollowNode1">
+    <dgm:scene3d>
+      <a:camera prst="orthographicFront"/>
+      <a:lightRig rig="threePt" dir="t"/>
+    </dgm:scene3d>
+    <dgm:sp3d/>
+    <dgm:txPr/>
+    <dgm:style>
+      <a:lnRef idx="1">
+        <a:scrgbClr r="0" g="0" b="0"/>
+      </a:lnRef>
+      <a:fillRef idx="1">
+        <a:scrgbClr r="0" g="0" b="0"/>
+      </a:fillRef>
+      <a:effectRef idx="0">
+        <a:scrgbClr r="0" g="0" b="0"/>
+      </a:effectRef>
+      <a:fontRef idx="minor"/>
+    </dgm:style>
+  </dgm:styleLbl>
+  <dgm:styleLbl name="alignAccFollowNode1">
+    <dgm:scene3d>
+      <a:camera prst="orthographicFront"/>
+      <a:lightRig rig="threePt" dir="t"/>
+    </dgm:scene3d>
+    <dgm:sp3d/>
+    <dgm:txPr/>
+    <dgm:style>
+      <a:lnRef idx="1">
+        <a:scrgbClr r="0" g="0" b="0"/>
+      </a:lnRef>
+      <a:fillRef idx="1">
+        <a:scrgbClr r="0" g="0" b="0"/>
+      </a:fillRef>
+      <a:effectRef idx="0">
+        <a:scrgbClr r="0" g="0" b="0"/>
+      </a:effectRef>
+      <a:fontRef idx="minor"/>
+    </dgm:style>
+  </dgm:styleLbl>
+  <dgm:styleLbl name="bgAccFollowNode1">
+    <dgm:scene3d>
+      <a:camera prst="orthographicFront"/>
+      <a:lightRig rig="threePt" dir="t"/>
+    </dgm:scene3d>
+    <dgm:sp3d/>
+    <dgm:txPr/>
+    <dgm:style>
+      <a:lnRef idx="1">
+        <a:scrgbClr r="0" g="0" b="0"/>
+      </a:lnRef>
+      <a:fillRef idx="1">
+        <a:scrgbClr r="0" g="0" b="0"/>
+      </a:fillRef>
+      <a:effectRef idx="0">
+        <a:scrgbClr r="0" g="0" b="0"/>
+      </a:effectRef>
+      <a:fontRef idx="minor"/>
+    </dgm:style>
+  </dgm:styleLbl>
+  <dgm:styleLbl name="fgAcc0">
+    <dgm:scene3d>
+      <a:camera prst="orthographicFront"/>
+      <a:lightRig rig="threePt" dir="t"/>
+    </dgm:scene3d>
+    <dgm:sp3d/>
+    <dgm:txPr/>
+    <dgm:style>
+      <a:lnRef idx="1">
+        <a:scrgbClr r="0" g="0" b="0"/>
+      </a:lnRef>
+      <a:fillRef idx="1">
+        <a:scrgbClr r="0" g="0" b="0"/>
+      </a:fillRef>
+      <a:effectRef idx="0">
+        <a:scrgbClr r="0" g="0" b="0"/>
+      </a:effectRef>
+      <a:fontRef idx="minor"/>
+    </dgm:style>
+  </dgm:styleLbl>
+  <dgm:styleLbl name="fgAcc2">
+    <dgm:scene3d>
+      <a:camera prst="orthographicFront"/>
+      <a:lightRig rig="threePt" dir="t"/>
+    </dgm:scene3d>
+    <dgm:sp3d/>
+    <dgm:txPr/>
+    <dgm:style>
+      <a:lnRef idx="1">
+        <a:scrgbClr r="0" g="0" b="0"/>
+      </a:lnRef>
+      <a:fillRef idx="1">
+        <a:scrgbClr r="0" g="0" b="0"/>
+      </a:fillRef>
+      <a:effectRef idx="0">
+        <a:scrgbClr r="0" g="0" b="0"/>
+      </a:effectRef>
+      <a:fontRef idx="minor"/>
+    </dgm:style>
+  </dgm:styleLbl>
+  <dgm:styleLbl name="fgAcc3">
+    <dgm:scene3d>
+      <a:camera prst="orthographicFront"/>
+      <a:lightRig rig="threePt" dir="t"/>
+    </dgm:scene3d>
+    <dgm:sp3d/>
+    <dgm:txPr/>
+    <dgm:style>
+      <a:lnRef idx="1">
+        <a:scrgbClr r="0" g="0" b="0"/>
+      </a:lnRef>
+      <a:fillRef idx="1">
+        <a:scrgbClr r="0" g="0" b="0"/>
+      </a:fillRef>
+      <a:effectRef idx="0">
+        <a:scrgbClr r="0" g="0" b="0"/>
+      </a:effectRef>
+      <a:fontRef idx="minor"/>
+    </dgm:style>
+  </dgm:styleLbl>
+  <dgm:styleLbl name="fgAcc4">
+    <dgm:scene3d>
+      <a:camera prst="orthographicFront"/>
+      <a:lightRig rig="threePt" dir="t"/>
+    </dgm:scene3d>
+    <dgm:sp3d/>
+    <dgm:txPr/>
+    <dgm:style>
+      <a:lnRef idx="1">
+        <a:scrgbClr r="0" g="0" b="0"/>
+      </a:lnRef>
+      <a:fillRef idx="1">
+        <a:scrgbClr r="0" g="0" b="0"/>
+      </a:fillRef>
+      <a:effectRef idx="0">
+        <a:scrgbClr r="0" g="0" b="0"/>
+      </a:effectRef>
+      <a:fontRef idx="minor"/>
+    </dgm:style>
+  </dgm:styleLbl>
+  <dgm:styleLbl name="bgShp">
+    <dgm:scene3d>
+      <a:camera prst="orthographicFront"/>
+      <a:lightRig rig="threePt" dir="t"/>
+    </dgm:scene3d>
+    <dgm:sp3d/>
+    <dgm:txPr/>
+    <dgm:style>
+      <a:lnRef idx="0">
+        <a:scrgbClr r="0" g="0" b="0"/>
+      </a:lnRef>
+      <a:fillRef idx="1">
+        <a:scrgbClr r="0" g="0" b="0"/>
+      </a:fillRef>
+      <a:effectRef idx="2">
+        <a:scrgbClr r="0" g="0" b="0"/>
+      </a:effectRef>
+      <a:fontRef idx="minor"/>
+    </dgm:style>
+  </dgm:styleLbl>
+  <dgm:styleLbl name="dkBgShp">
+    <dgm:scene3d>
+      <a:camera prst="orthographicFront"/>
+      <a:lightRig rig="threePt" dir="t"/>
+    </dgm:scene3d>
+    <dgm:sp3d/>
+    <dgm:txPr/>
+    <dgm:style>
+      <a:lnRef idx="0">
+        <a:scrgbClr r="0" g="0" b="0"/>
+      </a:lnRef>
+      <a:fillRef idx="1">
+        <a:scrgbClr r="0" g="0" b="0"/>
+      </a:fillRef>
+      <a:effectRef idx="2">
+        <a:scrgbClr r="0" g="0" b="0"/>
+      </a:effectRef>
+      <a:fontRef idx="minor"/>
+    </dgm:style>
+  </dgm:styleLbl>
+  <dgm:styleLbl name="trBgShp">
+    <dgm:scene3d>
+      <a:camera prst="orthographicFront"/>
+      <a:lightRig rig="threePt" dir="t"/>
+    </dgm:scene3d>
+    <dgm:sp3d/>
+    <dgm:txPr/>
+    <dgm:style>
+      <a:lnRef idx="0">
+        <a:scrgbClr r="0" g="0" b="0"/>
+      </a:lnRef>
+      <a:fillRef idx="1">
+        <a:scrgbClr r="0" g="0" b="0"/>
+      </a:fillRef>
+      <a:effectRef idx="0">
+        <a:scrgbClr r="0" g="0" b="0"/>
+      </a:effectRef>
+      <a:fontRef idx="minor"/>
+    </dgm:style>
+  </dgm:styleLbl>
+  <dgm:styleLbl name="fgShp">
+    <dgm:scene3d>
+      <a:camera prst="orthographicFront"/>
+      <a:lightRig rig="threePt" dir="t"/>
+    </dgm:scene3d>
+    <dgm:sp3d/>
+    <dgm:txPr/>
+    <dgm:style>
+      <a:lnRef idx="0">
+        <a:scrgbClr r="0" g="0" b="0"/>
+      </a:lnRef>
+      <a:fillRef idx="3">
+        <a:scrgbClr r="0" g="0" b="0"/>
+      </a:fillRef>
+      <a:effectRef idx="2">
         <a:scrgbClr r="0" g="0" b="0"/>
       </a:effectRef>
       <a:fontRef idx="minor"/>
@@ -11527,7 +15570,7 @@
           <a:p>
             <a:fld id="{0223C948-72A7-EB41-AACA-4802244B397F}" type="datetimeFigureOut">
               <a:rPr lang="fr-FR" smtClean="0"/>
-              <a:t>2013/5/22</a:t>
+              <a:t>2013/5/28</a:t>
             </a:fld>
             <a:endParaRPr lang="fr-FR" dirty="0"/>
           </a:p>
@@ -11697,7 +15740,7 @@
           <a:p>
             <a:fld id="{0223C948-72A7-EB41-AACA-4802244B397F}" type="datetimeFigureOut">
               <a:rPr lang="fr-FR" smtClean="0"/>
-              <a:t>2013/5/22</a:t>
+              <a:t>2013/5/28</a:t>
             </a:fld>
             <a:endParaRPr lang="fr-FR" dirty="0"/>
           </a:p>
@@ -11877,7 +15920,7 @@
           <a:p>
             <a:fld id="{0223C948-72A7-EB41-AACA-4802244B397F}" type="datetimeFigureOut">
               <a:rPr lang="fr-FR" smtClean="0"/>
-              <a:t>2013/5/22</a:t>
+              <a:t>2013/5/28</a:t>
             </a:fld>
             <a:endParaRPr lang="fr-FR" dirty="0"/>
           </a:p>
@@ -12047,7 +16090,7 @@
           <a:p>
             <a:fld id="{0223C948-72A7-EB41-AACA-4802244B397F}" type="datetimeFigureOut">
               <a:rPr lang="fr-FR" smtClean="0"/>
-              <a:t>2013/5/22</a:t>
+              <a:t>2013/5/28</a:t>
             </a:fld>
             <a:endParaRPr lang="fr-FR" dirty="0"/>
           </a:p>
@@ -12293,7 +16336,7 @@
           <a:p>
             <a:fld id="{0223C948-72A7-EB41-AACA-4802244B397F}" type="datetimeFigureOut">
               <a:rPr lang="fr-FR" smtClean="0"/>
-              <a:t>2013/5/22</a:t>
+              <a:t>2013/5/28</a:t>
             </a:fld>
             <a:endParaRPr lang="fr-FR" dirty="0"/>
           </a:p>
@@ -12581,7 +16624,7 @@
           <a:p>
             <a:fld id="{0223C948-72A7-EB41-AACA-4802244B397F}" type="datetimeFigureOut">
               <a:rPr lang="fr-FR" smtClean="0"/>
-              <a:t>2013/5/22</a:t>
+              <a:t>2013/5/28</a:t>
             </a:fld>
             <a:endParaRPr lang="fr-FR" dirty="0"/>
           </a:p>
@@ -13003,7 +17046,7 @@
           <a:p>
             <a:fld id="{0223C948-72A7-EB41-AACA-4802244B397F}" type="datetimeFigureOut">
               <a:rPr lang="fr-FR" smtClean="0"/>
-              <a:t>2013/5/22</a:t>
+              <a:t>2013/5/28</a:t>
             </a:fld>
             <a:endParaRPr lang="fr-FR" dirty="0"/>
           </a:p>
@@ -13121,7 +17164,7 @@
           <a:p>
             <a:fld id="{0223C948-72A7-EB41-AACA-4802244B397F}" type="datetimeFigureOut">
               <a:rPr lang="fr-FR" smtClean="0"/>
-              <a:t>2013/5/22</a:t>
+              <a:t>2013/5/28</a:t>
             </a:fld>
             <a:endParaRPr lang="fr-FR" dirty="0"/>
           </a:p>
@@ -13216,7 +17259,7 @@
           <a:p>
             <a:fld id="{0223C948-72A7-EB41-AACA-4802244B397F}" type="datetimeFigureOut">
               <a:rPr lang="fr-FR" smtClean="0"/>
-              <a:t>2013/5/22</a:t>
+              <a:t>2013/5/28</a:t>
             </a:fld>
             <a:endParaRPr lang="fr-FR" dirty="0"/>
           </a:p>
@@ -13493,7 +17536,7 @@
           <a:p>
             <a:fld id="{0223C948-72A7-EB41-AACA-4802244B397F}" type="datetimeFigureOut">
               <a:rPr lang="fr-FR" smtClean="0"/>
-              <a:t>2013/5/22</a:t>
+              <a:t>2013/5/28</a:t>
             </a:fld>
             <a:endParaRPr lang="fr-FR" dirty="0"/>
           </a:p>
@@ -13746,7 +17789,7 @@
           <a:p>
             <a:fld id="{0223C948-72A7-EB41-AACA-4802244B397F}" type="datetimeFigureOut">
               <a:rPr lang="fr-FR" smtClean="0"/>
-              <a:t>2013/5/22</a:t>
+              <a:t>2013/5/28</a:t>
             </a:fld>
             <a:endParaRPr lang="fr-FR" dirty="0"/>
           </a:p>
@@ -13959,7 +18002,7 @@
           <a:p>
             <a:fld id="{0223C948-72A7-EB41-AACA-4802244B397F}" type="datetimeFigureOut">
               <a:rPr lang="fr-FR" smtClean="0"/>
-              <a:t>2013/5/22</a:t>
+              <a:t>2013/5/28</a:t>
             </a:fld>
             <a:endParaRPr lang="fr-FR" dirty="0"/>
           </a:p>
@@ -15538,10 +19581,706 @@
           <a:chExt cx="0" cy="0"/>
         </a:xfrm>
       </p:grpSpPr>
+      <p:graphicFrame>
+        <p:nvGraphicFramePr>
+          <p:cNvPr id="2" name="Diagramme 1"/>
+          <p:cNvGraphicFramePr/>
+          <p:nvPr>
+            <p:extLst>
+              <p:ext uri="{D42A27DB-BD31-4B8C-83A1-F6EECF244321}">
+                <p14:modId xmlns:p14="http://schemas.microsoft.com/office/powerpoint/2010/main" val="1801544632"/>
+              </p:ext>
+            </p:extLst>
+          </p:nvPr>
+        </p:nvGraphicFramePr>
+        <p:xfrm>
+          <a:off x="683568" y="2996952"/>
+          <a:ext cx="7848872" cy="3429000"/>
+        </p:xfrm>
+        <a:graphic>
+          <a:graphicData uri="http://schemas.openxmlformats.org/drawingml/2006/diagram">
+            <dgm:relIds xmlns:dgm="http://schemas.openxmlformats.org/drawingml/2006/diagram" xmlns:r="http://schemas.openxmlformats.org/officeDocument/2006/relationships" r:dm="rId2" r:lo="rId3" r:qs="rId4" r:cs="rId5"/>
+          </a:graphicData>
+        </a:graphic>
+      </p:graphicFrame>
+      <p:pic>
+        <p:nvPicPr>
+          <p:cNvPr id="5" name="Image 4" descr="microwat_n3.pdf"/>
+          <p:cNvPicPr>
+            <a:picLocks noChangeAspect="1"/>
+          </p:cNvPicPr>
+          <p:nvPr/>
+        </p:nvPicPr>
+        <p:blipFill>
+          <a:blip r:embed="rId7">
+            <a:extLst>
+              <a:ext uri="{28A0092B-C50C-407E-A947-70E740481C1C}">
+                <a14:useLocalDpi xmlns:a14="http://schemas.microsoft.com/office/drawing/2010/main" val="0"/>
+              </a:ext>
+            </a:extLst>
+          </a:blip>
+          <a:stretch>
+            <a:fillRect/>
+          </a:stretch>
+        </p:blipFill>
+        <p:spPr>
+          <a:xfrm>
+            <a:off x="6203947" y="3244776"/>
+            <a:ext cx="2159000" cy="482600"/>
+          </a:xfrm>
+          <a:prstGeom prst="rect">
+            <a:avLst/>
+          </a:prstGeom>
+        </p:spPr>
+      </p:pic>
+      <p:pic>
+        <p:nvPicPr>
+          <p:cNvPr id="8" name="Image 7" descr="microwat_n2.pdf"/>
+          <p:cNvPicPr>
+            <a:picLocks noChangeAspect="1"/>
+          </p:cNvPicPr>
+          <p:nvPr/>
+        </p:nvPicPr>
+        <p:blipFill>
+          <a:blip r:embed="rId8">
+            <a:extLst>
+              <a:ext uri="{28A0092B-C50C-407E-A947-70E740481C1C}">
+                <a14:useLocalDpi xmlns:a14="http://schemas.microsoft.com/office/drawing/2010/main" val="0"/>
+              </a:ext>
+            </a:extLst>
+          </a:blip>
+          <a:stretch>
+            <a:fillRect/>
+          </a:stretch>
+        </p:blipFill>
+        <p:spPr>
+          <a:xfrm>
+            <a:off x="3492500" y="3244776"/>
+            <a:ext cx="2159000" cy="482600"/>
+          </a:xfrm>
+          <a:prstGeom prst="rect">
+            <a:avLst/>
+          </a:prstGeom>
+        </p:spPr>
+      </p:pic>
+      <p:pic>
+        <p:nvPicPr>
+          <p:cNvPr id="9" name="Image 8" descr="microwat_n1.pdf"/>
+          <p:cNvPicPr>
+            <a:picLocks noChangeAspect="1"/>
+          </p:cNvPicPr>
+          <p:nvPr/>
+        </p:nvPicPr>
+        <p:blipFill>
+          <a:blip r:embed="rId9">
+            <a:extLst>
+              <a:ext uri="{28A0092B-C50C-407E-A947-70E740481C1C}">
+                <a14:useLocalDpi xmlns:a14="http://schemas.microsoft.com/office/drawing/2010/main" val="0"/>
+              </a:ext>
+            </a:extLst>
+          </a:blip>
+          <a:stretch>
+            <a:fillRect/>
+          </a:stretch>
+        </p:blipFill>
+        <p:spPr>
+          <a:xfrm>
+            <a:off x="1066734" y="3244776"/>
+            <a:ext cx="1701800" cy="482600"/>
+          </a:xfrm>
+          <a:prstGeom prst="rect">
+            <a:avLst/>
+          </a:prstGeom>
+        </p:spPr>
+      </p:pic>
     </p:spTree>
     <p:extLst>
       <p:ext uri="{BB962C8B-B14F-4D97-AF65-F5344CB8AC3E}">
         <p14:creationId xmlns:p14="http://schemas.microsoft.com/office/powerpoint/2010/main" val="1005934443"/>
+      </p:ext>
+    </p:extLst>
+  </p:cSld>
+  <p:clrMapOvr>
+    <a:masterClrMapping/>
+  </p:clrMapOvr>
+</p:sld>
+</file>
+
+<file path=ppt/slides/slide6.xml><?xml version="1.0" encoding="utf-8"?>
+<p:sld xmlns:a="http://schemas.openxmlformats.org/drawingml/2006/main" xmlns:r="http://schemas.openxmlformats.org/officeDocument/2006/relationships" xmlns:p="http://schemas.openxmlformats.org/presentationml/2006/main">
+  <p:cSld>
+    <p:spTree>
+      <p:nvGrpSpPr>
+        <p:cNvPr id="1" name=""/>
+        <p:cNvGrpSpPr/>
+        <p:nvPr/>
+      </p:nvGrpSpPr>
+      <p:grpSpPr>
+        <a:xfrm>
+          <a:off x="0" y="0"/>
+          <a:ext cx="0" cy="0"/>
+          <a:chOff x="0" y="0"/>
+          <a:chExt cx="0" cy="0"/>
+        </a:xfrm>
+      </p:grpSpPr>
+      <p:graphicFrame>
+        <p:nvGraphicFramePr>
+          <p:cNvPr id="2" name="Graphique 1"/>
+          <p:cNvGraphicFramePr/>
+          <p:nvPr>
+            <p:extLst>
+              <p:ext uri="{D42A27DB-BD31-4B8C-83A1-F6EECF244321}">
+                <p14:modId xmlns:p14="http://schemas.microsoft.com/office/powerpoint/2010/main" val="868187991"/>
+              </p:ext>
+            </p:extLst>
+          </p:nvPr>
+        </p:nvGraphicFramePr>
+        <p:xfrm>
+          <a:off x="1524001" y="1397000"/>
+          <a:ext cx="4997744" cy="4064000"/>
+        </p:xfrm>
+        <a:graphic>
+          <a:graphicData uri="http://schemas.openxmlformats.org/drawingml/2006/chart">
+            <c:chart xmlns:c="http://schemas.openxmlformats.org/drawingml/2006/chart" xmlns:r="http://schemas.openxmlformats.org/officeDocument/2006/relationships" r:id="rId2"/>
+          </a:graphicData>
+        </a:graphic>
+      </p:graphicFrame>
+      <p:sp>
+        <p:nvSpPr>
+          <p:cNvPr id="3" name="ZoneTexte 2"/>
+          <p:cNvSpPr txBox="1"/>
+          <p:nvPr/>
+        </p:nvSpPr>
+        <p:spPr>
+          <a:xfrm>
+            <a:off x="723613" y="1217878"/>
+            <a:ext cx="843200" cy="338554"/>
+          </a:xfrm>
+          <a:prstGeom prst="rect">
+            <a:avLst/>
+          </a:prstGeom>
+          <a:noFill/>
+        </p:spPr>
+        <p:txBody>
+          <a:bodyPr wrap="none" rtlCol="0">
+            <a:spAutoFit/>
+          </a:bodyPr>
+          <a:lstStyle/>
+          <a:p>
+            <a:pPr algn="ctr"/>
+            <a:r>
+              <a:rPr lang="fr-FR" sz="1600" dirty="0" smtClean="0"/>
+              <a:t>RMS (K)</a:t>
+            </a:r>
+          </a:p>
+        </p:txBody>
+      </p:sp>
+      <p:pic>
+        <p:nvPicPr>
+          <p:cNvPr id="4" name="Image 3" descr="microwat_n1.pdf"/>
+          <p:cNvPicPr>
+            <a:picLocks noChangeAspect="1"/>
+          </p:cNvPicPr>
+          <p:nvPr/>
+        </p:nvPicPr>
+        <p:blipFill>
+          <a:blip r:embed="rId3">
+            <a:extLst>
+              <a:ext uri="{28A0092B-C50C-407E-A947-70E740481C1C}">
+                <a14:useLocalDpi xmlns:a14="http://schemas.microsoft.com/office/drawing/2010/main" val="0"/>
+              </a:ext>
+            </a:extLst>
+          </a:blip>
+          <a:stretch>
+            <a:fillRect/>
+          </a:stretch>
+        </p:blipFill>
+        <p:spPr>
+          <a:xfrm rot="19002371">
+            <a:off x="2988943" y="5684498"/>
+            <a:ext cx="1453528" cy="412195"/>
+          </a:xfrm>
+          <a:prstGeom prst="rect">
+            <a:avLst/>
+          </a:prstGeom>
+        </p:spPr>
+      </p:pic>
+      <p:pic>
+        <p:nvPicPr>
+          <p:cNvPr id="5" name="Image 4" descr="microwat_n2.pdf"/>
+          <p:cNvPicPr>
+            <a:picLocks noChangeAspect="1"/>
+          </p:cNvPicPr>
+          <p:nvPr/>
+        </p:nvPicPr>
+        <p:blipFill>
+          <a:blip r:embed="rId4">
+            <a:extLst>
+              <a:ext uri="{28A0092B-C50C-407E-A947-70E740481C1C}">
+                <a14:useLocalDpi xmlns:a14="http://schemas.microsoft.com/office/drawing/2010/main" val="0"/>
+              </a:ext>
+            </a:extLst>
+          </a:blip>
+          <a:stretch>
+            <a:fillRect/>
+          </a:stretch>
+        </p:blipFill>
+        <p:spPr>
+          <a:xfrm rot="19002371">
+            <a:off x="3349030" y="5818388"/>
+            <a:ext cx="1844028" cy="412194"/>
+          </a:xfrm>
+          <a:prstGeom prst="rect">
+            <a:avLst/>
+          </a:prstGeom>
+        </p:spPr>
+      </p:pic>
+      <p:pic>
+        <p:nvPicPr>
+          <p:cNvPr id="6" name="Image 5" descr="microwat_n3.pdf"/>
+          <p:cNvPicPr>
+            <a:picLocks noChangeAspect="1"/>
+          </p:cNvPicPr>
+          <p:nvPr/>
+        </p:nvPicPr>
+        <p:blipFill>
+          <a:blip r:embed="rId5">
+            <a:extLst>
+              <a:ext uri="{28A0092B-C50C-407E-A947-70E740481C1C}">
+                <a14:useLocalDpi xmlns:a14="http://schemas.microsoft.com/office/drawing/2010/main" val="0"/>
+              </a:ext>
+            </a:extLst>
+          </a:blip>
+          <a:stretch>
+            <a:fillRect/>
+          </a:stretch>
+        </p:blipFill>
+        <p:spPr>
+          <a:xfrm rot="19002371">
+            <a:off x="3975921" y="5818388"/>
+            <a:ext cx="1844028" cy="412194"/>
+          </a:xfrm>
+          <a:prstGeom prst="rect">
+            <a:avLst/>
+          </a:prstGeom>
+        </p:spPr>
+      </p:pic>
+      <p:pic>
+        <p:nvPicPr>
+          <p:cNvPr id="7" name="Image 6" descr="microwat_overlinex.pdf"/>
+          <p:cNvPicPr>
+            <a:picLocks noChangeAspect="1"/>
+          </p:cNvPicPr>
+          <p:nvPr/>
+        </p:nvPicPr>
+        <p:blipFill>
+          <a:blip r:embed="rId6">
+            <a:extLst>
+              <a:ext uri="{28A0092B-C50C-407E-A947-70E740481C1C}">
+                <a14:useLocalDpi xmlns:a14="http://schemas.microsoft.com/office/drawing/2010/main" val="0"/>
+              </a:ext>
+            </a:extLst>
+          </a:blip>
+          <a:stretch>
+            <a:fillRect/>
+          </a:stretch>
+        </p:blipFill>
+        <p:spPr>
+          <a:xfrm rot="19002371">
+            <a:off x="2779580" y="5340351"/>
+            <a:ext cx="279400" cy="279400"/>
+          </a:xfrm>
+          <a:prstGeom prst="rect">
+            <a:avLst/>
+          </a:prstGeom>
+        </p:spPr>
+      </p:pic>
+      <p:pic>
+        <p:nvPicPr>
+          <p:cNvPr id="8" name="Image 7" descr="microwat_tildex.pdf"/>
+          <p:cNvPicPr>
+            <a:picLocks noChangeAspect="1"/>
+          </p:cNvPicPr>
+          <p:nvPr/>
+        </p:nvPicPr>
+        <p:blipFill>
+          <a:blip r:embed="rId7">
+            <a:extLst>
+              <a:ext uri="{28A0092B-C50C-407E-A947-70E740481C1C}">
+                <a14:useLocalDpi xmlns:a14="http://schemas.microsoft.com/office/drawing/2010/main" val="0"/>
+              </a:ext>
+            </a:extLst>
+          </a:blip>
+          <a:stretch>
+            <a:fillRect/>
+          </a:stretch>
+        </p:blipFill>
+        <p:spPr>
+          <a:xfrm rot="19002371">
+            <a:off x="3355190" y="5302251"/>
+            <a:ext cx="241300" cy="317500"/>
+          </a:xfrm>
+          <a:prstGeom prst="rect">
+            <a:avLst/>
+          </a:prstGeom>
+        </p:spPr>
+      </p:pic>
+      <p:sp>
+        <p:nvSpPr>
+          <p:cNvPr id="9" name="ZoneTexte 8"/>
+          <p:cNvSpPr txBox="1"/>
+          <p:nvPr/>
+        </p:nvSpPr>
+        <p:spPr>
+          <a:xfrm>
+            <a:off x="3880699" y="1016101"/>
+            <a:ext cx="620683" cy="461665"/>
+          </a:xfrm>
+          <a:prstGeom prst="rect">
+            <a:avLst/>
+          </a:prstGeom>
+          <a:noFill/>
+        </p:spPr>
+        <p:txBody>
+          <a:bodyPr wrap="none" rtlCol="0">
+            <a:spAutoFit/>
+          </a:bodyPr>
+          <a:lstStyle/>
+          <a:p>
+            <a:pPr algn="ctr"/>
+            <a:r>
+              <a:rPr lang="fr-FR" sz="2400" dirty="0" smtClean="0"/>
+              <a:t>SST</a:t>
+            </a:r>
+          </a:p>
+        </p:txBody>
+      </p:sp>
+    </p:spTree>
+    <p:extLst>
+      <p:ext uri="{BB962C8B-B14F-4D97-AF65-F5344CB8AC3E}">
+        <p14:creationId xmlns:p14="http://schemas.microsoft.com/office/powerpoint/2010/main" val="2880806362"/>
+      </p:ext>
+    </p:extLst>
+  </p:cSld>
+  <p:clrMapOvr>
+    <a:masterClrMapping/>
+  </p:clrMapOvr>
+</p:sld>
+</file>
+
+<file path=ppt/slides/slide7.xml><?xml version="1.0" encoding="utf-8"?>
+<p:sld xmlns:a="http://schemas.openxmlformats.org/drawingml/2006/main" xmlns:r="http://schemas.openxmlformats.org/officeDocument/2006/relationships" xmlns:p="http://schemas.openxmlformats.org/presentationml/2006/main">
+  <p:cSld>
+    <p:spTree>
+      <p:nvGrpSpPr>
+        <p:cNvPr id="1" name=""/>
+        <p:cNvGrpSpPr/>
+        <p:nvPr/>
+      </p:nvGrpSpPr>
+      <p:grpSpPr>
+        <a:xfrm>
+          <a:off x="0" y="0"/>
+          <a:ext cx="0" cy="0"/>
+          <a:chOff x="0" y="0"/>
+          <a:chExt cx="0" cy="0"/>
+        </a:xfrm>
+      </p:grpSpPr>
+      <p:graphicFrame>
+        <p:nvGraphicFramePr>
+          <p:cNvPr id="2" name="Graphique 1"/>
+          <p:cNvGraphicFramePr/>
+          <p:nvPr>
+            <p:extLst>
+              <p:ext uri="{D42A27DB-BD31-4B8C-83A1-F6EECF244321}">
+                <p14:modId xmlns:p14="http://schemas.microsoft.com/office/powerpoint/2010/main" val="652039700"/>
+              </p:ext>
+            </p:extLst>
+          </p:nvPr>
+        </p:nvGraphicFramePr>
+        <p:xfrm>
+          <a:off x="1524001" y="1397000"/>
+          <a:ext cx="4997744" cy="4064000"/>
+        </p:xfrm>
+        <a:graphic>
+          <a:graphicData uri="http://schemas.openxmlformats.org/drawingml/2006/chart">
+            <c:chart xmlns:c="http://schemas.openxmlformats.org/drawingml/2006/chart" xmlns:r="http://schemas.openxmlformats.org/officeDocument/2006/relationships" r:id="rId2"/>
+          </a:graphicData>
+        </a:graphic>
+      </p:graphicFrame>
+    </p:spTree>
+    <p:extLst>
+      <p:ext uri="{BB962C8B-B14F-4D97-AF65-F5344CB8AC3E}">
+        <p14:creationId xmlns:p14="http://schemas.microsoft.com/office/powerpoint/2010/main" val="3253213884"/>
+      </p:ext>
+    </p:extLst>
+  </p:cSld>
+  <p:clrMapOvr>
+    <a:masterClrMapping/>
+  </p:clrMapOvr>
+</p:sld>
+</file>
+
+<file path=ppt/slides/slide8.xml><?xml version="1.0" encoding="utf-8"?>
+<p:sld xmlns:a="http://schemas.openxmlformats.org/drawingml/2006/main" xmlns:r="http://schemas.openxmlformats.org/officeDocument/2006/relationships" xmlns:p="http://schemas.openxmlformats.org/presentationml/2006/main">
+  <p:cSld>
+    <p:spTree>
+      <p:nvGrpSpPr>
+        <p:cNvPr id="1" name=""/>
+        <p:cNvGrpSpPr/>
+        <p:nvPr/>
+      </p:nvGrpSpPr>
+      <p:grpSpPr>
+        <a:xfrm>
+          <a:off x="0" y="0"/>
+          <a:ext cx="0" cy="0"/>
+          <a:chOff x="0" y="0"/>
+          <a:chExt cx="0" cy="0"/>
+        </a:xfrm>
+      </p:grpSpPr>
+      <p:graphicFrame>
+        <p:nvGraphicFramePr>
+          <p:cNvPr id="9" name="Graphique 8"/>
+          <p:cNvGraphicFramePr/>
+          <p:nvPr>
+            <p:extLst>
+              <p:ext uri="{D42A27DB-BD31-4B8C-83A1-F6EECF244321}">
+                <p14:modId xmlns:p14="http://schemas.microsoft.com/office/powerpoint/2010/main" val="987153174"/>
+              </p:ext>
+            </p:extLst>
+          </p:nvPr>
+        </p:nvGraphicFramePr>
+        <p:xfrm>
+          <a:off x="1524001" y="1397000"/>
+          <a:ext cx="4997744" cy="4064000"/>
+        </p:xfrm>
+        <a:graphic>
+          <a:graphicData uri="http://schemas.openxmlformats.org/drawingml/2006/chart">
+            <c:chart xmlns:c="http://schemas.openxmlformats.org/drawingml/2006/chart" xmlns:r="http://schemas.openxmlformats.org/officeDocument/2006/relationships" r:id="rId2"/>
+          </a:graphicData>
+        </a:graphic>
+      </p:graphicFrame>
+      <p:sp>
+        <p:nvSpPr>
+          <p:cNvPr id="10" name="ZoneTexte 9"/>
+          <p:cNvSpPr txBox="1"/>
+          <p:nvPr/>
+        </p:nvSpPr>
+        <p:spPr>
+          <a:xfrm>
+            <a:off x="573334" y="1217878"/>
+            <a:ext cx="1143762" cy="338554"/>
+          </a:xfrm>
+          <a:prstGeom prst="rect">
+            <a:avLst/>
+          </a:prstGeom>
+          <a:noFill/>
+        </p:spPr>
+        <p:txBody>
+          <a:bodyPr wrap="none" rtlCol="0">
+            <a:spAutoFit/>
+          </a:bodyPr>
+          <a:lstStyle/>
+          <a:p>
+            <a:pPr algn="ctr"/>
+            <a:r>
+              <a:rPr lang="fr-FR" sz="1600" dirty="0" smtClean="0"/>
+              <a:t>RMS (m.s</a:t>
+            </a:r>
+            <a:r>
+              <a:rPr lang="fr-FR" sz="1600" baseline="30000" dirty="0" smtClean="0"/>
+              <a:t>-1</a:t>
+            </a:r>
+            <a:r>
+              <a:rPr lang="fr-FR" sz="1600" dirty="0" smtClean="0"/>
+              <a:t>)</a:t>
+            </a:r>
+          </a:p>
+        </p:txBody>
+      </p:sp>
+      <p:pic>
+        <p:nvPicPr>
+          <p:cNvPr id="11" name="Image 10" descr="microwat_n1.pdf"/>
+          <p:cNvPicPr>
+            <a:picLocks noChangeAspect="1"/>
+          </p:cNvPicPr>
+          <p:nvPr/>
+        </p:nvPicPr>
+        <p:blipFill>
+          <a:blip r:embed="rId3">
+            <a:extLst>
+              <a:ext uri="{28A0092B-C50C-407E-A947-70E740481C1C}">
+                <a14:useLocalDpi xmlns:a14="http://schemas.microsoft.com/office/drawing/2010/main" val="0"/>
+              </a:ext>
+            </a:extLst>
+          </a:blip>
+          <a:stretch>
+            <a:fillRect/>
+          </a:stretch>
+        </p:blipFill>
+        <p:spPr>
+          <a:xfrm rot="19002371">
+            <a:off x="2988943" y="5684498"/>
+            <a:ext cx="1453528" cy="412195"/>
+          </a:xfrm>
+          <a:prstGeom prst="rect">
+            <a:avLst/>
+          </a:prstGeom>
+        </p:spPr>
+      </p:pic>
+      <p:pic>
+        <p:nvPicPr>
+          <p:cNvPr id="12" name="Image 11" descr="microwat_n2.pdf"/>
+          <p:cNvPicPr>
+            <a:picLocks noChangeAspect="1"/>
+          </p:cNvPicPr>
+          <p:nvPr/>
+        </p:nvPicPr>
+        <p:blipFill>
+          <a:blip r:embed="rId4">
+            <a:extLst>
+              <a:ext uri="{28A0092B-C50C-407E-A947-70E740481C1C}">
+                <a14:useLocalDpi xmlns:a14="http://schemas.microsoft.com/office/drawing/2010/main" val="0"/>
+              </a:ext>
+            </a:extLst>
+          </a:blip>
+          <a:stretch>
+            <a:fillRect/>
+          </a:stretch>
+        </p:blipFill>
+        <p:spPr>
+          <a:xfrm rot="19002371">
+            <a:off x="3349030" y="5818388"/>
+            <a:ext cx="1844028" cy="412194"/>
+          </a:xfrm>
+          <a:prstGeom prst="rect">
+            <a:avLst/>
+          </a:prstGeom>
+        </p:spPr>
+      </p:pic>
+      <p:pic>
+        <p:nvPicPr>
+          <p:cNvPr id="13" name="Image 12" descr="microwat_n3.pdf"/>
+          <p:cNvPicPr>
+            <a:picLocks noChangeAspect="1"/>
+          </p:cNvPicPr>
+          <p:nvPr/>
+        </p:nvPicPr>
+        <p:blipFill>
+          <a:blip r:embed="rId5">
+            <a:extLst>
+              <a:ext uri="{28A0092B-C50C-407E-A947-70E740481C1C}">
+                <a14:useLocalDpi xmlns:a14="http://schemas.microsoft.com/office/drawing/2010/main" val="0"/>
+              </a:ext>
+            </a:extLst>
+          </a:blip>
+          <a:stretch>
+            <a:fillRect/>
+          </a:stretch>
+        </p:blipFill>
+        <p:spPr>
+          <a:xfrm rot="19002371">
+            <a:off x="3975921" y="5818388"/>
+            <a:ext cx="1844028" cy="412194"/>
+          </a:xfrm>
+          <a:prstGeom prst="rect">
+            <a:avLst/>
+          </a:prstGeom>
+        </p:spPr>
+      </p:pic>
+      <p:pic>
+        <p:nvPicPr>
+          <p:cNvPr id="14" name="Image 13" descr="microwat_overlinex.pdf"/>
+          <p:cNvPicPr>
+            <a:picLocks noChangeAspect="1"/>
+          </p:cNvPicPr>
+          <p:nvPr/>
+        </p:nvPicPr>
+        <p:blipFill>
+          <a:blip r:embed="rId6">
+            <a:extLst>
+              <a:ext uri="{28A0092B-C50C-407E-A947-70E740481C1C}">
+                <a14:useLocalDpi xmlns:a14="http://schemas.microsoft.com/office/drawing/2010/main" val="0"/>
+              </a:ext>
+            </a:extLst>
+          </a:blip>
+          <a:stretch>
+            <a:fillRect/>
+          </a:stretch>
+        </p:blipFill>
+        <p:spPr>
+          <a:xfrm rot="19002371">
+            <a:off x="2779580" y="5340351"/>
+            <a:ext cx="279400" cy="279400"/>
+          </a:xfrm>
+          <a:prstGeom prst="rect">
+            <a:avLst/>
+          </a:prstGeom>
+        </p:spPr>
+      </p:pic>
+      <p:pic>
+        <p:nvPicPr>
+          <p:cNvPr id="15" name="Image 14" descr="microwat_tildex.pdf"/>
+          <p:cNvPicPr>
+            <a:picLocks noChangeAspect="1"/>
+          </p:cNvPicPr>
+          <p:nvPr/>
+        </p:nvPicPr>
+        <p:blipFill>
+          <a:blip r:embed="rId7">
+            <a:extLst>
+              <a:ext uri="{28A0092B-C50C-407E-A947-70E740481C1C}">
+                <a14:useLocalDpi xmlns:a14="http://schemas.microsoft.com/office/drawing/2010/main" val="0"/>
+              </a:ext>
+            </a:extLst>
+          </a:blip>
+          <a:stretch>
+            <a:fillRect/>
+          </a:stretch>
+        </p:blipFill>
+        <p:spPr>
+          <a:xfrm rot="19002371">
+            <a:off x="3355190" y="5302251"/>
+            <a:ext cx="241300" cy="317500"/>
+          </a:xfrm>
+          <a:prstGeom prst="rect">
+            <a:avLst/>
+          </a:prstGeom>
+        </p:spPr>
+      </p:pic>
+      <p:sp>
+        <p:nvSpPr>
+          <p:cNvPr id="16" name="ZoneTexte 15"/>
+          <p:cNvSpPr txBox="1"/>
+          <p:nvPr/>
+        </p:nvSpPr>
+        <p:spPr>
+          <a:xfrm>
+            <a:off x="3789203" y="1016101"/>
+            <a:ext cx="803676" cy="461665"/>
+          </a:xfrm>
+          <a:prstGeom prst="rect">
+            <a:avLst/>
+          </a:prstGeom>
+          <a:noFill/>
+        </p:spPr>
+        <p:txBody>
+          <a:bodyPr wrap="none" rtlCol="0">
+            <a:spAutoFit/>
+          </a:bodyPr>
+          <a:lstStyle/>
+          <a:p>
+            <a:pPr algn="ctr"/>
+            <a:r>
+              <a:rPr lang="fr-FR" sz="2400" dirty="0" smtClean="0"/>
+              <a:t>OWS</a:t>
+            </a:r>
+          </a:p>
+        </p:txBody>
+      </p:sp>
+    </p:spTree>
+    <p:extLst>
+      <p:ext uri="{BB962C8B-B14F-4D97-AF65-F5344CB8AC3E}">
+        <p14:creationId xmlns:p14="http://schemas.microsoft.com/office/powerpoint/2010/main" val="1445762648"/>
       </p:ext>
     </p:extLst>
   </p:cSld>

</xml_diff>